<commit_message>
Sprint Task Board Updated 10/06
</commit_message>
<xml_diff>
--- a/sprint_task_board.pptx
+++ b/sprint_task_board.pptx
@@ -135,7 +135,7 @@
           <p:cNvPr id="2" name="Title 1">
             <a:extLst>
               <a:ext uri="{FF2B5EF4-FFF2-40B4-BE49-F238E27FC236}">
-                <a16:creationId xmlns:a16="http://schemas.microsoft.com/office/drawing/2014/main" id="{0F943FEA-7A47-4409-9E89-FC170A6238DF}"/>
+                <a16:creationId xmlns:a16="http://schemas.microsoft.com/office/drawing/2014/main" xmlns="" id="{0F943FEA-7A47-4409-9E89-FC170A6238DF}"/>
               </a:ext>
             </a:extLst>
           </p:cNvPr>
@@ -172,7 +172,7 @@
           <p:cNvPr id="3" name="Subtitle 2">
             <a:extLst>
               <a:ext uri="{FF2B5EF4-FFF2-40B4-BE49-F238E27FC236}">
-                <a16:creationId xmlns:a16="http://schemas.microsoft.com/office/drawing/2014/main" id="{17455DBF-6D85-48C6-8AA1-BA917C2FB494}"/>
+                <a16:creationId xmlns:a16="http://schemas.microsoft.com/office/drawing/2014/main" xmlns="" id="{17455DBF-6D85-48C6-8AA1-BA917C2FB494}"/>
               </a:ext>
             </a:extLst>
           </p:cNvPr>
@@ -242,7 +242,7 @@
           <p:cNvPr id="4" name="Date Placeholder 3">
             <a:extLst>
               <a:ext uri="{FF2B5EF4-FFF2-40B4-BE49-F238E27FC236}">
-                <a16:creationId xmlns:a16="http://schemas.microsoft.com/office/drawing/2014/main" id="{92F45BF1-9C23-40AD-8349-E05418B6196D}"/>
+                <a16:creationId xmlns:a16="http://schemas.microsoft.com/office/drawing/2014/main" xmlns="" id="{92F45BF1-9C23-40AD-8349-E05418B6196D}"/>
               </a:ext>
             </a:extLst>
           </p:cNvPr>
@@ -271,7 +271,7 @@
           <p:cNvPr id="5" name="Footer Placeholder 4">
             <a:extLst>
               <a:ext uri="{FF2B5EF4-FFF2-40B4-BE49-F238E27FC236}">
-                <a16:creationId xmlns:a16="http://schemas.microsoft.com/office/drawing/2014/main" id="{ECB85B5C-F08E-4AE1-92FF-384357E21D05}"/>
+                <a16:creationId xmlns:a16="http://schemas.microsoft.com/office/drawing/2014/main" xmlns="" id="{ECB85B5C-F08E-4AE1-92FF-384357E21D05}"/>
               </a:ext>
             </a:extLst>
           </p:cNvPr>
@@ -296,7 +296,7 @@
           <p:cNvPr id="6" name="Slide Number Placeholder 5">
             <a:extLst>
               <a:ext uri="{FF2B5EF4-FFF2-40B4-BE49-F238E27FC236}">
-                <a16:creationId xmlns:a16="http://schemas.microsoft.com/office/drawing/2014/main" id="{89B3B116-9529-466B-AC7B-A74F950CF5D8}"/>
+                <a16:creationId xmlns:a16="http://schemas.microsoft.com/office/drawing/2014/main" xmlns="" id="{89B3B116-9529-466B-AC7B-A74F950CF5D8}"/>
               </a:ext>
             </a:extLst>
           </p:cNvPr>
@@ -355,7 +355,7 @@
           <p:cNvPr id="2" name="Title 1">
             <a:extLst>
               <a:ext uri="{FF2B5EF4-FFF2-40B4-BE49-F238E27FC236}">
-                <a16:creationId xmlns:a16="http://schemas.microsoft.com/office/drawing/2014/main" id="{5EB96799-CA27-4790-989C-57DD8467B761}"/>
+                <a16:creationId xmlns:a16="http://schemas.microsoft.com/office/drawing/2014/main" xmlns="" id="{5EB96799-CA27-4790-989C-57DD8467B761}"/>
               </a:ext>
             </a:extLst>
           </p:cNvPr>
@@ -383,7 +383,7 @@
           <p:cNvPr id="3" name="Vertical Text Placeholder 2">
             <a:extLst>
               <a:ext uri="{FF2B5EF4-FFF2-40B4-BE49-F238E27FC236}">
-                <a16:creationId xmlns:a16="http://schemas.microsoft.com/office/drawing/2014/main" id="{D94402C2-F698-476B-9D72-442347D77EC8}"/>
+                <a16:creationId xmlns:a16="http://schemas.microsoft.com/office/drawing/2014/main" xmlns="" id="{D94402C2-F698-476B-9D72-442347D77EC8}"/>
               </a:ext>
             </a:extLst>
           </p:cNvPr>
@@ -440,7 +440,7 @@
           <p:cNvPr id="4" name="Date Placeholder 3">
             <a:extLst>
               <a:ext uri="{FF2B5EF4-FFF2-40B4-BE49-F238E27FC236}">
-                <a16:creationId xmlns:a16="http://schemas.microsoft.com/office/drawing/2014/main" id="{91F5C79D-FC09-4104-926E-DE4DD920E8FA}"/>
+                <a16:creationId xmlns:a16="http://schemas.microsoft.com/office/drawing/2014/main" xmlns="" id="{91F5C79D-FC09-4104-926E-DE4DD920E8FA}"/>
               </a:ext>
             </a:extLst>
           </p:cNvPr>
@@ -469,7 +469,7 @@
           <p:cNvPr id="5" name="Footer Placeholder 4">
             <a:extLst>
               <a:ext uri="{FF2B5EF4-FFF2-40B4-BE49-F238E27FC236}">
-                <a16:creationId xmlns:a16="http://schemas.microsoft.com/office/drawing/2014/main" id="{4374BBA1-54F6-4019-B5A2-84A658D10788}"/>
+                <a16:creationId xmlns:a16="http://schemas.microsoft.com/office/drawing/2014/main" xmlns="" id="{4374BBA1-54F6-4019-B5A2-84A658D10788}"/>
               </a:ext>
             </a:extLst>
           </p:cNvPr>
@@ -494,7 +494,7 @@
           <p:cNvPr id="6" name="Slide Number Placeholder 5">
             <a:extLst>
               <a:ext uri="{FF2B5EF4-FFF2-40B4-BE49-F238E27FC236}">
-                <a16:creationId xmlns:a16="http://schemas.microsoft.com/office/drawing/2014/main" id="{87607567-BD8C-45DA-8D0B-13DAD6F97CB9}"/>
+                <a16:creationId xmlns:a16="http://schemas.microsoft.com/office/drawing/2014/main" xmlns="" id="{87607567-BD8C-45DA-8D0B-13DAD6F97CB9}"/>
               </a:ext>
             </a:extLst>
           </p:cNvPr>
@@ -553,7 +553,7 @@
           <p:cNvPr id="2" name="Vertical Title 1">
             <a:extLst>
               <a:ext uri="{FF2B5EF4-FFF2-40B4-BE49-F238E27FC236}">
-                <a16:creationId xmlns:a16="http://schemas.microsoft.com/office/drawing/2014/main" id="{2B525709-D6AC-4A8F-B8AC-9000214497ED}"/>
+                <a16:creationId xmlns:a16="http://schemas.microsoft.com/office/drawing/2014/main" xmlns="" id="{2B525709-D6AC-4A8F-B8AC-9000214497ED}"/>
               </a:ext>
             </a:extLst>
           </p:cNvPr>
@@ -586,7 +586,7 @@
           <p:cNvPr id="3" name="Vertical Text Placeholder 2">
             <a:extLst>
               <a:ext uri="{FF2B5EF4-FFF2-40B4-BE49-F238E27FC236}">
-                <a16:creationId xmlns:a16="http://schemas.microsoft.com/office/drawing/2014/main" id="{A05FEA65-8697-4C09-B004-4CFE8A26AF19}"/>
+                <a16:creationId xmlns:a16="http://schemas.microsoft.com/office/drawing/2014/main" xmlns="" id="{A05FEA65-8697-4C09-B004-4CFE8A26AF19}"/>
               </a:ext>
             </a:extLst>
           </p:cNvPr>
@@ -648,7 +648,7 @@
           <p:cNvPr id="4" name="Date Placeholder 3">
             <a:extLst>
               <a:ext uri="{FF2B5EF4-FFF2-40B4-BE49-F238E27FC236}">
-                <a16:creationId xmlns:a16="http://schemas.microsoft.com/office/drawing/2014/main" id="{240D9E41-8DF6-4C00-93AC-BB3392D836F2}"/>
+                <a16:creationId xmlns:a16="http://schemas.microsoft.com/office/drawing/2014/main" xmlns="" id="{240D9E41-8DF6-4C00-93AC-BB3392D836F2}"/>
               </a:ext>
             </a:extLst>
           </p:cNvPr>
@@ -677,7 +677,7 @@
           <p:cNvPr id="5" name="Footer Placeholder 4">
             <a:extLst>
               <a:ext uri="{FF2B5EF4-FFF2-40B4-BE49-F238E27FC236}">
-                <a16:creationId xmlns:a16="http://schemas.microsoft.com/office/drawing/2014/main" id="{DBCF2D0B-5479-4E58-BFAE-EF554D49F607}"/>
+                <a16:creationId xmlns:a16="http://schemas.microsoft.com/office/drawing/2014/main" xmlns="" id="{DBCF2D0B-5479-4E58-BFAE-EF554D49F607}"/>
               </a:ext>
             </a:extLst>
           </p:cNvPr>
@@ -702,7 +702,7 @@
           <p:cNvPr id="6" name="Slide Number Placeholder 5">
             <a:extLst>
               <a:ext uri="{FF2B5EF4-FFF2-40B4-BE49-F238E27FC236}">
-                <a16:creationId xmlns:a16="http://schemas.microsoft.com/office/drawing/2014/main" id="{4FE272FB-65B5-4679-9584-9FC1BB7B676D}"/>
+                <a16:creationId xmlns:a16="http://schemas.microsoft.com/office/drawing/2014/main" xmlns="" id="{4FE272FB-65B5-4679-9584-9FC1BB7B676D}"/>
               </a:ext>
             </a:extLst>
           </p:cNvPr>
@@ -761,7 +761,7 @@
           <p:cNvPr id="2" name="Title 1">
             <a:extLst>
               <a:ext uri="{FF2B5EF4-FFF2-40B4-BE49-F238E27FC236}">
-                <a16:creationId xmlns:a16="http://schemas.microsoft.com/office/drawing/2014/main" id="{FCE4474B-8A0A-4249-9DD6-26237794E02C}"/>
+                <a16:creationId xmlns:a16="http://schemas.microsoft.com/office/drawing/2014/main" xmlns="" id="{FCE4474B-8A0A-4249-9DD6-26237794E02C}"/>
               </a:ext>
             </a:extLst>
           </p:cNvPr>
@@ -789,7 +789,7 @@
           <p:cNvPr id="3" name="Content Placeholder 2">
             <a:extLst>
               <a:ext uri="{FF2B5EF4-FFF2-40B4-BE49-F238E27FC236}">
-                <a16:creationId xmlns:a16="http://schemas.microsoft.com/office/drawing/2014/main" id="{0D61969F-ABDC-4435-A745-655D77EB4A14}"/>
+                <a16:creationId xmlns:a16="http://schemas.microsoft.com/office/drawing/2014/main" xmlns="" id="{0D61969F-ABDC-4435-A745-655D77EB4A14}"/>
               </a:ext>
             </a:extLst>
           </p:cNvPr>
@@ -846,7 +846,7 @@
           <p:cNvPr id="4" name="Date Placeholder 3">
             <a:extLst>
               <a:ext uri="{FF2B5EF4-FFF2-40B4-BE49-F238E27FC236}">
-                <a16:creationId xmlns:a16="http://schemas.microsoft.com/office/drawing/2014/main" id="{B32380DB-4035-4455-BE5C-57F4F44D9D4C}"/>
+                <a16:creationId xmlns:a16="http://schemas.microsoft.com/office/drawing/2014/main" xmlns="" id="{B32380DB-4035-4455-BE5C-57F4F44D9D4C}"/>
               </a:ext>
             </a:extLst>
           </p:cNvPr>
@@ -875,7 +875,7 @@
           <p:cNvPr id="5" name="Footer Placeholder 4">
             <a:extLst>
               <a:ext uri="{FF2B5EF4-FFF2-40B4-BE49-F238E27FC236}">
-                <a16:creationId xmlns:a16="http://schemas.microsoft.com/office/drawing/2014/main" id="{41E79801-5ECD-43D3-838F-ABC46DAB5C75}"/>
+                <a16:creationId xmlns:a16="http://schemas.microsoft.com/office/drawing/2014/main" xmlns="" id="{41E79801-5ECD-43D3-838F-ABC46DAB5C75}"/>
               </a:ext>
             </a:extLst>
           </p:cNvPr>
@@ -900,7 +900,7 @@
           <p:cNvPr id="6" name="Slide Number Placeholder 5">
             <a:extLst>
               <a:ext uri="{FF2B5EF4-FFF2-40B4-BE49-F238E27FC236}">
-                <a16:creationId xmlns:a16="http://schemas.microsoft.com/office/drawing/2014/main" id="{FB78BDAD-83E7-42B3-B17B-A69C4DE03F89}"/>
+                <a16:creationId xmlns:a16="http://schemas.microsoft.com/office/drawing/2014/main" xmlns="" id="{FB78BDAD-83E7-42B3-B17B-A69C4DE03F89}"/>
               </a:ext>
             </a:extLst>
           </p:cNvPr>
@@ -959,7 +959,7 @@
           <p:cNvPr id="2" name="Title 1">
             <a:extLst>
               <a:ext uri="{FF2B5EF4-FFF2-40B4-BE49-F238E27FC236}">
-                <a16:creationId xmlns:a16="http://schemas.microsoft.com/office/drawing/2014/main" id="{F177E510-0D60-41E4-9372-43C6C45B7310}"/>
+                <a16:creationId xmlns:a16="http://schemas.microsoft.com/office/drawing/2014/main" xmlns="" id="{F177E510-0D60-41E4-9372-43C6C45B7310}"/>
               </a:ext>
             </a:extLst>
           </p:cNvPr>
@@ -996,7 +996,7 @@
           <p:cNvPr id="3" name="Text Placeholder 2">
             <a:extLst>
               <a:ext uri="{FF2B5EF4-FFF2-40B4-BE49-F238E27FC236}">
-                <a16:creationId xmlns:a16="http://schemas.microsoft.com/office/drawing/2014/main" id="{E8F6BA69-9FB2-4475-A3AE-BA1D638B3057}"/>
+                <a16:creationId xmlns:a16="http://schemas.microsoft.com/office/drawing/2014/main" xmlns="" id="{E8F6BA69-9FB2-4475-A3AE-BA1D638B3057}"/>
               </a:ext>
             </a:extLst>
           </p:cNvPr>
@@ -1121,7 +1121,7 @@
           <p:cNvPr id="4" name="Date Placeholder 3">
             <a:extLst>
               <a:ext uri="{FF2B5EF4-FFF2-40B4-BE49-F238E27FC236}">
-                <a16:creationId xmlns:a16="http://schemas.microsoft.com/office/drawing/2014/main" id="{F627FFD9-5F22-48F0-A50C-A74460217CEA}"/>
+                <a16:creationId xmlns:a16="http://schemas.microsoft.com/office/drawing/2014/main" xmlns="" id="{F627FFD9-5F22-48F0-A50C-A74460217CEA}"/>
               </a:ext>
             </a:extLst>
           </p:cNvPr>
@@ -1150,7 +1150,7 @@
           <p:cNvPr id="5" name="Footer Placeholder 4">
             <a:extLst>
               <a:ext uri="{FF2B5EF4-FFF2-40B4-BE49-F238E27FC236}">
-                <a16:creationId xmlns:a16="http://schemas.microsoft.com/office/drawing/2014/main" id="{0A6F0EF2-D60D-48DC-ACB7-5EBDA7B4B68F}"/>
+                <a16:creationId xmlns:a16="http://schemas.microsoft.com/office/drawing/2014/main" xmlns="" id="{0A6F0EF2-D60D-48DC-ACB7-5EBDA7B4B68F}"/>
               </a:ext>
             </a:extLst>
           </p:cNvPr>
@@ -1175,7 +1175,7 @@
           <p:cNvPr id="6" name="Slide Number Placeholder 5">
             <a:extLst>
               <a:ext uri="{FF2B5EF4-FFF2-40B4-BE49-F238E27FC236}">
-                <a16:creationId xmlns:a16="http://schemas.microsoft.com/office/drawing/2014/main" id="{B3D781CE-4C65-4E71-87AF-D1D98017967F}"/>
+                <a16:creationId xmlns:a16="http://schemas.microsoft.com/office/drawing/2014/main" xmlns="" id="{B3D781CE-4C65-4E71-87AF-D1D98017967F}"/>
               </a:ext>
             </a:extLst>
           </p:cNvPr>
@@ -1234,7 +1234,7 @@
           <p:cNvPr id="2" name="Title 1">
             <a:extLst>
               <a:ext uri="{FF2B5EF4-FFF2-40B4-BE49-F238E27FC236}">
-                <a16:creationId xmlns:a16="http://schemas.microsoft.com/office/drawing/2014/main" id="{747E8B63-9609-4BBF-B743-D777B4DBF6BB}"/>
+                <a16:creationId xmlns:a16="http://schemas.microsoft.com/office/drawing/2014/main" xmlns="" id="{747E8B63-9609-4BBF-B743-D777B4DBF6BB}"/>
               </a:ext>
             </a:extLst>
           </p:cNvPr>
@@ -1262,7 +1262,7 @@
           <p:cNvPr id="3" name="Content Placeholder 2">
             <a:extLst>
               <a:ext uri="{FF2B5EF4-FFF2-40B4-BE49-F238E27FC236}">
-                <a16:creationId xmlns:a16="http://schemas.microsoft.com/office/drawing/2014/main" id="{B7B47E64-1CC9-4DDF-9F4E-4F343FA90159}"/>
+                <a16:creationId xmlns:a16="http://schemas.microsoft.com/office/drawing/2014/main" xmlns="" id="{B7B47E64-1CC9-4DDF-9F4E-4F343FA90159}"/>
               </a:ext>
             </a:extLst>
           </p:cNvPr>
@@ -1324,7 +1324,7 @@
           <p:cNvPr id="4" name="Content Placeholder 3">
             <a:extLst>
               <a:ext uri="{FF2B5EF4-FFF2-40B4-BE49-F238E27FC236}">
-                <a16:creationId xmlns:a16="http://schemas.microsoft.com/office/drawing/2014/main" id="{FB3334DA-952F-49BE-98A3-B0B5951C94CE}"/>
+                <a16:creationId xmlns:a16="http://schemas.microsoft.com/office/drawing/2014/main" xmlns="" id="{FB3334DA-952F-49BE-98A3-B0B5951C94CE}"/>
               </a:ext>
             </a:extLst>
           </p:cNvPr>
@@ -1386,7 +1386,7 @@
           <p:cNvPr id="5" name="Date Placeholder 4">
             <a:extLst>
               <a:ext uri="{FF2B5EF4-FFF2-40B4-BE49-F238E27FC236}">
-                <a16:creationId xmlns:a16="http://schemas.microsoft.com/office/drawing/2014/main" id="{A89DB9B6-5453-4646-8E07-962A19DBFF44}"/>
+                <a16:creationId xmlns:a16="http://schemas.microsoft.com/office/drawing/2014/main" xmlns="" id="{A89DB9B6-5453-4646-8E07-962A19DBFF44}"/>
               </a:ext>
             </a:extLst>
           </p:cNvPr>
@@ -1415,7 +1415,7 @@
           <p:cNvPr id="6" name="Footer Placeholder 5">
             <a:extLst>
               <a:ext uri="{FF2B5EF4-FFF2-40B4-BE49-F238E27FC236}">
-                <a16:creationId xmlns:a16="http://schemas.microsoft.com/office/drawing/2014/main" id="{0781F20A-11BE-49CD-B10F-D144B50DB339}"/>
+                <a16:creationId xmlns:a16="http://schemas.microsoft.com/office/drawing/2014/main" xmlns="" id="{0781F20A-11BE-49CD-B10F-D144B50DB339}"/>
               </a:ext>
             </a:extLst>
           </p:cNvPr>
@@ -1440,7 +1440,7 @@
           <p:cNvPr id="7" name="Slide Number Placeholder 6">
             <a:extLst>
               <a:ext uri="{FF2B5EF4-FFF2-40B4-BE49-F238E27FC236}">
-                <a16:creationId xmlns:a16="http://schemas.microsoft.com/office/drawing/2014/main" id="{36E9D41E-52C1-4753-A8AE-839119E0EAD9}"/>
+                <a16:creationId xmlns:a16="http://schemas.microsoft.com/office/drawing/2014/main" xmlns="" id="{36E9D41E-52C1-4753-A8AE-839119E0EAD9}"/>
               </a:ext>
             </a:extLst>
           </p:cNvPr>
@@ -1499,7 +1499,7 @@
           <p:cNvPr id="2" name="Title 1">
             <a:extLst>
               <a:ext uri="{FF2B5EF4-FFF2-40B4-BE49-F238E27FC236}">
-                <a16:creationId xmlns:a16="http://schemas.microsoft.com/office/drawing/2014/main" id="{4AB5CDAE-B3A5-4198-BB2B-A5DE04791C3D}"/>
+                <a16:creationId xmlns:a16="http://schemas.microsoft.com/office/drawing/2014/main" xmlns="" id="{4AB5CDAE-B3A5-4198-BB2B-A5DE04791C3D}"/>
               </a:ext>
             </a:extLst>
           </p:cNvPr>
@@ -1532,7 +1532,7 @@
           <p:cNvPr id="3" name="Text Placeholder 2">
             <a:extLst>
               <a:ext uri="{FF2B5EF4-FFF2-40B4-BE49-F238E27FC236}">
-                <a16:creationId xmlns:a16="http://schemas.microsoft.com/office/drawing/2014/main" id="{5AEC9265-34A2-4D68-9006-733197A67704}"/>
+                <a16:creationId xmlns:a16="http://schemas.microsoft.com/office/drawing/2014/main" xmlns="" id="{5AEC9265-34A2-4D68-9006-733197A67704}"/>
               </a:ext>
             </a:extLst>
           </p:cNvPr>
@@ -1603,7 +1603,7 @@
           <p:cNvPr id="4" name="Content Placeholder 3">
             <a:extLst>
               <a:ext uri="{FF2B5EF4-FFF2-40B4-BE49-F238E27FC236}">
-                <a16:creationId xmlns:a16="http://schemas.microsoft.com/office/drawing/2014/main" id="{372F443B-2F35-4DF8-92C6-77CA6897B2CC}"/>
+                <a16:creationId xmlns:a16="http://schemas.microsoft.com/office/drawing/2014/main" xmlns="" id="{372F443B-2F35-4DF8-92C6-77CA6897B2CC}"/>
               </a:ext>
             </a:extLst>
           </p:cNvPr>
@@ -1665,7 +1665,7 @@
           <p:cNvPr id="5" name="Text Placeholder 4">
             <a:extLst>
               <a:ext uri="{FF2B5EF4-FFF2-40B4-BE49-F238E27FC236}">
-                <a16:creationId xmlns:a16="http://schemas.microsoft.com/office/drawing/2014/main" id="{EC3D721E-B603-4652-AD34-ACC9CC973595}"/>
+                <a16:creationId xmlns:a16="http://schemas.microsoft.com/office/drawing/2014/main" xmlns="" id="{EC3D721E-B603-4652-AD34-ACC9CC973595}"/>
               </a:ext>
             </a:extLst>
           </p:cNvPr>
@@ -1736,7 +1736,7 @@
           <p:cNvPr id="6" name="Content Placeholder 5">
             <a:extLst>
               <a:ext uri="{FF2B5EF4-FFF2-40B4-BE49-F238E27FC236}">
-                <a16:creationId xmlns:a16="http://schemas.microsoft.com/office/drawing/2014/main" id="{22A36147-1663-4047-BA93-92E35B6E0965}"/>
+                <a16:creationId xmlns:a16="http://schemas.microsoft.com/office/drawing/2014/main" xmlns="" id="{22A36147-1663-4047-BA93-92E35B6E0965}"/>
               </a:ext>
             </a:extLst>
           </p:cNvPr>
@@ -1798,7 +1798,7 @@
           <p:cNvPr id="7" name="Date Placeholder 6">
             <a:extLst>
               <a:ext uri="{FF2B5EF4-FFF2-40B4-BE49-F238E27FC236}">
-                <a16:creationId xmlns:a16="http://schemas.microsoft.com/office/drawing/2014/main" id="{F3F5C402-BC23-4C6B-BF62-257371740C9A}"/>
+                <a16:creationId xmlns:a16="http://schemas.microsoft.com/office/drawing/2014/main" xmlns="" id="{F3F5C402-BC23-4C6B-BF62-257371740C9A}"/>
               </a:ext>
             </a:extLst>
           </p:cNvPr>
@@ -1827,7 +1827,7 @@
           <p:cNvPr id="8" name="Footer Placeholder 7">
             <a:extLst>
               <a:ext uri="{FF2B5EF4-FFF2-40B4-BE49-F238E27FC236}">
-                <a16:creationId xmlns:a16="http://schemas.microsoft.com/office/drawing/2014/main" id="{11630A76-FC91-446A-986D-4DBB10DED956}"/>
+                <a16:creationId xmlns:a16="http://schemas.microsoft.com/office/drawing/2014/main" xmlns="" id="{11630A76-FC91-446A-986D-4DBB10DED956}"/>
               </a:ext>
             </a:extLst>
           </p:cNvPr>
@@ -1852,7 +1852,7 @@
           <p:cNvPr id="9" name="Slide Number Placeholder 8">
             <a:extLst>
               <a:ext uri="{FF2B5EF4-FFF2-40B4-BE49-F238E27FC236}">
-                <a16:creationId xmlns:a16="http://schemas.microsoft.com/office/drawing/2014/main" id="{4CF3F732-1534-48FF-98C9-201E971B872B}"/>
+                <a16:creationId xmlns:a16="http://schemas.microsoft.com/office/drawing/2014/main" xmlns="" id="{4CF3F732-1534-48FF-98C9-201E971B872B}"/>
               </a:ext>
             </a:extLst>
           </p:cNvPr>
@@ -1911,7 +1911,7 @@
           <p:cNvPr id="2" name="Title 1">
             <a:extLst>
               <a:ext uri="{FF2B5EF4-FFF2-40B4-BE49-F238E27FC236}">
-                <a16:creationId xmlns:a16="http://schemas.microsoft.com/office/drawing/2014/main" id="{3BB4D641-8516-4EA7-8D85-EA92E6B15643}"/>
+                <a16:creationId xmlns:a16="http://schemas.microsoft.com/office/drawing/2014/main" xmlns="" id="{3BB4D641-8516-4EA7-8D85-EA92E6B15643}"/>
               </a:ext>
             </a:extLst>
           </p:cNvPr>
@@ -1939,7 +1939,7 @@
           <p:cNvPr id="3" name="Date Placeholder 2">
             <a:extLst>
               <a:ext uri="{FF2B5EF4-FFF2-40B4-BE49-F238E27FC236}">
-                <a16:creationId xmlns:a16="http://schemas.microsoft.com/office/drawing/2014/main" id="{0C0B0FA3-5168-4AE2-BCC7-3B697DABF0DC}"/>
+                <a16:creationId xmlns:a16="http://schemas.microsoft.com/office/drawing/2014/main" xmlns="" id="{0C0B0FA3-5168-4AE2-BCC7-3B697DABF0DC}"/>
               </a:ext>
             </a:extLst>
           </p:cNvPr>
@@ -1968,7 +1968,7 @@
           <p:cNvPr id="4" name="Footer Placeholder 3">
             <a:extLst>
               <a:ext uri="{FF2B5EF4-FFF2-40B4-BE49-F238E27FC236}">
-                <a16:creationId xmlns:a16="http://schemas.microsoft.com/office/drawing/2014/main" id="{52EC0C84-0AF9-46E5-9013-D179D931DA60}"/>
+                <a16:creationId xmlns:a16="http://schemas.microsoft.com/office/drawing/2014/main" xmlns="" id="{52EC0C84-0AF9-46E5-9013-D179D931DA60}"/>
               </a:ext>
             </a:extLst>
           </p:cNvPr>
@@ -1993,7 +1993,7 @@
           <p:cNvPr id="5" name="Slide Number Placeholder 4">
             <a:extLst>
               <a:ext uri="{FF2B5EF4-FFF2-40B4-BE49-F238E27FC236}">
-                <a16:creationId xmlns:a16="http://schemas.microsoft.com/office/drawing/2014/main" id="{B16E34D5-EF49-4430-93AB-784D927FA904}"/>
+                <a16:creationId xmlns:a16="http://schemas.microsoft.com/office/drawing/2014/main" xmlns="" id="{B16E34D5-EF49-4430-93AB-784D927FA904}"/>
               </a:ext>
             </a:extLst>
           </p:cNvPr>
@@ -2052,7 +2052,7 @@
           <p:cNvPr id="2" name="Date Placeholder 1">
             <a:extLst>
               <a:ext uri="{FF2B5EF4-FFF2-40B4-BE49-F238E27FC236}">
-                <a16:creationId xmlns:a16="http://schemas.microsoft.com/office/drawing/2014/main" id="{6E9D809D-A7AA-4E24-8396-9E2E05D0C03D}"/>
+                <a16:creationId xmlns:a16="http://schemas.microsoft.com/office/drawing/2014/main" xmlns="" id="{6E9D809D-A7AA-4E24-8396-9E2E05D0C03D}"/>
               </a:ext>
             </a:extLst>
           </p:cNvPr>
@@ -2081,7 +2081,7 @@
           <p:cNvPr id="3" name="Footer Placeholder 2">
             <a:extLst>
               <a:ext uri="{FF2B5EF4-FFF2-40B4-BE49-F238E27FC236}">
-                <a16:creationId xmlns:a16="http://schemas.microsoft.com/office/drawing/2014/main" id="{E79DD26D-8B7B-4051-A0A7-1E16F74CC724}"/>
+                <a16:creationId xmlns:a16="http://schemas.microsoft.com/office/drawing/2014/main" xmlns="" id="{E79DD26D-8B7B-4051-A0A7-1E16F74CC724}"/>
               </a:ext>
             </a:extLst>
           </p:cNvPr>
@@ -2106,7 +2106,7 @@
           <p:cNvPr id="4" name="Slide Number Placeholder 3">
             <a:extLst>
               <a:ext uri="{FF2B5EF4-FFF2-40B4-BE49-F238E27FC236}">
-                <a16:creationId xmlns:a16="http://schemas.microsoft.com/office/drawing/2014/main" id="{F0FB25F9-E06D-4E40-8E32-9E1C1A62D196}"/>
+                <a16:creationId xmlns:a16="http://schemas.microsoft.com/office/drawing/2014/main" xmlns="" id="{F0FB25F9-E06D-4E40-8E32-9E1C1A62D196}"/>
               </a:ext>
             </a:extLst>
           </p:cNvPr>
@@ -2165,7 +2165,7 @@
           <p:cNvPr id="2" name="Title 1">
             <a:extLst>
               <a:ext uri="{FF2B5EF4-FFF2-40B4-BE49-F238E27FC236}">
-                <a16:creationId xmlns:a16="http://schemas.microsoft.com/office/drawing/2014/main" id="{11AB542B-6186-430E-BFD1-FB6C77D1EC44}"/>
+                <a16:creationId xmlns:a16="http://schemas.microsoft.com/office/drawing/2014/main" xmlns="" id="{11AB542B-6186-430E-BFD1-FB6C77D1EC44}"/>
               </a:ext>
             </a:extLst>
           </p:cNvPr>
@@ -2202,7 +2202,7 @@
           <p:cNvPr id="3" name="Content Placeholder 2">
             <a:extLst>
               <a:ext uri="{FF2B5EF4-FFF2-40B4-BE49-F238E27FC236}">
-                <a16:creationId xmlns:a16="http://schemas.microsoft.com/office/drawing/2014/main" id="{6C0FDAE4-C113-45FE-BEA5-E0A749CA11AA}"/>
+                <a16:creationId xmlns:a16="http://schemas.microsoft.com/office/drawing/2014/main" xmlns="" id="{6C0FDAE4-C113-45FE-BEA5-E0A749CA11AA}"/>
               </a:ext>
             </a:extLst>
           </p:cNvPr>
@@ -2292,7 +2292,7 @@
           <p:cNvPr id="4" name="Text Placeholder 3">
             <a:extLst>
               <a:ext uri="{FF2B5EF4-FFF2-40B4-BE49-F238E27FC236}">
-                <a16:creationId xmlns:a16="http://schemas.microsoft.com/office/drawing/2014/main" id="{3B59AFE6-43A3-475F-9169-AA3879E04DCA}"/>
+                <a16:creationId xmlns:a16="http://schemas.microsoft.com/office/drawing/2014/main" xmlns="" id="{3B59AFE6-43A3-475F-9169-AA3879E04DCA}"/>
               </a:ext>
             </a:extLst>
           </p:cNvPr>
@@ -2363,7 +2363,7 @@
           <p:cNvPr id="5" name="Date Placeholder 4">
             <a:extLst>
               <a:ext uri="{FF2B5EF4-FFF2-40B4-BE49-F238E27FC236}">
-                <a16:creationId xmlns:a16="http://schemas.microsoft.com/office/drawing/2014/main" id="{85FC6F24-508F-4B9D-8285-3EB28C4A49B7}"/>
+                <a16:creationId xmlns:a16="http://schemas.microsoft.com/office/drawing/2014/main" xmlns="" id="{85FC6F24-508F-4B9D-8285-3EB28C4A49B7}"/>
               </a:ext>
             </a:extLst>
           </p:cNvPr>
@@ -2392,7 +2392,7 @@
           <p:cNvPr id="6" name="Footer Placeholder 5">
             <a:extLst>
               <a:ext uri="{FF2B5EF4-FFF2-40B4-BE49-F238E27FC236}">
-                <a16:creationId xmlns:a16="http://schemas.microsoft.com/office/drawing/2014/main" id="{04AD152C-C3EC-4054-9B61-90ED8C2C0B3E}"/>
+                <a16:creationId xmlns:a16="http://schemas.microsoft.com/office/drawing/2014/main" xmlns="" id="{04AD152C-C3EC-4054-9B61-90ED8C2C0B3E}"/>
               </a:ext>
             </a:extLst>
           </p:cNvPr>
@@ -2417,7 +2417,7 @@
           <p:cNvPr id="7" name="Slide Number Placeholder 6">
             <a:extLst>
               <a:ext uri="{FF2B5EF4-FFF2-40B4-BE49-F238E27FC236}">
-                <a16:creationId xmlns:a16="http://schemas.microsoft.com/office/drawing/2014/main" id="{170BF4D2-F189-4941-AE6D-BEFA39FD501A}"/>
+                <a16:creationId xmlns:a16="http://schemas.microsoft.com/office/drawing/2014/main" xmlns="" id="{170BF4D2-F189-4941-AE6D-BEFA39FD501A}"/>
               </a:ext>
             </a:extLst>
           </p:cNvPr>
@@ -2476,7 +2476,7 @@
           <p:cNvPr id="2" name="Title 1">
             <a:extLst>
               <a:ext uri="{FF2B5EF4-FFF2-40B4-BE49-F238E27FC236}">
-                <a16:creationId xmlns:a16="http://schemas.microsoft.com/office/drawing/2014/main" id="{0E565D83-DD8F-4BB1-87AD-D482C3BDABEF}"/>
+                <a16:creationId xmlns:a16="http://schemas.microsoft.com/office/drawing/2014/main" xmlns="" id="{0E565D83-DD8F-4BB1-87AD-D482C3BDABEF}"/>
               </a:ext>
             </a:extLst>
           </p:cNvPr>
@@ -2513,7 +2513,7 @@
           <p:cNvPr id="3" name="Picture Placeholder 2">
             <a:extLst>
               <a:ext uri="{FF2B5EF4-FFF2-40B4-BE49-F238E27FC236}">
-                <a16:creationId xmlns:a16="http://schemas.microsoft.com/office/drawing/2014/main" id="{11384BBE-D187-4EDC-AE0F-35D5DFB14FEF}"/>
+                <a16:creationId xmlns:a16="http://schemas.microsoft.com/office/drawing/2014/main" xmlns="" id="{11384BBE-D187-4EDC-AE0F-35D5DFB14FEF}"/>
               </a:ext>
             </a:extLst>
           </p:cNvPr>
@@ -2580,7 +2580,7 @@
           <p:cNvPr id="4" name="Text Placeholder 3">
             <a:extLst>
               <a:ext uri="{FF2B5EF4-FFF2-40B4-BE49-F238E27FC236}">
-                <a16:creationId xmlns:a16="http://schemas.microsoft.com/office/drawing/2014/main" id="{236F51AA-7423-4E97-B9C7-443C8C0B6045}"/>
+                <a16:creationId xmlns:a16="http://schemas.microsoft.com/office/drawing/2014/main" xmlns="" id="{236F51AA-7423-4E97-B9C7-443C8C0B6045}"/>
               </a:ext>
             </a:extLst>
           </p:cNvPr>
@@ -2651,7 +2651,7 @@
           <p:cNvPr id="5" name="Date Placeholder 4">
             <a:extLst>
               <a:ext uri="{FF2B5EF4-FFF2-40B4-BE49-F238E27FC236}">
-                <a16:creationId xmlns:a16="http://schemas.microsoft.com/office/drawing/2014/main" id="{2B348D00-6958-49DF-9B3D-58CDEF569F2E}"/>
+                <a16:creationId xmlns:a16="http://schemas.microsoft.com/office/drawing/2014/main" xmlns="" id="{2B348D00-6958-49DF-9B3D-58CDEF569F2E}"/>
               </a:ext>
             </a:extLst>
           </p:cNvPr>
@@ -2680,7 +2680,7 @@
           <p:cNvPr id="6" name="Footer Placeholder 5">
             <a:extLst>
               <a:ext uri="{FF2B5EF4-FFF2-40B4-BE49-F238E27FC236}">
-                <a16:creationId xmlns:a16="http://schemas.microsoft.com/office/drawing/2014/main" id="{2ED5460A-A98E-402B-BBB0-208A5AB9EF99}"/>
+                <a16:creationId xmlns:a16="http://schemas.microsoft.com/office/drawing/2014/main" xmlns="" id="{2ED5460A-A98E-402B-BBB0-208A5AB9EF99}"/>
               </a:ext>
             </a:extLst>
           </p:cNvPr>
@@ -2705,7 +2705,7 @@
           <p:cNvPr id="7" name="Slide Number Placeholder 6">
             <a:extLst>
               <a:ext uri="{FF2B5EF4-FFF2-40B4-BE49-F238E27FC236}">
-                <a16:creationId xmlns:a16="http://schemas.microsoft.com/office/drawing/2014/main" id="{89C14EC8-9890-43DB-B530-6F48BDDEF730}"/>
+                <a16:creationId xmlns:a16="http://schemas.microsoft.com/office/drawing/2014/main" xmlns="" id="{89C14EC8-9890-43DB-B530-6F48BDDEF730}"/>
               </a:ext>
             </a:extLst>
           </p:cNvPr>
@@ -2769,7 +2769,7 @@
           <p:cNvPr id="2" name="Title Placeholder 1">
             <a:extLst>
               <a:ext uri="{FF2B5EF4-FFF2-40B4-BE49-F238E27FC236}">
-                <a16:creationId xmlns:a16="http://schemas.microsoft.com/office/drawing/2014/main" id="{64A8D812-302F-4F90-A3A7-482910CD5910}"/>
+                <a16:creationId xmlns:a16="http://schemas.microsoft.com/office/drawing/2014/main" xmlns="" id="{64A8D812-302F-4F90-A3A7-482910CD5910}"/>
               </a:ext>
             </a:extLst>
           </p:cNvPr>
@@ -2807,7 +2807,7 @@
           <p:cNvPr id="3" name="Text Placeholder 2">
             <a:extLst>
               <a:ext uri="{FF2B5EF4-FFF2-40B4-BE49-F238E27FC236}">
-                <a16:creationId xmlns:a16="http://schemas.microsoft.com/office/drawing/2014/main" id="{EB9123EC-1FFA-46CB-8871-EAF17D6C9DAD}"/>
+                <a16:creationId xmlns:a16="http://schemas.microsoft.com/office/drawing/2014/main" xmlns="" id="{EB9123EC-1FFA-46CB-8871-EAF17D6C9DAD}"/>
               </a:ext>
             </a:extLst>
           </p:cNvPr>
@@ -2874,7 +2874,7 @@
           <p:cNvPr id="4" name="Date Placeholder 3">
             <a:extLst>
               <a:ext uri="{FF2B5EF4-FFF2-40B4-BE49-F238E27FC236}">
-                <a16:creationId xmlns:a16="http://schemas.microsoft.com/office/drawing/2014/main" id="{0BAD4AA6-8077-4EAF-AE9E-7D9FB52B3DF3}"/>
+                <a16:creationId xmlns:a16="http://schemas.microsoft.com/office/drawing/2014/main" xmlns="" id="{0BAD4AA6-8077-4EAF-AE9E-7D9FB52B3DF3}"/>
               </a:ext>
             </a:extLst>
           </p:cNvPr>
@@ -2921,7 +2921,7 @@
           <p:cNvPr id="5" name="Footer Placeholder 4">
             <a:extLst>
               <a:ext uri="{FF2B5EF4-FFF2-40B4-BE49-F238E27FC236}">
-                <a16:creationId xmlns:a16="http://schemas.microsoft.com/office/drawing/2014/main" id="{256705BA-E28C-4DA2-8032-24F203AC40AE}"/>
+                <a16:creationId xmlns:a16="http://schemas.microsoft.com/office/drawing/2014/main" xmlns="" id="{256705BA-E28C-4DA2-8032-24F203AC40AE}"/>
               </a:ext>
             </a:extLst>
           </p:cNvPr>
@@ -2964,7 +2964,7 @@
           <p:cNvPr id="6" name="Slide Number Placeholder 5">
             <a:extLst>
               <a:ext uri="{FF2B5EF4-FFF2-40B4-BE49-F238E27FC236}">
-                <a16:creationId xmlns:a16="http://schemas.microsoft.com/office/drawing/2014/main" id="{40F03837-9D8E-4C34-9AD5-4D3CA46B04ED}"/>
+                <a16:creationId xmlns:a16="http://schemas.microsoft.com/office/drawing/2014/main" xmlns="" id="{40F03837-9D8E-4C34-9AD5-4D3CA46B04ED}"/>
               </a:ext>
             </a:extLst>
           </p:cNvPr>
@@ -3366,7 +3366,7 @@
           <p:cNvPr id="19" name="Rectangle 18">
             <a:extLst>
               <a:ext uri="{FF2B5EF4-FFF2-40B4-BE49-F238E27FC236}">
-                <a16:creationId xmlns:a16="http://schemas.microsoft.com/office/drawing/2014/main" id="{32D851B6-714A-4883-8D4E-754A7ED882BA}"/>
+                <a16:creationId xmlns:a16="http://schemas.microsoft.com/office/drawing/2014/main" xmlns="" id="{32D851B6-714A-4883-8D4E-754A7ED882BA}"/>
               </a:ext>
             </a:extLst>
           </p:cNvPr>
@@ -3412,7 +3412,7 @@
           <p:cNvPr id="23" name="Rectangle 22">
             <a:extLst>
               <a:ext uri="{FF2B5EF4-FFF2-40B4-BE49-F238E27FC236}">
-                <a16:creationId xmlns:a16="http://schemas.microsoft.com/office/drawing/2014/main" id="{F0CB5917-D9C5-4F78-B41A-F70D3EFFCF26}"/>
+                <a16:creationId xmlns:a16="http://schemas.microsoft.com/office/drawing/2014/main" xmlns="" id="{F0CB5917-D9C5-4F78-B41A-F70D3EFFCF26}"/>
               </a:ext>
             </a:extLst>
           </p:cNvPr>
@@ -3455,7 +3455,15 @@
                   <a:schemeClr val="bg1"/>
                 </a:solidFill>
               </a:rPr>
-              <a:t>Task #2:</a:t>
+              <a:t>Task #2</a:t>
+            </a:r>
+            <a:r>
+              <a:rPr lang="en-US" sz="800" dirty="0" smtClean="0">
+                <a:solidFill>
+                  <a:schemeClr val="bg1"/>
+                </a:solidFill>
+              </a:rPr>
+              <a:t>: Create counter that is incremented when enemy is destroyed </a:t>
             </a:r>
             <a:endParaRPr lang="en-US" dirty="0"/>
           </a:p>
@@ -3466,7 +3474,7 @@
           <p:cNvPr id="25" name="Rectangle 24">
             <a:extLst>
               <a:ext uri="{FF2B5EF4-FFF2-40B4-BE49-F238E27FC236}">
-                <a16:creationId xmlns:a16="http://schemas.microsoft.com/office/drawing/2014/main" id="{A26B1B57-39F1-4784-BB8C-D498B044853A}"/>
+                <a16:creationId xmlns:a16="http://schemas.microsoft.com/office/drawing/2014/main" xmlns="" id="{A26B1B57-39F1-4784-BB8C-D498B044853A}"/>
               </a:ext>
             </a:extLst>
           </p:cNvPr>
@@ -3509,7 +3517,15 @@
                   <a:schemeClr val="bg1"/>
                 </a:solidFill>
               </a:rPr>
-              <a:t>Task #1:</a:t>
+              <a:t>Task #1</a:t>
+            </a:r>
+            <a:r>
+              <a:rPr lang="en-US" sz="800" dirty="0" smtClean="0">
+                <a:solidFill>
+                  <a:schemeClr val="bg1"/>
+                </a:solidFill>
+              </a:rPr>
+              <a:t>: Implement Accuracy for shots fired and hit</a:t>
             </a:r>
             <a:endParaRPr lang="en-US" dirty="0"/>
           </a:p>
@@ -3520,7 +3536,7 @@
           <p:cNvPr id="4" name="TextBox 3">
             <a:extLst>
               <a:ext uri="{FF2B5EF4-FFF2-40B4-BE49-F238E27FC236}">
-                <a16:creationId xmlns:a16="http://schemas.microsoft.com/office/drawing/2014/main" id="{77AFE952-47A5-42E2-A2EC-FF7ABEA49A89}"/>
+                <a16:creationId xmlns:a16="http://schemas.microsoft.com/office/drawing/2014/main" xmlns="" id="{77AFE952-47A5-42E2-A2EC-FF7ABEA49A89}"/>
               </a:ext>
             </a:extLst>
           </p:cNvPr>
@@ -3563,7 +3579,7 @@
           <p:cNvPr id="5" name="TextBox 4">
             <a:extLst>
               <a:ext uri="{FF2B5EF4-FFF2-40B4-BE49-F238E27FC236}">
-                <a16:creationId xmlns:a16="http://schemas.microsoft.com/office/drawing/2014/main" id="{090298AF-3D44-4478-B386-6971E79EB79D}"/>
+                <a16:creationId xmlns:a16="http://schemas.microsoft.com/office/drawing/2014/main" xmlns="" id="{090298AF-3D44-4478-B386-6971E79EB79D}"/>
               </a:ext>
             </a:extLst>
           </p:cNvPr>
@@ -3598,7 +3614,7 @@
           <p:cNvPr id="6" name="Rectangle 5">
             <a:extLst>
               <a:ext uri="{FF2B5EF4-FFF2-40B4-BE49-F238E27FC236}">
-                <a16:creationId xmlns:a16="http://schemas.microsoft.com/office/drawing/2014/main" id="{B4931A1A-F246-44F6-A374-61C9F9C636E0}"/>
+                <a16:creationId xmlns:a16="http://schemas.microsoft.com/office/drawing/2014/main" xmlns="" id="{B4931A1A-F246-44F6-A374-61C9F9C636E0}"/>
               </a:ext>
             </a:extLst>
           </p:cNvPr>
@@ -3644,7 +3660,7 @@
           <p:cNvPr id="8" name="Table 7">
             <a:extLst>
               <a:ext uri="{FF2B5EF4-FFF2-40B4-BE49-F238E27FC236}">
-                <a16:creationId xmlns:a16="http://schemas.microsoft.com/office/drawing/2014/main" id="{216E663B-7C2E-4835-91C1-5C8FB8698420}"/>
+                <a16:creationId xmlns:a16="http://schemas.microsoft.com/office/drawing/2014/main" xmlns="" id="{216E663B-7C2E-4835-91C1-5C8FB8698420}"/>
               </a:ext>
             </a:extLst>
           </p:cNvPr>
@@ -3673,28 +3689,28 @@
                 <a:gridCol w="721889">
                   <a:extLst>
                     <a:ext uri="{9D8B030D-6E8A-4147-A177-3AD203B41FA5}">
-                      <a16:colId xmlns:a16="http://schemas.microsoft.com/office/drawing/2014/main" val="233666424"/>
+                      <a16:colId xmlns:a16="http://schemas.microsoft.com/office/drawing/2014/main" xmlns="" val="233666424"/>
                     </a:ext>
                   </a:extLst>
                 </a:gridCol>
                 <a:gridCol w="783522">
                   <a:extLst>
                     <a:ext uri="{9D8B030D-6E8A-4147-A177-3AD203B41FA5}">
-                      <a16:colId xmlns:a16="http://schemas.microsoft.com/office/drawing/2014/main" val="972059951"/>
+                      <a16:colId xmlns:a16="http://schemas.microsoft.com/office/drawing/2014/main" xmlns="" val="972059951"/>
                     </a:ext>
                   </a:extLst>
                 </a:gridCol>
                 <a:gridCol w="1049516">
                   <a:extLst>
                     <a:ext uri="{9D8B030D-6E8A-4147-A177-3AD203B41FA5}">
-                      <a16:colId xmlns:a16="http://schemas.microsoft.com/office/drawing/2014/main" val="2188007159"/>
+                      <a16:colId xmlns:a16="http://schemas.microsoft.com/office/drawing/2014/main" xmlns="" val="2188007159"/>
                     </a:ext>
                   </a:extLst>
                 </a:gridCol>
                 <a:gridCol w="899906">
                   <a:extLst>
                     <a:ext uri="{9D8B030D-6E8A-4147-A177-3AD203B41FA5}">
-                      <a16:colId xmlns:a16="http://schemas.microsoft.com/office/drawing/2014/main" val="3389346521"/>
+                      <a16:colId xmlns:a16="http://schemas.microsoft.com/office/drawing/2014/main" xmlns="" val="3389346521"/>
                     </a:ext>
                   </a:extLst>
                 </a:gridCol>
@@ -3794,7 +3810,7 @@
                 </a:tc>
                 <a:extLst>
                   <a:ext uri="{0D108BD9-81ED-4DB2-BD59-A6C34878D82A}">
-                    <a16:rowId xmlns:a16="http://schemas.microsoft.com/office/drawing/2014/main" val="300847090"/>
+                    <a16:rowId xmlns:a16="http://schemas.microsoft.com/office/drawing/2014/main" xmlns="" val="300847090"/>
                   </a:ext>
                 </a:extLst>
               </a:tr>
@@ -3807,7 +3823,7 @@
           <p:cNvPr id="9" name="Table 8">
             <a:extLst>
               <a:ext uri="{FF2B5EF4-FFF2-40B4-BE49-F238E27FC236}">
-                <a16:creationId xmlns:a16="http://schemas.microsoft.com/office/drawing/2014/main" id="{7488BC97-D05E-4727-B765-F9F045F12689}"/>
+                <a16:creationId xmlns:a16="http://schemas.microsoft.com/office/drawing/2014/main" xmlns="" id="{7488BC97-D05E-4727-B765-F9F045F12689}"/>
               </a:ext>
             </a:extLst>
           </p:cNvPr>
@@ -3817,14 +3833,14 @@
           <p:nvPr>
             <p:extLst>
               <p:ext uri="{D42A27DB-BD31-4B8C-83A1-F6EECF244321}">
-                <p14:modId xmlns:p14="http://schemas.microsoft.com/office/powerpoint/2010/main" val="605472769"/>
+                <p14:modId xmlns:p14="http://schemas.microsoft.com/office/powerpoint/2010/main" val="3274295374"/>
               </p:ext>
             </p:extLst>
           </p:nvPr>
         </p:nvGraphicFramePr>
         <p:xfrm>
           <a:off x="109774" y="4148509"/>
-          <a:ext cx="3454833" cy="368877"/>
+          <a:ext cx="3454833" cy="370830"/>
         </p:xfrm>
         <a:graphic>
           <a:graphicData uri="http://schemas.openxmlformats.org/drawingml/2006/table">
@@ -3836,28 +3852,28 @@
                 <a:gridCol w="721889">
                   <a:extLst>
                     <a:ext uri="{9D8B030D-6E8A-4147-A177-3AD203B41FA5}">
-                      <a16:colId xmlns:a16="http://schemas.microsoft.com/office/drawing/2014/main" val="3693118018"/>
+                      <a16:colId xmlns:a16="http://schemas.microsoft.com/office/drawing/2014/main" xmlns="" val="3693118018"/>
                     </a:ext>
                   </a:extLst>
                 </a:gridCol>
                 <a:gridCol w="812579">
                   <a:extLst>
                     <a:ext uri="{9D8B030D-6E8A-4147-A177-3AD203B41FA5}">
-                      <a16:colId xmlns:a16="http://schemas.microsoft.com/office/drawing/2014/main" val="952852968"/>
+                      <a16:colId xmlns:a16="http://schemas.microsoft.com/office/drawing/2014/main" xmlns="" val="952852968"/>
                     </a:ext>
                   </a:extLst>
                 </a:gridCol>
                 <a:gridCol w="1020459">
                   <a:extLst>
                     <a:ext uri="{9D8B030D-6E8A-4147-A177-3AD203B41FA5}">
-                      <a16:colId xmlns:a16="http://schemas.microsoft.com/office/drawing/2014/main" val="1816747115"/>
+                      <a16:colId xmlns:a16="http://schemas.microsoft.com/office/drawing/2014/main" xmlns="" val="1816747115"/>
                     </a:ext>
                   </a:extLst>
                 </a:gridCol>
                 <a:gridCol w="899906">
                   <a:extLst>
                     <a:ext uri="{9D8B030D-6E8A-4147-A177-3AD203B41FA5}">
-                      <a16:colId xmlns:a16="http://schemas.microsoft.com/office/drawing/2014/main" val="55182559"/>
+                      <a16:colId xmlns:a16="http://schemas.microsoft.com/office/drawing/2014/main" xmlns="" val="55182559"/>
                     </a:ext>
                   </a:extLst>
                 </a:gridCol>
@@ -3870,28 +3886,11 @@
                     <a:p>
                       <a:pPr algn="l" fontAlgn="ctr"/>
                       <a:r>
-                        <a:rPr lang="en-US" sz="800" u="none" strike="noStrike">
+                        <a:rPr lang="en-US" sz="800" u="none" strike="noStrike" dirty="0">
                           <a:effectLst/>
                         </a:rPr>
                         <a:t>2</a:t>
                       </a:r>
-                      <a:endParaRPr lang="en-US" sz="800" b="0" i="0" u="none" strike="noStrike">
-                        <a:solidFill>
-                          <a:srgbClr val="000000"/>
-                        </a:solidFill>
-                        <a:effectLst/>
-                        <a:latin typeface="Century Gothic" panose="020B0502020202020204" pitchFamily="34" charset="0"/>
-                      </a:endParaRPr>
-                    </a:p>
-                  </a:txBody>
-                  <a:tcPr marL="76053" marR="5070" marT="5070" marB="0" anchor="ctr"/>
-                </a:tc>
-                <a:tc>
-                  <a:txBody>
-                    <a:bodyPr/>
-                    <a:lstStyle/>
-                    <a:p>
-                      <a:pPr algn="l" fontAlgn="ctr"/>
                       <a:endParaRPr lang="en-US" sz="800" b="0" i="0" u="none" strike="noStrike" dirty="0">
                         <a:solidFill>
                           <a:srgbClr val="000000"/>
@@ -3909,6 +3908,16 @@
                     <a:lstStyle/>
                     <a:p>
                       <a:pPr algn="l" fontAlgn="ctr"/>
+                      <a:r>
+                        <a:rPr lang="en-US" sz="800" b="0" i="0" u="none" strike="noStrike" dirty="0" smtClean="0">
+                          <a:solidFill>
+                            <a:srgbClr val="000000"/>
+                          </a:solidFill>
+                          <a:effectLst/>
+                          <a:latin typeface="Century Gothic" panose="020B0502020202020204" pitchFamily="34" charset="0"/>
+                        </a:rPr>
+                        <a:t>Score System</a:t>
+                      </a:r>
                       <a:endParaRPr lang="en-US" sz="800" b="0" i="0" u="none" strike="noStrike" dirty="0">
                         <a:solidFill>
                           <a:srgbClr val="000000"/>
@@ -3926,6 +3935,43 @@
                     <a:lstStyle/>
                     <a:p>
                       <a:pPr algn="l" fontAlgn="ctr"/>
+                      <a:r>
+                        <a:rPr lang="en-US" sz="800" b="0" i="0" u="none" strike="noStrike" dirty="0" smtClean="0">
+                          <a:solidFill>
+                            <a:srgbClr val="000000"/>
+                          </a:solidFill>
+                          <a:effectLst/>
+                          <a:latin typeface="Century Gothic" panose="020B0502020202020204" pitchFamily="34" charset="0"/>
+                        </a:rPr>
+                        <a:t>Beat my high score and see my accuracy</a:t>
+                      </a:r>
+                      <a:endParaRPr lang="en-US" sz="800" b="0" i="0" u="none" strike="noStrike" dirty="0">
+                        <a:solidFill>
+                          <a:srgbClr val="000000"/>
+                        </a:solidFill>
+                        <a:effectLst/>
+                        <a:latin typeface="Century Gothic" panose="020B0502020202020204" pitchFamily="34" charset="0"/>
+                      </a:endParaRPr>
+                    </a:p>
+                  </a:txBody>
+                  <a:tcPr marL="76053" marR="5070" marT="5070" marB="0" anchor="ctr"/>
+                </a:tc>
+                <a:tc>
+                  <a:txBody>
+                    <a:bodyPr/>
+                    <a:lstStyle/>
+                    <a:p>
+                      <a:pPr algn="l" fontAlgn="ctr"/>
+                      <a:r>
+                        <a:rPr lang="en-US" sz="800" b="0" i="0" u="none" strike="noStrike" dirty="0" smtClean="0">
+                          <a:solidFill>
+                            <a:srgbClr val="000000"/>
+                          </a:solidFill>
+                          <a:effectLst/>
+                          <a:latin typeface="Century Gothic" panose="020B0502020202020204" pitchFamily="34" charset="0"/>
+                        </a:rPr>
+                        <a:t>must have</a:t>
+                      </a:r>
                       <a:endParaRPr lang="en-US" sz="800" b="0" i="0" u="none" strike="noStrike" dirty="0">
                         <a:solidFill>
                           <a:srgbClr val="000000"/>
@@ -3939,7 +3985,7 @@
                 </a:tc>
                 <a:extLst>
                   <a:ext uri="{0D108BD9-81ED-4DB2-BD59-A6C34878D82A}">
-                    <a16:rowId xmlns:a16="http://schemas.microsoft.com/office/drawing/2014/main" val="2287119280"/>
+                    <a16:rowId xmlns:a16="http://schemas.microsoft.com/office/drawing/2014/main" xmlns="" val="2287119280"/>
                   </a:ext>
                 </a:extLst>
               </a:tr>
@@ -3952,7 +3998,7 @@
           <p:cNvPr id="10" name="Table 9">
             <a:extLst>
               <a:ext uri="{FF2B5EF4-FFF2-40B4-BE49-F238E27FC236}">
-                <a16:creationId xmlns:a16="http://schemas.microsoft.com/office/drawing/2014/main" id="{8B53D829-A13C-4105-BD19-80750650E577}"/>
+                <a16:creationId xmlns:a16="http://schemas.microsoft.com/office/drawing/2014/main" xmlns="" id="{8B53D829-A13C-4105-BD19-80750650E577}"/>
               </a:ext>
             </a:extLst>
           </p:cNvPr>
@@ -3962,14 +4008,14 @@
           <p:nvPr>
             <p:extLst>
               <p:ext uri="{D42A27DB-BD31-4B8C-83A1-F6EECF244321}">
-                <p14:modId xmlns:p14="http://schemas.microsoft.com/office/powerpoint/2010/main" val="70324002"/>
+                <p14:modId xmlns:p14="http://schemas.microsoft.com/office/powerpoint/2010/main" val="395127465"/>
               </p:ext>
             </p:extLst>
           </p:nvPr>
         </p:nvGraphicFramePr>
         <p:xfrm>
           <a:off x="109776" y="1970800"/>
-          <a:ext cx="3454833" cy="213290"/>
+          <a:ext cx="3454833" cy="248910"/>
         </p:xfrm>
         <a:graphic>
           <a:graphicData uri="http://schemas.openxmlformats.org/drawingml/2006/table">
@@ -3981,28 +4027,28 @@
                 <a:gridCol w="721889">
                   <a:extLst>
                     <a:ext uri="{9D8B030D-6E8A-4147-A177-3AD203B41FA5}">
-                      <a16:colId xmlns:a16="http://schemas.microsoft.com/office/drawing/2014/main" val="1464581443"/>
+                      <a16:colId xmlns:a16="http://schemas.microsoft.com/office/drawing/2014/main" xmlns="" val="1464581443"/>
                     </a:ext>
                   </a:extLst>
                 </a:gridCol>
                 <a:gridCol w="783522">
                   <a:extLst>
                     <a:ext uri="{9D8B030D-6E8A-4147-A177-3AD203B41FA5}">
-                      <a16:colId xmlns:a16="http://schemas.microsoft.com/office/drawing/2014/main" val="3127435560"/>
+                      <a16:colId xmlns:a16="http://schemas.microsoft.com/office/drawing/2014/main" xmlns="" val="3127435560"/>
                     </a:ext>
                   </a:extLst>
                 </a:gridCol>
                 <a:gridCol w="1049516">
                   <a:extLst>
                     <a:ext uri="{9D8B030D-6E8A-4147-A177-3AD203B41FA5}">
-                      <a16:colId xmlns:a16="http://schemas.microsoft.com/office/drawing/2014/main" val="2161992991"/>
+                      <a16:colId xmlns:a16="http://schemas.microsoft.com/office/drawing/2014/main" xmlns="" val="2161992991"/>
                     </a:ext>
                   </a:extLst>
                 </a:gridCol>
                 <a:gridCol w="899906">
                   <a:extLst>
                     <a:ext uri="{9D8B030D-6E8A-4147-A177-3AD203B41FA5}">
-                      <a16:colId xmlns:a16="http://schemas.microsoft.com/office/drawing/2014/main" val="732979080"/>
+                      <a16:colId xmlns:a16="http://schemas.microsoft.com/office/drawing/2014/main" xmlns="" val="732979080"/>
                     </a:ext>
                   </a:extLst>
                 </a:gridCol>
@@ -4037,6 +4083,16 @@
                     <a:lstStyle/>
                     <a:p>
                       <a:pPr algn="l" fontAlgn="ctr"/>
+                      <a:r>
+                        <a:rPr lang="en-US" sz="800" b="0" i="0" u="none" strike="noStrike" dirty="0" smtClean="0">
+                          <a:solidFill>
+                            <a:srgbClr val="000000"/>
+                          </a:solidFill>
+                          <a:effectLst/>
+                          <a:latin typeface="Century Gothic" panose="020B0502020202020204" pitchFamily="34" charset="0"/>
+                        </a:rPr>
+                        <a:t>Product Owner</a:t>
+                      </a:r>
                       <a:endParaRPr lang="en-US" sz="800" b="0" i="0" u="none" strike="noStrike" dirty="0">
                         <a:solidFill>
                           <a:srgbClr val="000000"/>
@@ -4054,6 +4110,16 @@
                     <a:lstStyle/>
                     <a:p>
                       <a:pPr algn="l" fontAlgn="ctr"/>
+                      <a:r>
+                        <a:rPr lang="en-US" sz="800" b="0" i="0" u="none" strike="noStrike" dirty="0" smtClean="0">
+                          <a:solidFill>
+                            <a:srgbClr val="000000"/>
+                          </a:solidFill>
+                          <a:effectLst/>
+                          <a:latin typeface="Century Gothic" panose="020B0502020202020204" pitchFamily="34" charset="0"/>
+                        </a:rPr>
+                        <a:t>Create the base project</a:t>
+                      </a:r>
                       <a:endParaRPr lang="en-US" sz="800" b="0" i="0" u="none" strike="noStrike" dirty="0">
                         <a:solidFill>
                           <a:srgbClr val="000000"/>
@@ -4071,6 +4137,16 @@
                     <a:lstStyle/>
                     <a:p>
                       <a:pPr algn="l" fontAlgn="ctr"/>
+                      <a:r>
+                        <a:rPr lang="en-US" sz="800" b="0" i="0" u="none" strike="noStrike" dirty="0" smtClean="0">
+                          <a:solidFill>
+                            <a:srgbClr val="000000"/>
+                          </a:solidFill>
+                          <a:effectLst/>
+                          <a:latin typeface="Century Gothic" panose="020B0502020202020204" pitchFamily="34" charset="0"/>
+                        </a:rPr>
+                        <a:t>Must have </a:t>
+                      </a:r>
                       <a:endParaRPr lang="en-US" sz="800" b="0" i="0" u="none" strike="noStrike" dirty="0">
                         <a:solidFill>
                           <a:srgbClr val="000000"/>
@@ -4084,7 +4160,7 @@
                 </a:tc>
                 <a:extLst>
                   <a:ext uri="{0D108BD9-81ED-4DB2-BD59-A6C34878D82A}">
-                    <a16:rowId xmlns:a16="http://schemas.microsoft.com/office/drawing/2014/main" val="2949352622"/>
+                    <a16:rowId xmlns:a16="http://schemas.microsoft.com/office/drawing/2014/main" xmlns="" val="2949352622"/>
                   </a:ext>
                 </a:extLst>
               </a:tr>
@@ -4097,7 +4173,7 @@
           <p:cNvPr id="13" name="Rectangle 12">
             <a:extLst>
               <a:ext uri="{FF2B5EF4-FFF2-40B4-BE49-F238E27FC236}">
-                <a16:creationId xmlns:a16="http://schemas.microsoft.com/office/drawing/2014/main" id="{88911F9B-762D-4D9D-8D59-8C7C40A1A285}"/>
+                <a16:creationId xmlns:a16="http://schemas.microsoft.com/office/drawing/2014/main" xmlns="" id="{88911F9B-762D-4D9D-8D59-8C7C40A1A285}"/>
               </a:ext>
             </a:extLst>
           </p:cNvPr>
@@ -4106,7 +4182,7 @@
         </p:nvSpPr>
         <p:spPr>
           <a:xfrm>
-            <a:off x="3983771" y="1508457"/>
+            <a:off x="7170678" y="1595533"/>
             <a:ext cx="1093927" cy="499722"/>
           </a:xfrm>
           <a:prstGeom prst="rect">
@@ -4140,7 +4216,15 @@
                   <a:schemeClr val="bg1"/>
                 </a:solidFill>
               </a:rPr>
-              <a:t>Task #1:</a:t>
+              <a:t>Task #1</a:t>
+            </a:r>
+            <a:r>
+              <a:rPr lang="en-US" sz="800" dirty="0" smtClean="0">
+                <a:solidFill>
+                  <a:schemeClr val="bg1"/>
+                </a:solidFill>
+              </a:rPr>
+              <a:t>: Watch Videos</a:t>
             </a:r>
             <a:endParaRPr lang="en-US" dirty="0"/>
           </a:p>
@@ -4151,7 +4235,7 @@
           <p:cNvPr id="15" name="Rectangle 14">
             <a:extLst>
               <a:ext uri="{FF2B5EF4-FFF2-40B4-BE49-F238E27FC236}">
-                <a16:creationId xmlns:a16="http://schemas.microsoft.com/office/drawing/2014/main" id="{8899DA91-943D-48DA-AAB3-0895C2AAF047}"/>
+                <a16:creationId xmlns:a16="http://schemas.microsoft.com/office/drawing/2014/main" xmlns="" id="{8899DA91-943D-48DA-AAB3-0895C2AAF047}"/>
               </a:ext>
             </a:extLst>
           </p:cNvPr>
@@ -4194,7 +4278,15 @@
                   <a:schemeClr val="bg1"/>
                 </a:solidFill>
               </a:rPr>
-              <a:t>Task #2:</a:t>
+              <a:t>Task #2</a:t>
+            </a:r>
+            <a:r>
+              <a:rPr lang="en-US" sz="800" dirty="0" smtClean="0">
+                <a:solidFill>
+                  <a:schemeClr val="bg1"/>
+                </a:solidFill>
+              </a:rPr>
+              <a:t>: Design Level</a:t>
             </a:r>
             <a:endParaRPr lang="en-US" dirty="0"/>
           </a:p>
@@ -4205,7 +4297,7 @@
           <p:cNvPr id="17" name="Rectangle 16">
             <a:extLst>
               <a:ext uri="{FF2B5EF4-FFF2-40B4-BE49-F238E27FC236}">
-                <a16:creationId xmlns:a16="http://schemas.microsoft.com/office/drawing/2014/main" id="{ABD8C12D-0590-401B-9810-3C70D06503BB}"/>
+                <a16:creationId xmlns:a16="http://schemas.microsoft.com/office/drawing/2014/main" xmlns="" id="{ABD8C12D-0590-401B-9810-3C70D06503BB}"/>
               </a:ext>
             </a:extLst>
           </p:cNvPr>
@@ -4248,7 +4340,15 @@
                   <a:schemeClr val="bg1"/>
                 </a:solidFill>
               </a:rPr>
-              <a:t>Task #3:</a:t>
+              <a:t>Task #3</a:t>
+            </a:r>
+            <a:r>
+              <a:rPr lang="en-US" sz="800" dirty="0" smtClean="0">
+                <a:solidFill>
+                  <a:schemeClr val="bg1"/>
+                </a:solidFill>
+              </a:rPr>
+              <a:t>: Add code</a:t>
             </a:r>
             <a:endParaRPr lang="en-US" dirty="0"/>
           </a:p>
@@ -4259,7 +4359,7 @@
           <p:cNvPr id="35" name="Straight Connector 34">
             <a:extLst>
               <a:ext uri="{FF2B5EF4-FFF2-40B4-BE49-F238E27FC236}">
-                <a16:creationId xmlns:a16="http://schemas.microsoft.com/office/drawing/2014/main" id="{B6A3EA80-60C5-4431-980D-80005D3FE9D3}"/>
+                <a16:creationId xmlns:a16="http://schemas.microsoft.com/office/drawing/2014/main" xmlns="" id="{B6A3EA80-60C5-4431-980D-80005D3FE9D3}"/>
               </a:ext>
             </a:extLst>
           </p:cNvPr>
@@ -4301,7 +4401,7 @@
           <p:cNvPr id="36" name="Straight Connector 35">
             <a:extLst>
               <a:ext uri="{FF2B5EF4-FFF2-40B4-BE49-F238E27FC236}">
-                <a16:creationId xmlns:a16="http://schemas.microsoft.com/office/drawing/2014/main" id="{82BD31D8-AEB2-4A38-A420-A825020DD77E}"/>
+                <a16:creationId xmlns:a16="http://schemas.microsoft.com/office/drawing/2014/main" xmlns="" id="{82BD31D8-AEB2-4A38-A420-A825020DD77E}"/>
               </a:ext>
             </a:extLst>
           </p:cNvPr>
@@ -4343,7 +4443,7 @@
           <p:cNvPr id="37" name="Straight Connector 36">
             <a:extLst>
               <a:ext uri="{FF2B5EF4-FFF2-40B4-BE49-F238E27FC236}">
-                <a16:creationId xmlns:a16="http://schemas.microsoft.com/office/drawing/2014/main" id="{7DE8383F-8BE6-4377-8AA9-3A3873DC3067}"/>
+                <a16:creationId xmlns:a16="http://schemas.microsoft.com/office/drawing/2014/main" xmlns="" id="{7DE8383F-8BE6-4377-8AA9-3A3873DC3067}"/>
               </a:ext>
             </a:extLst>
           </p:cNvPr>
@@ -4385,7 +4485,7 @@
           <p:cNvPr id="39" name="TextBox 38">
             <a:extLst>
               <a:ext uri="{FF2B5EF4-FFF2-40B4-BE49-F238E27FC236}">
-                <a16:creationId xmlns:a16="http://schemas.microsoft.com/office/drawing/2014/main" id="{77DACC8D-3953-4CF9-A052-552278EA3516}"/>
+                <a16:creationId xmlns:a16="http://schemas.microsoft.com/office/drawing/2014/main" xmlns="" id="{77DACC8D-3953-4CF9-A052-552278EA3516}"/>
               </a:ext>
             </a:extLst>
           </p:cNvPr>
@@ -4430,7 +4530,7 @@
           <p:cNvPr id="24" name="Rectangle 23">
             <a:extLst>
               <a:ext uri="{FF2B5EF4-FFF2-40B4-BE49-F238E27FC236}">
-                <a16:creationId xmlns:a16="http://schemas.microsoft.com/office/drawing/2014/main" id="{A26B1B57-39F1-4784-BB8C-D498B044853A}"/>
+                <a16:creationId xmlns:a16="http://schemas.microsoft.com/office/drawing/2014/main" xmlns="" id="{A26B1B57-39F1-4784-BB8C-D498B044853A}"/>
               </a:ext>
             </a:extLst>
           </p:cNvPr>
@@ -4473,7 +4573,15 @@
                   <a:schemeClr val="bg1"/>
                 </a:solidFill>
               </a:rPr>
-              <a:t>Task #3:</a:t>
+              <a:t>Task #3</a:t>
+            </a:r>
+            <a:r>
+              <a:rPr lang="en-US" sz="800" dirty="0" smtClean="0">
+                <a:solidFill>
+                  <a:schemeClr val="bg1"/>
+                </a:solidFill>
+              </a:rPr>
+              <a:t>: Display to user</a:t>
             </a:r>
             <a:endParaRPr lang="en-US" dirty="0"/>
           </a:p>
@@ -4484,7 +4592,7 @@
           <p:cNvPr id="26" name="Rectangle 25">
             <a:extLst>
               <a:ext uri="{FF2B5EF4-FFF2-40B4-BE49-F238E27FC236}">
-                <a16:creationId xmlns:a16="http://schemas.microsoft.com/office/drawing/2014/main" id="{ABD8C12D-0590-401B-9810-3C70D06503BB}"/>
+                <a16:creationId xmlns:a16="http://schemas.microsoft.com/office/drawing/2014/main" xmlns="" id="{ABD8C12D-0590-401B-9810-3C70D06503BB}"/>
               </a:ext>
             </a:extLst>
           </p:cNvPr>
@@ -4527,7 +4635,15 @@
                   <a:schemeClr val="bg1"/>
                 </a:solidFill>
               </a:rPr>
-              <a:t>Person doing task:</a:t>
+              <a:t>Person doing task</a:t>
+            </a:r>
+            <a:r>
+              <a:rPr lang="en-US" sz="800" dirty="0" smtClean="0">
+                <a:solidFill>
+                  <a:schemeClr val="bg1"/>
+                </a:solidFill>
+              </a:rPr>
+              <a:t>: Hannah and Josh</a:t>
             </a:r>
             <a:endParaRPr lang="en-US" dirty="0"/>
           </a:p>
@@ -4538,7 +4654,7 @@
           <p:cNvPr id="28" name="Rectangle 27">
             <a:extLst>
               <a:ext uri="{FF2B5EF4-FFF2-40B4-BE49-F238E27FC236}">
-                <a16:creationId xmlns:a16="http://schemas.microsoft.com/office/drawing/2014/main" id="{ABD8C12D-0590-401B-9810-3C70D06503BB}"/>
+                <a16:creationId xmlns:a16="http://schemas.microsoft.com/office/drawing/2014/main" xmlns="" id="{ABD8C12D-0590-401B-9810-3C70D06503BB}"/>
               </a:ext>
             </a:extLst>
           </p:cNvPr>
@@ -4581,7 +4697,15 @@
                   <a:schemeClr val="bg1"/>
                 </a:solidFill>
               </a:rPr>
-              <a:t>Person doing task:</a:t>
+              <a:t>Person doing task</a:t>
+            </a:r>
+            <a:r>
+              <a:rPr lang="en-US" sz="800" dirty="0" smtClean="0">
+                <a:solidFill>
+                  <a:schemeClr val="bg1"/>
+                </a:solidFill>
+              </a:rPr>
+              <a:t>: All</a:t>
             </a:r>
             <a:endParaRPr lang="en-US" dirty="0"/>
           </a:p>
@@ -4592,7 +4716,7 @@
           <p:cNvPr id="30" name="Rectangle 29">
             <a:extLst>
               <a:ext uri="{FF2B5EF4-FFF2-40B4-BE49-F238E27FC236}">
-                <a16:creationId xmlns:a16="http://schemas.microsoft.com/office/drawing/2014/main" id="{ABD8C12D-0590-401B-9810-3C70D06503BB}"/>
+                <a16:creationId xmlns:a16="http://schemas.microsoft.com/office/drawing/2014/main" xmlns="" id="{ABD8C12D-0590-401B-9810-3C70D06503BB}"/>
               </a:ext>
             </a:extLst>
           </p:cNvPr>
@@ -4601,7 +4725,7 @@
         </p:nvSpPr>
         <p:spPr>
           <a:xfrm>
-            <a:off x="5261752" y="2136153"/>
+            <a:off x="4711658" y="2794846"/>
             <a:ext cx="1093927" cy="499722"/>
           </a:xfrm>
           <a:prstGeom prst="rect">
@@ -4635,7 +4759,15 @@
                   <a:schemeClr val="bg1"/>
                 </a:solidFill>
               </a:rPr>
-              <a:t>Task #4 :</a:t>
+              <a:t>Task </a:t>
+            </a:r>
+            <a:r>
+              <a:rPr lang="en-US" sz="800" dirty="0" smtClean="0">
+                <a:solidFill>
+                  <a:schemeClr val="bg1"/>
+                </a:solidFill>
+              </a:rPr>
+              <a:t>#5 : Test</a:t>
             </a:r>
             <a:endParaRPr lang="en-US" dirty="0"/>
           </a:p>
@@ -4643,10 +4775,10 @@
       </p:sp>
       <p:sp>
         <p:nvSpPr>
-          <p:cNvPr id="32" name="Rectangle 31">
-            <a:extLst>
-              <a:ext uri="{FF2B5EF4-FFF2-40B4-BE49-F238E27FC236}">
-                <a16:creationId xmlns:a16="http://schemas.microsoft.com/office/drawing/2014/main" id="{ABD8C12D-0590-401B-9810-3C70D06503BB}"/>
+          <p:cNvPr id="27" name="Rectangle 26">
+            <a:extLst>
+              <a:ext uri="{FF2B5EF4-FFF2-40B4-BE49-F238E27FC236}">
+                <a16:creationId xmlns:a16="http://schemas.microsoft.com/office/drawing/2014/main" xmlns="" id="{A26B1B57-39F1-4784-BB8C-D498B044853A}"/>
               </a:ext>
             </a:extLst>
           </p:cNvPr>
@@ -4655,7 +4787,7 @@
         </p:nvSpPr>
         <p:spPr>
           <a:xfrm>
-            <a:off x="3983769" y="2763849"/>
+            <a:off x="5276561" y="4592271"/>
             <a:ext cx="1093927" cy="499722"/>
           </a:xfrm>
           <a:prstGeom prst="rect">
@@ -4689,7 +4821,201 @@
                   <a:schemeClr val="bg1"/>
                 </a:solidFill>
               </a:rPr>
-              <a:t>Task #5 :</a:t>
+              <a:t>Task </a:t>
+            </a:r>
+            <a:r>
+              <a:rPr lang="en-US" sz="800" dirty="0" smtClean="0">
+                <a:solidFill>
+                  <a:schemeClr val="bg1"/>
+                </a:solidFill>
+              </a:rPr>
+              <a:t>#4: Add code components to Level</a:t>
+            </a:r>
+            <a:endParaRPr lang="en-US" dirty="0"/>
+          </a:p>
+        </p:txBody>
+      </p:sp>
+      <p:sp>
+        <p:nvSpPr>
+          <p:cNvPr id="29" name="Rectangle 28">
+            <a:extLst>
+              <a:ext uri="{FF2B5EF4-FFF2-40B4-BE49-F238E27FC236}">
+                <a16:creationId xmlns:a16="http://schemas.microsoft.com/office/drawing/2014/main" xmlns="" id="{A26B1B57-39F1-4784-BB8C-D498B044853A}"/>
+              </a:ext>
+            </a:extLst>
+          </p:cNvPr>
+          <p:cNvSpPr/>
+          <p:nvPr/>
+        </p:nvSpPr>
+        <p:spPr>
+          <a:xfrm>
+            <a:off x="5270851" y="5258725"/>
+            <a:ext cx="1093927" cy="499722"/>
+          </a:xfrm>
+          <a:prstGeom prst="rect">
+            <a:avLst/>
+          </a:prstGeom>
+        </p:spPr>
+        <p:style>
+          <a:lnRef idx="2">
+            <a:schemeClr val="accent1">
+              <a:shade val="50000"/>
+            </a:schemeClr>
+          </a:lnRef>
+          <a:fillRef idx="1">
+            <a:schemeClr val="accent1"/>
+          </a:fillRef>
+          <a:effectRef idx="0">
+            <a:schemeClr val="accent1"/>
+          </a:effectRef>
+          <a:fontRef idx="minor">
+            <a:schemeClr val="lt1"/>
+          </a:fontRef>
+        </p:style>
+        <p:txBody>
+          <a:bodyPr rtlCol="0" anchor="ctr"/>
+          <a:lstStyle/>
+          <a:p>
+            <a:pPr algn="ctr"/>
+            <a:r>
+              <a:rPr lang="en-US" sz="800" dirty="0">
+                <a:solidFill>
+                  <a:schemeClr val="bg1"/>
+                </a:solidFill>
+              </a:rPr>
+              <a:t>Task </a:t>
+            </a:r>
+            <a:r>
+              <a:rPr lang="en-US" sz="800" dirty="0" smtClean="0">
+                <a:solidFill>
+                  <a:schemeClr val="bg1"/>
+                </a:solidFill>
+              </a:rPr>
+              <a:t>#6: Test</a:t>
+            </a:r>
+            <a:endParaRPr lang="en-US" dirty="0"/>
+          </a:p>
+        </p:txBody>
+      </p:sp>
+      <p:sp>
+        <p:nvSpPr>
+          <p:cNvPr id="31" name="Rectangle 30">
+            <a:extLst>
+              <a:ext uri="{FF2B5EF4-FFF2-40B4-BE49-F238E27FC236}">
+                <a16:creationId xmlns:a16="http://schemas.microsoft.com/office/drawing/2014/main" xmlns="" id="{ABD8C12D-0590-401B-9810-3C70D06503BB}"/>
+              </a:ext>
+            </a:extLst>
+          </p:cNvPr>
+          <p:cNvSpPr/>
+          <p:nvPr/>
+        </p:nvSpPr>
+        <p:spPr>
+          <a:xfrm>
+            <a:off x="5302033" y="2137000"/>
+            <a:ext cx="1093927" cy="499722"/>
+          </a:xfrm>
+          <a:prstGeom prst="rect">
+            <a:avLst/>
+          </a:prstGeom>
+        </p:spPr>
+        <p:style>
+          <a:lnRef idx="2">
+            <a:schemeClr val="accent1">
+              <a:shade val="50000"/>
+            </a:schemeClr>
+          </a:lnRef>
+          <a:fillRef idx="1">
+            <a:schemeClr val="accent1"/>
+          </a:fillRef>
+          <a:effectRef idx="0">
+            <a:schemeClr val="accent1"/>
+          </a:effectRef>
+          <a:fontRef idx="minor">
+            <a:schemeClr val="lt1"/>
+          </a:fontRef>
+        </p:style>
+        <p:txBody>
+          <a:bodyPr rtlCol="0" anchor="ctr"/>
+          <a:lstStyle/>
+          <a:p>
+            <a:pPr algn="ctr"/>
+            <a:r>
+              <a:rPr lang="en-US" sz="800" dirty="0">
+                <a:solidFill>
+                  <a:schemeClr val="bg1"/>
+                </a:solidFill>
+              </a:rPr>
+              <a:t>Task #4 </a:t>
+            </a:r>
+            <a:r>
+              <a:rPr lang="en-US" sz="800" dirty="0" smtClean="0">
+                <a:solidFill>
+                  <a:schemeClr val="bg1"/>
+                </a:solidFill>
+              </a:rPr>
+              <a:t>: Add audio</a:t>
+            </a:r>
+            <a:endParaRPr lang="en-US" dirty="0"/>
+          </a:p>
+        </p:txBody>
+      </p:sp>
+      <p:sp>
+        <p:nvSpPr>
+          <p:cNvPr id="33" name="Rectangle 32">
+            <a:extLst>
+              <a:ext uri="{FF2B5EF4-FFF2-40B4-BE49-F238E27FC236}">
+                <a16:creationId xmlns:a16="http://schemas.microsoft.com/office/drawing/2014/main" xmlns="" id="{ABD8C12D-0590-401B-9810-3C70D06503BB}"/>
+              </a:ext>
+            </a:extLst>
+          </p:cNvPr>
+          <p:cNvSpPr/>
+          <p:nvPr/>
+        </p:nvSpPr>
+        <p:spPr>
+          <a:xfrm>
+            <a:off x="3938269" y="5219967"/>
+            <a:ext cx="1093927" cy="499722"/>
+          </a:xfrm>
+          <a:prstGeom prst="rect">
+            <a:avLst/>
+          </a:prstGeom>
+        </p:spPr>
+        <p:style>
+          <a:lnRef idx="2">
+            <a:schemeClr val="accent1">
+              <a:shade val="50000"/>
+            </a:schemeClr>
+          </a:lnRef>
+          <a:fillRef idx="1">
+            <a:schemeClr val="accent1"/>
+          </a:fillRef>
+          <a:effectRef idx="0">
+            <a:schemeClr val="accent1"/>
+          </a:effectRef>
+          <a:fontRef idx="minor">
+            <a:schemeClr val="lt1"/>
+          </a:fontRef>
+        </p:style>
+        <p:txBody>
+          <a:bodyPr rtlCol="0" anchor="ctr"/>
+          <a:lstStyle/>
+          <a:p>
+            <a:pPr algn="ctr"/>
+            <a:r>
+              <a:rPr lang="en-US" sz="800" dirty="0">
+                <a:solidFill>
+                  <a:schemeClr val="bg1"/>
+                </a:solidFill>
+              </a:rPr>
+              <a:t>Task </a:t>
+            </a:r>
+            <a:r>
+              <a:rPr lang="en-US" sz="800" dirty="0" smtClean="0">
+                <a:solidFill>
+                  <a:schemeClr val="bg1"/>
+                </a:solidFill>
+              </a:rPr>
+              <a:t>#5 : Add audio</a:t>
             </a:r>
             <a:endParaRPr lang="en-US" dirty="0"/>
           </a:p>
@@ -4764,7 +5090,7 @@
           <p:cNvPr id="19" name="Rectangle 18">
             <a:extLst>
               <a:ext uri="{FF2B5EF4-FFF2-40B4-BE49-F238E27FC236}">
-                <a16:creationId xmlns:a16="http://schemas.microsoft.com/office/drawing/2014/main" id="{32D851B6-714A-4883-8D4E-754A7ED882BA}"/>
+                <a16:creationId xmlns:a16="http://schemas.microsoft.com/office/drawing/2014/main" xmlns="" id="{32D851B6-714A-4883-8D4E-754A7ED882BA}"/>
               </a:ext>
             </a:extLst>
           </p:cNvPr>
@@ -4810,7 +5136,7 @@
           <p:cNvPr id="21" name="Rectangle 20">
             <a:extLst>
               <a:ext uri="{FF2B5EF4-FFF2-40B4-BE49-F238E27FC236}">
-                <a16:creationId xmlns:a16="http://schemas.microsoft.com/office/drawing/2014/main" id="{B2FF60AC-91EF-4D69-ACB9-CC146BDC6526}"/>
+                <a16:creationId xmlns:a16="http://schemas.microsoft.com/office/drawing/2014/main" xmlns="" id="{B2FF60AC-91EF-4D69-ACB9-CC146BDC6526}"/>
               </a:ext>
             </a:extLst>
           </p:cNvPr>
@@ -4853,7 +5179,15 @@
                   <a:schemeClr val="bg1"/>
                 </a:solidFill>
               </a:rPr>
-              <a:t>Task #1:</a:t>
+              <a:t>Task #1</a:t>
+            </a:r>
+            <a:r>
+              <a:rPr lang="en-US" sz="800" dirty="0" smtClean="0">
+                <a:solidFill>
+                  <a:schemeClr val="bg1"/>
+                </a:solidFill>
+              </a:rPr>
+              <a:t>: Download Asset</a:t>
             </a:r>
             <a:endParaRPr lang="en-US" dirty="0"/>
           </a:p>
@@ -4864,7 +5198,7 @@
           <p:cNvPr id="23" name="Rectangle 22">
             <a:extLst>
               <a:ext uri="{FF2B5EF4-FFF2-40B4-BE49-F238E27FC236}">
-                <a16:creationId xmlns:a16="http://schemas.microsoft.com/office/drawing/2014/main" id="{F0CB5917-D9C5-4F78-B41A-F70D3EFFCF26}"/>
+                <a16:creationId xmlns:a16="http://schemas.microsoft.com/office/drawing/2014/main" xmlns="" id="{F0CB5917-D9C5-4F78-B41A-F70D3EFFCF26}"/>
               </a:ext>
             </a:extLst>
           </p:cNvPr>
@@ -4907,7 +5241,15 @@
                   <a:schemeClr val="bg1"/>
                 </a:solidFill>
               </a:rPr>
-              <a:t>Task #2:</a:t>
+              <a:t>Task #2</a:t>
+            </a:r>
+            <a:r>
+              <a:rPr lang="en-US" sz="800" dirty="0" smtClean="0">
+                <a:solidFill>
+                  <a:schemeClr val="bg1"/>
+                </a:solidFill>
+              </a:rPr>
+              <a:t>: Implement grabber method</a:t>
             </a:r>
             <a:endParaRPr lang="en-US" dirty="0"/>
           </a:p>
@@ -4918,7 +5260,7 @@
           <p:cNvPr id="25" name="Rectangle 24">
             <a:extLst>
               <a:ext uri="{FF2B5EF4-FFF2-40B4-BE49-F238E27FC236}">
-                <a16:creationId xmlns:a16="http://schemas.microsoft.com/office/drawing/2014/main" id="{A26B1B57-39F1-4784-BB8C-D498B044853A}"/>
+                <a16:creationId xmlns:a16="http://schemas.microsoft.com/office/drawing/2014/main" xmlns="" id="{A26B1B57-39F1-4784-BB8C-D498B044853A}"/>
               </a:ext>
             </a:extLst>
           </p:cNvPr>
@@ -4961,7 +5303,15 @@
                   <a:schemeClr val="bg1"/>
                 </a:solidFill>
               </a:rPr>
-              <a:t>Task #3:</a:t>
+              <a:t>Task #3</a:t>
+            </a:r>
+            <a:r>
+              <a:rPr lang="en-US" sz="800" dirty="0" smtClean="0">
+                <a:solidFill>
+                  <a:schemeClr val="bg1"/>
+                </a:solidFill>
+              </a:rPr>
+              <a:t>: Implement Block Method</a:t>
             </a:r>
             <a:endParaRPr lang="en-US" dirty="0"/>
           </a:p>
@@ -4972,7 +5322,7 @@
           <p:cNvPr id="4" name="TextBox 3">
             <a:extLst>
               <a:ext uri="{FF2B5EF4-FFF2-40B4-BE49-F238E27FC236}">
-                <a16:creationId xmlns:a16="http://schemas.microsoft.com/office/drawing/2014/main" id="{77AFE952-47A5-42E2-A2EC-FF7ABEA49A89}"/>
+                <a16:creationId xmlns:a16="http://schemas.microsoft.com/office/drawing/2014/main" xmlns="" id="{77AFE952-47A5-42E2-A2EC-FF7ABEA49A89}"/>
               </a:ext>
             </a:extLst>
           </p:cNvPr>
@@ -5015,7 +5365,7 @@
           <p:cNvPr id="5" name="TextBox 4">
             <a:extLst>
               <a:ext uri="{FF2B5EF4-FFF2-40B4-BE49-F238E27FC236}">
-                <a16:creationId xmlns:a16="http://schemas.microsoft.com/office/drawing/2014/main" id="{090298AF-3D44-4478-B386-6971E79EB79D}"/>
+                <a16:creationId xmlns:a16="http://schemas.microsoft.com/office/drawing/2014/main" xmlns="" id="{090298AF-3D44-4478-B386-6971E79EB79D}"/>
               </a:ext>
             </a:extLst>
           </p:cNvPr>
@@ -5050,7 +5400,7 @@
           <p:cNvPr id="6" name="Rectangle 5">
             <a:extLst>
               <a:ext uri="{FF2B5EF4-FFF2-40B4-BE49-F238E27FC236}">
-                <a16:creationId xmlns:a16="http://schemas.microsoft.com/office/drawing/2014/main" id="{B4931A1A-F246-44F6-A374-61C9F9C636E0}"/>
+                <a16:creationId xmlns:a16="http://schemas.microsoft.com/office/drawing/2014/main" xmlns="" id="{B4931A1A-F246-44F6-A374-61C9F9C636E0}"/>
               </a:ext>
             </a:extLst>
           </p:cNvPr>
@@ -5096,7 +5446,7 @@
           <p:cNvPr id="8" name="Table 7">
             <a:extLst>
               <a:ext uri="{FF2B5EF4-FFF2-40B4-BE49-F238E27FC236}">
-                <a16:creationId xmlns:a16="http://schemas.microsoft.com/office/drawing/2014/main" id="{216E663B-7C2E-4835-91C1-5C8FB8698420}"/>
+                <a16:creationId xmlns:a16="http://schemas.microsoft.com/office/drawing/2014/main" xmlns="" id="{216E663B-7C2E-4835-91C1-5C8FB8698420}"/>
               </a:ext>
             </a:extLst>
           </p:cNvPr>
@@ -5125,28 +5475,28 @@
                 <a:gridCol w="721889">
                   <a:extLst>
                     <a:ext uri="{9D8B030D-6E8A-4147-A177-3AD203B41FA5}">
-                      <a16:colId xmlns:a16="http://schemas.microsoft.com/office/drawing/2014/main" val="233666424"/>
+                      <a16:colId xmlns:a16="http://schemas.microsoft.com/office/drawing/2014/main" xmlns="" val="233666424"/>
                     </a:ext>
                   </a:extLst>
                 </a:gridCol>
                 <a:gridCol w="783522">
                   <a:extLst>
                     <a:ext uri="{9D8B030D-6E8A-4147-A177-3AD203B41FA5}">
-                      <a16:colId xmlns:a16="http://schemas.microsoft.com/office/drawing/2014/main" val="972059951"/>
+                      <a16:colId xmlns:a16="http://schemas.microsoft.com/office/drawing/2014/main" xmlns="" val="972059951"/>
                     </a:ext>
                   </a:extLst>
                 </a:gridCol>
                 <a:gridCol w="1049516">
                   <a:extLst>
                     <a:ext uri="{9D8B030D-6E8A-4147-A177-3AD203B41FA5}">
-                      <a16:colId xmlns:a16="http://schemas.microsoft.com/office/drawing/2014/main" val="2188007159"/>
+                      <a16:colId xmlns:a16="http://schemas.microsoft.com/office/drawing/2014/main" xmlns="" val="2188007159"/>
                     </a:ext>
                   </a:extLst>
                 </a:gridCol>
                 <a:gridCol w="899906">
                   <a:extLst>
                     <a:ext uri="{9D8B030D-6E8A-4147-A177-3AD203B41FA5}">
-                      <a16:colId xmlns:a16="http://schemas.microsoft.com/office/drawing/2014/main" val="3389346521"/>
+                      <a16:colId xmlns:a16="http://schemas.microsoft.com/office/drawing/2014/main" xmlns="" val="3389346521"/>
                     </a:ext>
                   </a:extLst>
                 </a:gridCol>
@@ -5246,7 +5596,7 @@
                 </a:tc>
                 <a:extLst>
                   <a:ext uri="{0D108BD9-81ED-4DB2-BD59-A6C34878D82A}">
-                    <a16:rowId xmlns:a16="http://schemas.microsoft.com/office/drawing/2014/main" val="300847090"/>
+                    <a16:rowId xmlns:a16="http://schemas.microsoft.com/office/drawing/2014/main" xmlns="" val="300847090"/>
                   </a:ext>
                 </a:extLst>
               </a:tr>
@@ -5259,7 +5609,7 @@
           <p:cNvPr id="9" name="Table 8">
             <a:extLst>
               <a:ext uri="{FF2B5EF4-FFF2-40B4-BE49-F238E27FC236}">
-                <a16:creationId xmlns:a16="http://schemas.microsoft.com/office/drawing/2014/main" id="{7488BC97-D05E-4727-B765-F9F045F12689}"/>
+                <a16:creationId xmlns:a16="http://schemas.microsoft.com/office/drawing/2014/main" xmlns="" id="{7488BC97-D05E-4727-B765-F9F045F12689}"/>
               </a:ext>
             </a:extLst>
           </p:cNvPr>
@@ -5269,7 +5619,7 @@
           <p:nvPr>
             <p:extLst>
               <p:ext uri="{D42A27DB-BD31-4B8C-83A1-F6EECF244321}">
-                <p14:modId xmlns:p14="http://schemas.microsoft.com/office/powerpoint/2010/main" val="3129811933"/>
+                <p14:modId xmlns:p14="http://schemas.microsoft.com/office/powerpoint/2010/main" val="1155441780"/>
               </p:ext>
             </p:extLst>
           </p:nvPr>
@@ -5288,28 +5638,28 @@
                 <a:gridCol w="721889">
                   <a:extLst>
                     <a:ext uri="{9D8B030D-6E8A-4147-A177-3AD203B41FA5}">
-                      <a16:colId xmlns:a16="http://schemas.microsoft.com/office/drawing/2014/main" val="3693118018"/>
+                      <a16:colId xmlns:a16="http://schemas.microsoft.com/office/drawing/2014/main" xmlns="" val="3693118018"/>
                     </a:ext>
                   </a:extLst>
                 </a:gridCol>
                 <a:gridCol w="783522">
                   <a:extLst>
                     <a:ext uri="{9D8B030D-6E8A-4147-A177-3AD203B41FA5}">
-                      <a16:colId xmlns:a16="http://schemas.microsoft.com/office/drawing/2014/main" val="952852968"/>
+                      <a16:colId xmlns:a16="http://schemas.microsoft.com/office/drawing/2014/main" xmlns="" val="952852968"/>
                     </a:ext>
                   </a:extLst>
                 </a:gridCol>
                 <a:gridCol w="1015871">
                   <a:extLst>
                     <a:ext uri="{9D8B030D-6E8A-4147-A177-3AD203B41FA5}">
-                      <a16:colId xmlns:a16="http://schemas.microsoft.com/office/drawing/2014/main" val="1816747115"/>
+                      <a16:colId xmlns:a16="http://schemas.microsoft.com/office/drawing/2014/main" xmlns="" val="1816747115"/>
                     </a:ext>
                   </a:extLst>
                 </a:gridCol>
                 <a:gridCol w="933551">
                   <a:extLst>
                     <a:ext uri="{9D8B030D-6E8A-4147-A177-3AD203B41FA5}">
-                      <a16:colId xmlns:a16="http://schemas.microsoft.com/office/drawing/2014/main" val="55182559"/>
+                      <a16:colId xmlns:a16="http://schemas.microsoft.com/office/drawing/2014/main" xmlns="" val="55182559"/>
                     </a:ext>
                   </a:extLst>
                 </a:gridCol>
@@ -5322,161 +5672,12 @@
                     <a:p>
                       <a:pPr algn="l" fontAlgn="ctr"/>
                       <a:r>
-                        <a:rPr lang="en-US" sz="800" b="0" i="0" u="none" strike="noStrike" dirty="0">
+                        <a:rPr lang="en-US" sz="800" b="0" i="0" u="none" strike="noStrike" dirty="0" smtClean="0">
                           <a:solidFill>
-                            <a:schemeClr val="dk1"/>
+                            <a:srgbClr val="000000"/>
                           </a:solidFill>
                           <a:effectLst/>
-                          <a:latin typeface="+mn-lt"/>
-                        </a:rPr>
-                        <a:t>5</a:t>
-                      </a:r>
-                      <a:endParaRPr lang="en-US" sz="800" b="0" i="0" u="none" strike="noStrike" dirty="0">
-                        <a:solidFill>
-                          <a:srgbClr val="000000"/>
-                        </a:solidFill>
-                        <a:effectLst/>
-                        <a:latin typeface="Century Gothic" panose="020B0502020202020204" pitchFamily="34" charset="0"/>
-                      </a:endParaRPr>
-                    </a:p>
-                  </a:txBody>
-                  <a:tcPr marL="76053" marR="5070" marT="5070" marB="0" anchor="ctr"/>
-                </a:tc>
-                <a:tc>
-                  <a:txBody>
-                    <a:bodyPr/>
-                    <a:lstStyle/>
-                    <a:p>
-                      <a:pPr algn="l" fontAlgn="ctr"/>
-                      <a:endParaRPr lang="en-US" sz="800" b="0" i="0" u="none" strike="noStrike" dirty="0">
-                        <a:solidFill>
-                          <a:srgbClr val="000000"/>
-                        </a:solidFill>
-                        <a:effectLst/>
-                        <a:latin typeface="Century Gothic" panose="020B0502020202020204" pitchFamily="34" charset="0"/>
-                      </a:endParaRPr>
-                    </a:p>
-                  </a:txBody>
-                  <a:tcPr marL="76053" marR="5070" marT="5070" marB="0" anchor="ctr"/>
-                </a:tc>
-                <a:tc>
-                  <a:txBody>
-                    <a:bodyPr/>
-                    <a:lstStyle/>
-                    <a:p>
-                      <a:pPr algn="l" fontAlgn="ctr"/>
-                      <a:endParaRPr lang="en-US" sz="800" b="0" i="0" u="none" strike="noStrike" dirty="0">
-                        <a:solidFill>
-                          <a:srgbClr val="000000"/>
-                        </a:solidFill>
-                        <a:effectLst/>
-                        <a:latin typeface="Century Gothic" panose="020B0502020202020204" pitchFamily="34" charset="0"/>
-                      </a:endParaRPr>
-                    </a:p>
-                  </a:txBody>
-                  <a:tcPr marL="76053" marR="5070" marT="5070" marB="0" anchor="ctr"/>
-                </a:tc>
-                <a:tc>
-                  <a:txBody>
-                    <a:bodyPr/>
-                    <a:lstStyle/>
-                    <a:p>
-                      <a:pPr algn="l" fontAlgn="ctr"/>
-                      <a:endParaRPr lang="en-US" sz="800" b="0" i="0" u="none" strike="noStrike" dirty="0">
-                        <a:solidFill>
-                          <a:srgbClr val="000000"/>
-                        </a:solidFill>
-                        <a:effectLst/>
-                        <a:latin typeface="Century Gothic" panose="020B0502020202020204" pitchFamily="34" charset="0"/>
-                      </a:endParaRPr>
-                    </a:p>
-                  </a:txBody>
-                  <a:tcPr marL="5070" marR="5070" marT="5070" marB="0" anchor="ctr"/>
-                </a:tc>
-                <a:extLst>
-                  <a:ext uri="{0D108BD9-81ED-4DB2-BD59-A6C34878D82A}">
-                    <a16:rowId xmlns:a16="http://schemas.microsoft.com/office/drawing/2014/main" val="2287119280"/>
-                  </a:ext>
-                </a:extLst>
-              </a:tr>
-            </a:tbl>
-          </a:graphicData>
-        </a:graphic>
-      </p:graphicFrame>
-      <p:graphicFrame>
-        <p:nvGraphicFramePr>
-          <p:cNvPr id="10" name="Table 9">
-            <a:extLst>
-              <a:ext uri="{FF2B5EF4-FFF2-40B4-BE49-F238E27FC236}">
-                <a16:creationId xmlns:a16="http://schemas.microsoft.com/office/drawing/2014/main" id="{8B53D829-A13C-4105-BD19-80750650E577}"/>
-              </a:ext>
-            </a:extLst>
-          </p:cNvPr>
-          <p:cNvGraphicFramePr>
-            <a:graphicFrameLocks noGrp="1"/>
-          </p:cNvGraphicFramePr>
-          <p:nvPr>
-            <p:extLst>
-              <p:ext uri="{D42A27DB-BD31-4B8C-83A1-F6EECF244321}">
-                <p14:modId xmlns:p14="http://schemas.microsoft.com/office/powerpoint/2010/main" val="1994075403"/>
-              </p:ext>
-            </p:extLst>
-          </p:nvPr>
-        </p:nvGraphicFramePr>
-        <p:xfrm>
-          <a:off x="109776" y="1970800"/>
-          <a:ext cx="3454833" cy="213290"/>
-        </p:xfrm>
-        <a:graphic>
-          <a:graphicData uri="http://schemas.openxmlformats.org/drawingml/2006/table">
-            <a:tbl>
-              <a:tblPr>
-                <a:tableStyleId>{5C22544A-7EE6-4342-B048-85BDC9FD1C3A}</a:tableStyleId>
-              </a:tblPr>
-              <a:tblGrid>
-                <a:gridCol w="721889">
-                  <a:extLst>
-                    <a:ext uri="{9D8B030D-6E8A-4147-A177-3AD203B41FA5}">
-                      <a16:colId xmlns:a16="http://schemas.microsoft.com/office/drawing/2014/main" val="1464581443"/>
-                    </a:ext>
-                  </a:extLst>
-                </a:gridCol>
-                <a:gridCol w="783522">
-                  <a:extLst>
-                    <a:ext uri="{9D8B030D-6E8A-4147-A177-3AD203B41FA5}">
-                      <a16:colId xmlns:a16="http://schemas.microsoft.com/office/drawing/2014/main" val="3127435560"/>
-                    </a:ext>
-                  </a:extLst>
-                </a:gridCol>
-                <a:gridCol w="1049516">
-                  <a:extLst>
-                    <a:ext uri="{9D8B030D-6E8A-4147-A177-3AD203B41FA5}">
-                      <a16:colId xmlns:a16="http://schemas.microsoft.com/office/drawing/2014/main" val="2161992991"/>
-                    </a:ext>
-                  </a:extLst>
-                </a:gridCol>
-                <a:gridCol w="899906">
-                  <a:extLst>
-                    <a:ext uri="{9D8B030D-6E8A-4147-A177-3AD203B41FA5}">
-                      <a16:colId xmlns:a16="http://schemas.microsoft.com/office/drawing/2014/main" val="732979080"/>
-                    </a:ext>
-                  </a:extLst>
-                </a:gridCol>
-              </a:tblGrid>
-              <a:tr h="213290">
-                <a:tc>
-                  <a:txBody>
-                    <a:bodyPr/>
-                    <a:lstStyle/>
-                    <a:p>
-                      <a:pPr algn="l" fontAlgn="ctr"/>
-                      <a:r>
-                        <a:rPr lang="en-US" sz="800" b="0" i="0" u="none" strike="noStrike" dirty="0">
-                          <a:solidFill>
-                            <a:schemeClr val="dk1"/>
-                          </a:solidFill>
-                          <a:effectLst/>
-                          <a:latin typeface="+mn-lt"/>
+                          <a:latin typeface="Century Gothic" panose="020B0502020202020204" pitchFamily="34" charset="0"/>
                         </a:rPr>
                         <a:t>4</a:t>
                       </a:r>
@@ -5497,6 +5698,16 @@
                     <a:lstStyle/>
                     <a:p>
                       <a:pPr algn="l" fontAlgn="ctr"/>
+                      <a:r>
+                        <a:rPr lang="en-US" sz="800" b="0" i="0" u="none" strike="noStrike" dirty="0" smtClean="0">
+                          <a:solidFill>
+                            <a:srgbClr val="000000"/>
+                          </a:solidFill>
+                          <a:effectLst/>
+                          <a:latin typeface="Century Gothic" panose="020B0502020202020204" pitchFamily="34" charset="0"/>
+                        </a:rPr>
+                        <a:t>Product Owner</a:t>
+                      </a:r>
                       <a:endParaRPr lang="en-US" sz="800" b="0" i="0" u="none" strike="noStrike" dirty="0">
                         <a:solidFill>
                           <a:srgbClr val="000000"/>
@@ -5514,6 +5725,16 @@
                     <a:lstStyle/>
                     <a:p>
                       <a:pPr algn="l" fontAlgn="ctr"/>
+                      <a:r>
+                        <a:rPr lang="en-US" sz="800" b="0" i="0" u="none" strike="noStrike" dirty="0" smtClean="0">
+                          <a:solidFill>
+                            <a:srgbClr val="000000"/>
+                          </a:solidFill>
+                          <a:effectLst/>
+                          <a:latin typeface="Century Gothic" panose="020B0502020202020204" pitchFamily="34" charset="0"/>
+                        </a:rPr>
+                        <a:t>shield pick up feature </a:t>
+                      </a:r>
                       <a:endParaRPr lang="en-US" sz="800" b="0" i="0" u="none" strike="noStrike" dirty="0">
                         <a:solidFill>
                           <a:srgbClr val="000000"/>
@@ -5531,6 +5752,26 @@
                     <a:lstStyle/>
                     <a:p>
                       <a:pPr algn="l" fontAlgn="ctr"/>
+                      <a:r>
+                        <a:rPr lang="en-US" sz="800" b="0" i="0" u="none" strike="noStrike" dirty="0" smtClean="0">
+                          <a:solidFill>
+                            <a:srgbClr val="000000"/>
+                          </a:solidFill>
+                          <a:effectLst/>
+                          <a:latin typeface="Century Gothic" panose="020B0502020202020204" pitchFamily="34" charset="0"/>
+                        </a:rPr>
+                        <a:t>Nice</a:t>
+                      </a:r>
+                      <a:r>
+                        <a:rPr lang="en-US" sz="800" b="0" i="0" u="none" strike="noStrike" baseline="0" dirty="0" smtClean="0">
+                          <a:solidFill>
+                            <a:srgbClr val="000000"/>
+                          </a:solidFill>
+                          <a:effectLst/>
+                          <a:latin typeface="Century Gothic" panose="020B0502020202020204" pitchFamily="34" charset="0"/>
+                        </a:rPr>
+                        <a:t> to have</a:t>
+                      </a:r>
                       <a:endParaRPr lang="en-US" sz="800" b="0" i="0" u="none" strike="noStrike" dirty="0">
                         <a:solidFill>
                           <a:srgbClr val="000000"/>
@@ -5544,7 +5785,7 @@
                 </a:tc>
                 <a:extLst>
                   <a:ext uri="{0D108BD9-81ED-4DB2-BD59-A6C34878D82A}">
-                    <a16:rowId xmlns:a16="http://schemas.microsoft.com/office/drawing/2014/main" val="2949352622"/>
+                    <a16:rowId xmlns:a16="http://schemas.microsoft.com/office/drawing/2014/main" xmlns="" val="2287119280"/>
                   </a:ext>
                 </a:extLst>
               </a:tr>
@@ -5552,66 +5793,191 @@
           </a:graphicData>
         </a:graphic>
       </p:graphicFrame>
-      <p:sp>
-        <p:nvSpPr>
-          <p:cNvPr id="13" name="Rectangle 12">
-            <a:extLst>
-              <a:ext uri="{FF2B5EF4-FFF2-40B4-BE49-F238E27FC236}">
-                <a16:creationId xmlns:a16="http://schemas.microsoft.com/office/drawing/2014/main" id="{88911F9B-762D-4D9D-8D59-8C7C40A1A285}"/>
-              </a:ext>
-            </a:extLst>
-          </p:cNvPr>
-          <p:cNvSpPr/>
-          <p:nvPr/>
-        </p:nvSpPr>
-        <p:spPr>
-          <a:xfrm>
-            <a:off x="4008987" y="1452648"/>
-            <a:ext cx="1093927" cy="499722"/>
-          </a:xfrm>
-          <a:prstGeom prst="rect">
-            <a:avLst/>
-          </a:prstGeom>
-        </p:spPr>
-        <p:style>
-          <a:lnRef idx="2">
-            <a:schemeClr val="accent1">
-              <a:shade val="50000"/>
-            </a:schemeClr>
-          </a:lnRef>
-          <a:fillRef idx="1">
-            <a:schemeClr val="accent1"/>
-          </a:fillRef>
-          <a:effectRef idx="0">
-            <a:schemeClr val="accent1"/>
-          </a:effectRef>
-          <a:fontRef idx="minor">
-            <a:schemeClr val="lt1"/>
-          </a:fontRef>
-        </p:style>
-        <p:txBody>
-          <a:bodyPr rtlCol="0" anchor="ctr"/>
-          <a:lstStyle/>
-          <a:p>
-            <a:pPr algn="ctr"/>
-            <a:r>
-              <a:rPr lang="en-US" sz="800" dirty="0">
-                <a:solidFill>
-                  <a:schemeClr val="bg1"/>
-                </a:solidFill>
-              </a:rPr>
-              <a:t>Task #1:Design Level on paper</a:t>
-            </a:r>
-            <a:endParaRPr lang="en-US" dirty="0"/>
-          </a:p>
-        </p:txBody>
-      </p:sp>
+      <p:graphicFrame>
+        <p:nvGraphicFramePr>
+          <p:cNvPr id="10" name="Table 9">
+            <a:extLst>
+              <a:ext uri="{FF2B5EF4-FFF2-40B4-BE49-F238E27FC236}">
+                <a16:creationId xmlns:a16="http://schemas.microsoft.com/office/drawing/2014/main" xmlns="" id="{8B53D829-A13C-4105-BD19-80750650E577}"/>
+              </a:ext>
+            </a:extLst>
+          </p:cNvPr>
+          <p:cNvGraphicFramePr>
+            <a:graphicFrameLocks noGrp="1"/>
+          </p:cNvGraphicFramePr>
+          <p:nvPr>
+            <p:extLst>
+              <p:ext uri="{D42A27DB-BD31-4B8C-83A1-F6EECF244321}">
+                <p14:modId xmlns:p14="http://schemas.microsoft.com/office/powerpoint/2010/main" val="3102241257"/>
+              </p:ext>
+            </p:extLst>
+          </p:nvPr>
+        </p:nvGraphicFramePr>
+        <p:xfrm>
+          <a:off x="109776" y="1970800"/>
+          <a:ext cx="3454833" cy="248910"/>
+        </p:xfrm>
+        <a:graphic>
+          <a:graphicData uri="http://schemas.openxmlformats.org/drawingml/2006/table">
+            <a:tbl>
+              <a:tblPr>
+                <a:tableStyleId>{5C22544A-7EE6-4342-B048-85BDC9FD1C3A}</a:tableStyleId>
+              </a:tblPr>
+              <a:tblGrid>
+                <a:gridCol w="721889">
+                  <a:extLst>
+                    <a:ext uri="{9D8B030D-6E8A-4147-A177-3AD203B41FA5}">
+                      <a16:colId xmlns:a16="http://schemas.microsoft.com/office/drawing/2014/main" xmlns="" val="1464581443"/>
+                    </a:ext>
+                  </a:extLst>
+                </a:gridCol>
+                <a:gridCol w="783522">
+                  <a:extLst>
+                    <a:ext uri="{9D8B030D-6E8A-4147-A177-3AD203B41FA5}">
+                      <a16:colId xmlns:a16="http://schemas.microsoft.com/office/drawing/2014/main" xmlns="" val="3127435560"/>
+                    </a:ext>
+                  </a:extLst>
+                </a:gridCol>
+                <a:gridCol w="1049516">
+                  <a:extLst>
+                    <a:ext uri="{9D8B030D-6E8A-4147-A177-3AD203B41FA5}">
+                      <a16:colId xmlns:a16="http://schemas.microsoft.com/office/drawing/2014/main" xmlns="" val="2161992991"/>
+                    </a:ext>
+                  </a:extLst>
+                </a:gridCol>
+                <a:gridCol w="899906">
+                  <a:extLst>
+                    <a:ext uri="{9D8B030D-6E8A-4147-A177-3AD203B41FA5}">
+                      <a16:colId xmlns:a16="http://schemas.microsoft.com/office/drawing/2014/main" xmlns="" val="732979080"/>
+                    </a:ext>
+                  </a:extLst>
+                </a:gridCol>
+              </a:tblGrid>
+              <a:tr h="213290">
+                <a:tc>
+                  <a:txBody>
+                    <a:bodyPr/>
+                    <a:lstStyle/>
+                    <a:p>
+                      <a:pPr algn="l" fontAlgn="ctr"/>
+                      <a:r>
+                        <a:rPr lang="en-US" sz="800" b="0" i="0" u="none" strike="noStrike" dirty="0">
+                          <a:solidFill>
+                            <a:schemeClr val="dk1"/>
+                          </a:solidFill>
+                          <a:effectLst/>
+                          <a:latin typeface="+mn-lt"/>
+                        </a:rPr>
+                        <a:t>3</a:t>
+                      </a:r>
+                      <a:endParaRPr lang="en-US" sz="800" b="0" i="0" u="none" strike="noStrike" dirty="0">
+                        <a:solidFill>
+                          <a:srgbClr val="000000"/>
+                        </a:solidFill>
+                        <a:effectLst/>
+                        <a:latin typeface="Century Gothic" panose="020B0502020202020204" pitchFamily="34" charset="0"/>
+                      </a:endParaRPr>
+                    </a:p>
+                  </a:txBody>
+                  <a:tcPr marL="76053" marR="5070" marT="5070" marB="0" anchor="ctr"/>
+                </a:tc>
+                <a:tc>
+                  <a:txBody>
+                    <a:bodyPr/>
+                    <a:lstStyle/>
+                    <a:p>
+                      <a:pPr algn="l" fontAlgn="ctr"/>
+                      <a:r>
+                        <a:rPr lang="en-US" sz="800" b="0" i="0" u="none" strike="noStrike" dirty="0" smtClean="0">
+                          <a:solidFill>
+                            <a:srgbClr val="000000"/>
+                          </a:solidFill>
+                          <a:effectLst/>
+                          <a:latin typeface="Century Gothic" panose="020B0502020202020204" pitchFamily="34" charset="0"/>
+                        </a:rPr>
+                        <a:t>Product Owner</a:t>
+                      </a:r>
+                      <a:endParaRPr lang="en-US" sz="800" b="0" i="0" u="none" strike="noStrike" dirty="0">
+                        <a:solidFill>
+                          <a:srgbClr val="000000"/>
+                        </a:solidFill>
+                        <a:effectLst/>
+                        <a:latin typeface="Century Gothic" panose="020B0502020202020204" pitchFamily="34" charset="0"/>
+                      </a:endParaRPr>
+                    </a:p>
+                  </a:txBody>
+                  <a:tcPr marL="76053" marR="5070" marT="5070" marB="0" anchor="ctr"/>
+                </a:tc>
+                <a:tc>
+                  <a:txBody>
+                    <a:bodyPr/>
+                    <a:lstStyle/>
+                    <a:p>
+                      <a:pPr algn="l" fontAlgn="ctr"/>
+                      <a:r>
+                        <a:rPr lang="en-US" sz="800" b="0" i="0" u="none" strike="noStrike" dirty="0" smtClean="0">
+                          <a:solidFill>
+                            <a:srgbClr val="000000"/>
+                          </a:solidFill>
+                          <a:effectLst/>
+                          <a:latin typeface="Century Gothic" panose="020B0502020202020204" pitchFamily="34" charset="0"/>
+                        </a:rPr>
+                        <a:t>Have additional enemy tanks </a:t>
+                      </a:r>
+                      <a:endParaRPr lang="en-US" sz="800" b="0" i="0" u="none" strike="noStrike" dirty="0">
+                        <a:solidFill>
+                          <a:srgbClr val="000000"/>
+                        </a:solidFill>
+                        <a:effectLst/>
+                        <a:latin typeface="Century Gothic" panose="020B0502020202020204" pitchFamily="34" charset="0"/>
+                      </a:endParaRPr>
+                    </a:p>
+                  </a:txBody>
+                  <a:tcPr marL="76053" marR="5070" marT="5070" marB="0" anchor="ctr"/>
+                </a:tc>
+                <a:tc>
+                  <a:txBody>
+                    <a:bodyPr/>
+                    <a:lstStyle/>
+                    <a:p>
+                      <a:pPr algn="l" fontAlgn="ctr"/>
+                      <a:r>
+                        <a:rPr lang="en-US" sz="800" b="0" i="0" u="none" strike="noStrike" dirty="0" smtClean="0">
+                          <a:solidFill>
+                            <a:srgbClr val="000000"/>
+                          </a:solidFill>
+                          <a:effectLst/>
+                          <a:latin typeface="Century Gothic" panose="020B0502020202020204" pitchFamily="34" charset="0"/>
+                        </a:rPr>
+                        <a:t>Should have</a:t>
+                      </a:r>
+                      <a:endParaRPr lang="en-US" sz="800" b="0" i="0" u="none" strike="noStrike" dirty="0">
+                        <a:solidFill>
+                          <a:srgbClr val="000000"/>
+                        </a:solidFill>
+                        <a:effectLst/>
+                        <a:latin typeface="Century Gothic" panose="020B0502020202020204" pitchFamily="34" charset="0"/>
+                      </a:endParaRPr>
+                    </a:p>
+                  </a:txBody>
+                  <a:tcPr marL="5070" marR="5070" marT="5070" marB="0" anchor="ctr"/>
+                </a:tc>
+                <a:extLst>
+                  <a:ext uri="{0D108BD9-81ED-4DB2-BD59-A6C34878D82A}">
+                    <a16:rowId xmlns:a16="http://schemas.microsoft.com/office/drawing/2014/main" xmlns="" val="2949352622"/>
+                  </a:ext>
+                </a:extLst>
+              </a:tr>
+            </a:tbl>
+          </a:graphicData>
+        </a:graphic>
+      </p:graphicFrame>
       <p:sp>
         <p:nvSpPr>
           <p:cNvPr id="15" name="Rectangle 14">
             <a:extLst>
               <a:ext uri="{FF2B5EF4-FFF2-40B4-BE49-F238E27FC236}">
-                <a16:creationId xmlns:a16="http://schemas.microsoft.com/office/drawing/2014/main" id="{8899DA91-943D-48DA-AAB3-0895C2AAF047}"/>
+                <a16:creationId xmlns:a16="http://schemas.microsoft.com/office/drawing/2014/main" xmlns="" id="{8899DA91-943D-48DA-AAB3-0895C2AAF047}"/>
               </a:ext>
             </a:extLst>
           </p:cNvPr>
@@ -5654,7 +6020,15 @@
                   <a:schemeClr val="bg1"/>
                 </a:solidFill>
               </a:rPr>
-              <a:t>Task #2: Build landscape</a:t>
+              <a:t>Task #2: </a:t>
+            </a:r>
+            <a:r>
+              <a:rPr lang="en-US" sz="800" dirty="0" smtClean="0">
+                <a:solidFill>
+                  <a:schemeClr val="bg1"/>
+                </a:solidFill>
+              </a:rPr>
+              <a:t>Attach code</a:t>
             </a:r>
             <a:endParaRPr lang="en-US" dirty="0"/>
           </a:p>
@@ -5665,7 +6039,7 @@
           <p:cNvPr id="17" name="Rectangle 16">
             <a:extLst>
               <a:ext uri="{FF2B5EF4-FFF2-40B4-BE49-F238E27FC236}">
-                <a16:creationId xmlns:a16="http://schemas.microsoft.com/office/drawing/2014/main" id="{ABD8C12D-0590-401B-9810-3C70D06503BB}"/>
+                <a16:creationId xmlns:a16="http://schemas.microsoft.com/office/drawing/2014/main" xmlns="" id="{ABD8C12D-0590-401B-9810-3C70D06503BB}"/>
               </a:ext>
             </a:extLst>
           </p:cNvPr>
@@ -5674,7 +6048,7 @@
         </p:nvSpPr>
         <p:spPr>
           <a:xfrm>
-            <a:off x="5236537" y="2080344"/>
+            <a:off x="3993384" y="2103856"/>
             <a:ext cx="1093927" cy="499722"/>
           </a:xfrm>
           <a:prstGeom prst="rect">
@@ -5708,7 +6082,15 @@
                   <a:schemeClr val="bg1"/>
                 </a:solidFill>
               </a:rPr>
-              <a:t>Task #4 : Design Level in Unreal</a:t>
+              <a:t>Task </a:t>
+            </a:r>
+            <a:r>
+              <a:rPr lang="en-US" sz="800" dirty="0" smtClean="0">
+                <a:solidFill>
+                  <a:schemeClr val="bg1"/>
+                </a:solidFill>
+              </a:rPr>
+              <a:t>#3 : Behavior tree for movement</a:t>
             </a:r>
             <a:endParaRPr lang="en-US" dirty="0"/>
           </a:p>
@@ -5719,7 +6101,7 @@
           <p:cNvPr id="35" name="Straight Connector 34">
             <a:extLst>
               <a:ext uri="{FF2B5EF4-FFF2-40B4-BE49-F238E27FC236}">
-                <a16:creationId xmlns:a16="http://schemas.microsoft.com/office/drawing/2014/main" id="{B6A3EA80-60C5-4431-980D-80005D3FE9D3}"/>
+                <a16:creationId xmlns:a16="http://schemas.microsoft.com/office/drawing/2014/main" xmlns="" id="{B6A3EA80-60C5-4431-980D-80005D3FE9D3}"/>
               </a:ext>
             </a:extLst>
           </p:cNvPr>
@@ -5761,7 +6143,7 @@
           <p:cNvPr id="36" name="Straight Connector 35">
             <a:extLst>
               <a:ext uri="{FF2B5EF4-FFF2-40B4-BE49-F238E27FC236}">
-                <a16:creationId xmlns:a16="http://schemas.microsoft.com/office/drawing/2014/main" id="{82BD31D8-AEB2-4A38-A420-A825020DD77E}"/>
+                <a16:creationId xmlns:a16="http://schemas.microsoft.com/office/drawing/2014/main" xmlns="" id="{82BD31D8-AEB2-4A38-A420-A825020DD77E}"/>
               </a:ext>
             </a:extLst>
           </p:cNvPr>
@@ -5803,7 +6185,7 @@
           <p:cNvPr id="37" name="Straight Connector 36">
             <a:extLst>
               <a:ext uri="{FF2B5EF4-FFF2-40B4-BE49-F238E27FC236}">
-                <a16:creationId xmlns:a16="http://schemas.microsoft.com/office/drawing/2014/main" id="{7DE8383F-8BE6-4377-8AA9-3A3873DC3067}"/>
+                <a16:creationId xmlns:a16="http://schemas.microsoft.com/office/drawing/2014/main" xmlns="" id="{7DE8383F-8BE6-4377-8AA9-3A3873DC3067}"/>
               </a:ext>
             </a:extLst>
           </p:cNvPr>
@@ -5845,7 +6227,7 @@
           <p:cNvPr id="39" name="TextBox 38">
             <a:extLst>
               <a:ext uri="{FF2B5EF4-FFF2-40B4-BE49-F238E27FC236}">
-                <a16:creationId xmlns:a16="http://schemas.microsoft.com/office/drawing/2014/main" id="{77DACC8D-3953-4CF9-A052-552278EA3516}"/>
+                <a16:creationId xmlns:a16="http://schemas.microsoft.com/office/drawing/2014/main" xmlns="" id="{77DACC8D-3953-4CF9-A052-552278EA3516}"/>
               </a:ext>
             </a:extLst>
           </p:cNvPr>
@@ -5890,7 +6272,7 @@
           <p:cNvPr id="24" name="Rectangle 23">
             <a:extLst>
               <a:ext uri="{FF2B5EF4-FFF2-40B4-BE49-F238E27FC236}">
-                <a16:creationId xmlns:a16="http://schemas.microsoft.com/office/drawing/2014/main" id="{A26B1B57-39F1-4784-BB8C-D498B044853A}"/>
+                <a16:creationId xmlns:a16="http://schemas.microsoft.com/office/drawing/2014/main" xmlns="" id="{A26B1B57-39F1-4784-BB8C-D498B044853A}"/>
               </a:ext>
             </a:extLst>
           </p:cNvPr>
@@ -5933,7 +6315,15 @@
                   <a:schemeClr val="bg1"/>
                 </a:solidFill>
               </a:rPr>
-              <a:t>Task #4:</a:t>
+              <a:t>Task #4</a:t>
+            </a:r>
+            <a:r>
+              <a:rPr lang="en-US" sz="800" dirty="0" smtClean="0">
+                <a:solidFill>
+                  <a:schemeClr val="bg1"/>
+                </a:solidFill>
+              </a:rPr>
+              <a:t>: Add code to level</a:t>
             </a:r>
             <a:endParaRPr lang="en-US" dirty="0"/>
           </a:p>
@@ -5944,7 +6334,7 @@
           <p:cNvPr id="26" name="Rectangle 25">
             <a:extLst>
               <a:ext uri="{FF2B5EF4-FFF2-40B4-BE49-F238E27FC236}">
-                <a16:creationId xmlns:a16="http://schemas.microsoft.com/office/drawing/2014/main" id="{ABD8C12D-0590-401B-9810-3C70D06503BB}"/>
+                <a16:creationId xmlns:a16="http://schemas.microsoft.com/office/drawing/2014/main" xmlns="" id="{ABD8C12D-0590-401B-9810-3C70D06503BB}"/>
               </a:ext>
             </a:extLst>
           </p:cNvPr>
@@ -5953,7 +6343,7 @@
         </p:nvSpPr>
         <p:spPr>
           <a:xfrm>
-            <a:off x="4008987" y="2736635"/>
+            <a:off x="4687583" y="2754936"/>
             <a:ext cx="1093927" cy="499722"/>
           </a:xfrm>
           <a:prstGeom prst="rect">
@@ -5987,7 +6377,31 @@
                   <a:schemeClr val="bg1"/>
                 </a:solidFill>
               </a:rPr>
-              <a:t>Task #5: Insert Traps</a:t>
+              <a:t>Task </a:t>
+            </a:r>
+            <a:r>
+              <a:rPr lang="en-US" sz="800" dirty="0" smtClean="0">
+                <a:solidFill>
+                  <a:schemeClr val="bg1"/>
+                </a:solidFill>
+              </a:rPr>
+              <a:t>#</a:t>
+            </a:r>
+            <a:r>
+              <a:rPr lang="en-US" sz="800" dirty="0">
+                <a:solidFill>
+                  <a:schemeClr val="bg1"/>
+                </a:solidFill>
+              </a:rPr>
+              <a:t>5</a:t>
+            </a:r>
+            <a:r>
+              <a:rPr lang="en-US" sz="800" dirty="0" smtClean="0">
+                <a:solidFill>
+                  <a:schemeClr val="bg1"/>
+                </a:solidFill>
+              </a:rPr>
+              <a:t>: Test</a:t>
             </a:r>
             <a:endParaRPr lang="en-US" dirty="0"/>
           </a:p>
@@ -5998,7 +6412,7 @@
           <p:cNvPr id="28" name="Rectangle 27">
             <a:extLst>
               <a:ext uri="{FF2B5EF4-FFF2-40B4-BE49-F238E27FC236}">
-                <a16:creationId xmlns:a16="http://schemas.microsoft.com/office/drawing/2014/main" id="{ABD8C12D-0590-401B-9810-3C70D06503BB}"/>
+                <a16:creationId xmlns:a16="http://schemas.microsoft.com/office/drawing/2014/main" xmlns="" id="{ABD8C12D-0590-401B-9810-3C70D06503BB}"/>
               </a:ext>
             </a:extLst>
           </p:cNvPr>
@@ -6007,7 +6421,7 @@
         </p:nvSpPr>
         <p:spPr>
           <a:xfrm>
-            <a:off x="5236537" y="2736635"/>
+            <a:off x="5236212" y="2103792"/>
             <a:ext cx="1093927" cy="499722"/>
           </a:xfrm>
           <a:prstGeom prst="rect">
@@ -6041,7 +6455,23 @@
                   <a:schemeClr val="bg1"/>
                 </a:solidFill>
               </a:rPr>
-              <a:t>Task #6: Add audio</a:t>
+              <a:t>Task </a:t>
+            </a:r>
+            <a:r>
+              <a:rPr lang="en-US" sz="800" dirty="0" smtClean="0">
+                <a:solidFill>
+                  <a:schemeClr val="bg1"/>
+                </a:solidFill>
+              </a:rPr>
+              <a:t>#4: </a:t>
+            </a:r>
+            <a:r>
+              <a:rPr lang="en-US" sz="800" dirty="0">
+                <a:solidFill>
+                  <a:schemeClr val="bg1"/>
+                </a:solidFill>
+              </a:rPr>
+              <a:t>Add audio</a:t>
             </a:r>
             <a:endParaRPr lang="en-US" dirty="0"/>
           </a:p>
@@ -6052,7 +6482,7 @@
           <p:cNvPr id="30" name="Rectangle 29">
             <a:extLst>
               <a:ext uri="{FF2B5EF4-FFF2-40B4-BE49-F238E27FC236}">
-                <a16:creationId xmlns:a16="http://schemas.microsoft.com/office/drawing/2014/main" id="{ABD8C12D-0590-401B-9810-3C70D06503BB}"/>
+                <a16:creationId xmlns:a16="http://schemas.microsoft.com/office/drawing/2014/main" xmlns="" id="{ABD8C12D-0590-401B-9810-3C70D06503BB}"/>
               </a:ext>
             </a:extLst>
           </p:cNvPr>
@@ -6061,7 +6491,7 @@
         </p:nvSpPr>
         <p:spPr>
           <a:xfrm>
-            <a:off x="4008987" y="2080344"/>
+            <a:off x="4010978" y="1471078"/>
             <a:ext cx="1093927" cy="499722"/>
           </a:xfrm>
           <a:prstGeom prst="rect">
@@ -6095,7 +6525,47 @@
                   <a:schemeClr val="bg1"/>
                 </a:solidFill>
               </a:rPr>
-              <a:t>Task #3 : Download assets </a:t>
+              <a:t>Task </a:t>
+            </a:r>
+            <a:r>
+              <a:rPr lang="en-US" sz="800" dirty="0" smtClean="0">
+                <a:solidFill>
+                  <a:schemeClr val="bg1"/>
+                </a:solidFill>
+              </a:rPr>
+              <a:t>#1 </a:t>
+            </a:r>
+            <a:r>
+              <a:rPr lang="en-US" sz="800" dirty="0">
+                <a:solidFill>
+                  <a:schemeClr val="bg1"/>
+                </a:solidFill>
+              </a:rPr>
+              <a:t>: </a:t>
+            </a:r>
+            <a:r>
+              <a:rPr lang="en-US" sz="800" dirty="0" smtClean="0">
+                <a:solidFill>
+                  <a:schemeClr val="bg1"/>
+                </a:solidFill>
+              </a:rPr>
+              <a:t>Change</a:t>
+            </a:r>
+            <a:r>
+              <a:rPr lang="en-US" sz="800" dirty="0" smtClean="0">
+                <a:solidFill>
+                  <a:schemeClr val="bg1"/>
+                </a:solidFill>
+              </a:rPr>
+              <a:t> </a:t>
+            </a:r>
+            <a:r>
+              <a:rPr lang="en-US" sz="800" dirty="0">
+                <a:solidFill>
+                  <a:schemeClr val="bg1"/>
+                </a:solidFill>
+              </a:rPr>
+              <a:t>assets </a:t>
             </a:r>
             <a:endParaRPr lang="en-US" dirty="0"/>
           </a:p>
@@ -6106,7 +6576,7 @@
           <p:cNvPr id="32" name="Rectangle 31">
             <a:extLst>
               <a:ext uri="{FF2B5EF4-FFF2-40B4-BE49-F238E27FC236}">
-                <a16:creationId xmlns:a16="http://schemas.microsoft.com/office/drawing/2014/main" id="{ABD8C12D-0590-401B-9810-3C70D06503BB}"/>
+                <a16:creationId xmlns:a16="http://schemas.microsoft.com/office/drawing/2014/main" xmlns="" id="{ABD8C12D-0590-401B-9810-3C70D06503BB}"/>
               </a:ext>
             </a:extLst>
           </p:cNvPr>
@@ -6149,7 +6619,15 @@
                   <a:schemeClr val="bg1"/>
                 </a:solidFill>
               </a:rPr>
-              <a:t>Person doing task:</a:t>
+              <a:t>Person doing task</a:t>
+            </a:r>
+            <a:r>
+              <a:rPr lang="en-US" sz="800" dirty="0" smtClean="0">
+                <a:solidFill>
+                  <a:schemeClr val="bg1"/>
+                </a:solidFill>
+              </a:rPr>
+              <a:t>: Justen</a:t>
             </a:r>
             <a:endParaRPr lang="en-US" dirty="0"/>
           </a:p>
@@ -6160,7 +6638,7 @@
           <p:cNvPr id="34" name="Rectangle 33">
             <a:extLst>
               <a:ext uri="{FF2B5EF4-FFF2-40B4-BE49-F238E27FC236}">
-                <a16:creationId xmlns:a16="http://schemas.microsoft.com/office/drawing/2014/main" id="{ABD8C12D-0590-401B-9810-3C70D06503BB}"/>
+                <a16:creationId xmlns:a16="http://schemas.microsoft.com/office/drawing/2014/main" xmlns="" id="{ABD8C12D-0590-401B-9810-3C70D06503BB}"/>
               </a:ext>
             </a:extLst>
           </p:cNvPr>
@@ -6203,7 +6681,163 @@
                   <a:schemeClr val="bg1"/>
                 </a:solidFill>
               </a:rPr>
-              <a:t>Person doing task:  Hannah</a:t>
+              <a:t>Person doing task</a:t>
+            </a:r>
+            <a:r>
+              <a:rPr lang="en-US" sz="800" dirty="0" smtClean="0">
+                <a:solidFill>
+                  <a:schemeClr val="bg1"/>
+                </a:solidFill>
+              </a:rPr>
+              <a:t>: Liam</a:t>
+            </a:r>
+            <a:endParaRPr lang="en-US" dirty="0"/>
+          </a:p>
+        </p:txBody>
+      </p:sp>
+      <p:sp>
+        <p:nvSpPr>
+          <p:cNvPr id="27" name="Rectangle 26">
+            <a:extLst>
+              <a:ext uri="{FF2B5EF4-FFF2-40B4-BE49-F238E27FC236}">
+                <a16:creationId xmlns:a16="http://schemas.microsoft.com/office/drawing/2014/main" xmlns="" id="{ABD8C12D-0590-401B-9810-3C70D06503BB}"/>
+              </a:ext>
+            </a:extLst>
+          </p:cNvPr>
+          <p:cNvSpPr/>
+          <p:nvPr/>
+        </p:nvSpPr>
+        <p:spPr>
+          <a:xfrm>
+            <a:off x="5246570" y="5377800"/>
+            <a:ext cx="1093927" cy="499722"/>
+          </a:xfrm>
+          <a:prstGeom prst="rect">
+            <a:avLst/>
+          </a:prstGeom>
+        </p:spPr>
+        <p:style>
+          <a:lnRef idx="2">
+            <a:schemeClr val="accent1">
+              <a:shade val="50000"/>
+            </a:schemeClr>
+          </a:lnRef>
+          <a:fillRef idx="1">
+            <a:schemeClr val="accent1"/>
+          </a:fillRef>
+          <a:effectRef idx="0">
+            <a:schemeClr val="accent1"/>
+          </a:effectRef>
+          <a:fontRef idx="minor">
+            <a:schemeClr val="lt1"/>
+          </a:fontRef>
+        </p:style>
+        <p:txBody>
+          <a:bodyPr rtlCol="0" anchor="ctr"/>
+          <a:lstStyle/>
+          <a:p>
+            <a:pPr algn="ctr"/>
+            <a:r>
+              <a:rPr lang="en-US" sz="800" dirty="0">
+                <a:solidFill>
+                  <a:schemeClr val="bg1"/>
+                </a:solidFill>
+              </a:rPr>
+              <a:t>Task </a:t>
+            </a:r>
+            <a:r>
+              <a:rPr lang="en-US" sz="800" dirty="0" smtClean="0">
+                <a:solidFill>
+                  <a:schemeClr val="bg1"/>
+                </a:solidFill>
+              </a:rPr>
+              <a:t>#</a:t>
+            </a:r>
+            <a:r>
+              <a:rPr lang="en-US" sz="800" dirty="0">
+                <a:solidFill>
+                  <a:schemeClr val="bg1"/>
+                </a:solidFill>
+              </a:rPr>
+              <a:t>6</a:t>
+            </a:r>
+            <a:r>
+              <a:rPr lang="en-US" sz="800" dirty="0" smtClean="0">
+                <a:solidFill>
+                  <a:schemeClr val="bg1"/>
+                </a:solidFill>
+              </a:rPr>
+              <a:t>: Test</a:t>
+            </a:r>
+            <a:endParaRPr lang="en-US" dirty="0"/>
+          </a:p>
+        </p:txBody>
+      </p:sp>
+      <p:sp>
+        <p:nvSpPr>
+          <p:cNvPr id="29" name="Rectangle 28">
+            <a:extLst>
+              <a:ext uri="{FF2B5EF4-FFF2-40B4-BE49-F238E27FC236}">
+                <a16:creationId xmlns:a16="http://schemas.microsoft.com/office/drawing/2014/main" xmlns="" id="{ABD8C12D-0590-401B-9810-3C70D06503BB}"/>
+              </a:ext>
+            </a:extLst>
+          </p:cNvPr>
+          <p:cNvSpPr/>
+          <p:nvPr/>
+        </p:nvSpPr>
+        <p:spPr>
+          <a:xfrm>
+            <a:off x="4010977" y="5377800"/>
+            <a:ext cx="1093927" cy="499722"/>
+          </a:xfrm>
+          <a:prstGeom prst="rect">
+            <a:avLst/>
+          </a:prstGeom>
+        </p:spPr>
+        <p:style>
+          <a:lnRef idx="2">
+            <a:schemeClr val="accent1">
+              <a:shade val="50000"/>
+            </a:schemeClr>
+          </a:lnRef>
+          <a:fillRef idx="1">
+            <a:schemeClr val="accent1"/>
+          </a:fillRef>
+          <a:effectRef idx="0">
+            <a:schemeClr val="accent1"/>
+          </a:effectRef>
+          <a:fontRef idx="minor">
+            <a:schemeClr val="lt1"/>
+          </a:fontRef>
+        </p:style>
+        <p:txBody>
+          <a:bodyPr rtlCol="0" anchor="ctr"/>
+          <a:lstStyle/>
+          <a:p>
+            <a:pPr algn="ctr"/>
+            <a:r>
+              <a:rPr lang="en-US" sz="800" dirty="0">
+                <a:solidFill>
+                  <a:schemeClr val="bg1"/>
+                </a:solidFill>
+              </a:rPr>
+              <a:t>Task </a:t>
+            </a:r>
+            <a:r>
+              <a:rPr lang="en-US" sz="800" dirty="0" smtClean="0">
+                <a:solidFill>
+                  <a:schemeClr val="bg1"/>
+                </a:solidFill>
+              </a:rPr>
+              <a:t>#5: </a:t>
+            </a:r>
+            <a:r>
+              <a:rPr lang="en-US" sz="800" dirty="0">
+                <a:solidFill>
+                  <a:schemeClr val="bg1"/>
+                </a:solidFill>
+              </a:rPr>
+              <a:t>Add audio</a:t>
             </a:r>
             <a:endParaRPr lang="en-US" dirty="0"/>
           </a:p>

</xml_diff>

<commit_message>
Sprint Task board Updated: 10/06
</commit_message>
<xml_diff>
--- a/sprint_task_board.pptx
+++ b/sprint_task_board.pptx
@@ -135,7 +135,7 @@
           <p:cNvPr id="2" name="Title 1">
             <a:extLst>
               <a:ext uri="{FF2B5EF4-FFF2-40B4-BE49-F238E27FC236}">
-                <a16:creationId xmlns:a16="http://schemas.microsoft.com/office/drawing/2014/main" xmlns="" id="{0F943FEA-7A47-4409-9E89-FC170A6238DF}"/>
+                <a16:creationId xmlns="" xmlns:a16="http://schemas.microsoft.com/office/drawing/2014/main" id="{0F943FEA-7A47-4409-9E89-FC170A6238DF}"/>
               </a:ext>
             </a:extLst>
           </p:cNvPr>
@@ -172,7 +172,7 @@
           <p:cNvPr id="3" name="Subtitle 2">
             <a:extLst>
               <a:ext uri="{FF2B5EF4-FFF2-40B4-BE49-F238E27FC236}">
-                <a16:creationId xmlns:a16="http://schemas.microsoft.com/office/drawing/2014/main" xmlns="" id="{17455DBF-6D85-48C6-8AA1-BA917C2FB494}"/>
+                <a16:creationId xmlns="" xmlns:a16="http://schemas.microsoft.com/office/drawing/2014/main" id="{17455DBF-6D85-48C6-8AA1-BA917C2FB494}"/>
               </a:ext>
             </a:extLst>
           </p:cNvPr>
@@ -242,7 +242,7 @@
           <p:cNvPr id="4" name="Date Placeholder 3">
             <a:extLst>
               <a:ext uri="{FF2B5EF4-FFF2-40B4-BE49-F238E27FC236}">
-                <a16:creationId xmlns:a16="http://schemas.microsoft.com/office/drawing/2014/main" xmlns="" id="{92F45BF1-9C23-40AD-8349-E05418B6196D}"/>
+                <a16:creationId xmlns="" xmlns:a16="http://schemas.microsoft.com/office/drawing/2014/main" id="{92F45BF1-9C23-40AD-8349-E05418B6196D}"/>
               </a:ext>
             </a:extLst>
           </p:cNvPr>
@@ -271,7 +271,7 @@
           <p:cNvPr id="5" name="Footer Placeholder 4">
             <a:extLst>
               <a:ext uri="{FF2B5EF4-FFF2-40B4-BE49-F238E27FC236}">
-                <a16:creationId xmlns:a16="http://schemas.microsoft.com/office/drawing/2014/main" xmlns="" id="{ECB85B5C-F08E-4AE1-92FF-384357E21D05}"/>
+                <a16:creationId xmlns="" xmlns:a16="http://schemas.microsoft.com/office/drawing/2014/main" id="{ECB85B5C-F08E-4AE1-92FF-384357E21D05}"/>
               </a:ext>
             </a:extLst>
           </p:cNvPr>
@@ -296,7 +296,7 @@
           <p:cNvPr id="6" name="Slide Number Placeholder 5">
             <a:extLst>
               <a:ext uri="{FF2B5EF4-FFF2-40B4-BE49-F238E27FC236}">
-                <a16:creationId xmlns:a16="http://schemas.microsoft.com/office/drawing/2014/main" xmlns="" id="{89B3B116-9529-466B-AC7B-A74F950CF5D8}"/>
+                <a16:creationId xmlns="" xmlns:a16="http://schemas.microsoft.com/office/drawing/2014/main" id="{89B3B116-9529-466B-AC7B-A74F950CF5D8}"/>
               </a:ext>
             </a:extLst>
           </p:cNvPr>
@@ -355,7 +355,7 @@
           <p:cNvPr id="2" name="Title 1">
             <a:extLst>
               <a:ext uri="{FF2B5EF4-FFF2-40B4-BE49-F238E27FC236}">
-                <a16:creationId xmlns:a16="http://schemas.microsoft.com/office/drawing/2014/main" xmlns="" id="{5EB96799-CA27-4790-989C-57DD8467B761}"/>
+                <a16:creationId xmlns="" xmlns:a16="http://schemas.microsoft.com/office/drawing/2014/main" id="{5EB96799-CA27-4790-989C-57DD8467B761}"/>
               </a:ext>
             </a:extLst>
           </p:cNvPr>
@@ -383,7 +383,7 @@
           <p:cNvPr id="3" name="Vertical Text Placeholder 2">
             <a:extLst>
               <a:ext uri="{FF2B5EF4-FFF2-40B4-BE49-F238E27FC236}">
-                <a16:creationId xmlns:a16="http://schemas.microsoft.com/office/drawing/2014/main" xmlns="" id="{D94402C2-F698-476B-9D72-442347D77EC8}"/>
+                <a16:creationId xmlns="" xmlns:a16="http://schemas.microsoft.com/office/drawing/2014/main" id="{D94402C2-F698-476B-9D72-442347D77EC8}"/>
               </a:ext>
             </a:extLst>
           </p:cNvPr>
@@ -440,7 +440,7 @@
           <p:cNvPr id="4" name="Date Placeholder 3">
             <a:extLst>
               <a:ext uri="{FF2B5EF4-FFF2-40B4-BE49-F238E27FC236}">
-                <a16:creationId xmlns:a16="http://schemas.microsoft.com/office/drawing/2014/main" xmlns="" id="{91F5C79D-FC09-4104-926E-DE4DD920E8FA}"/>
+                <a16:creationId xmlns="" xmlns:a16="http://schemas.microsoft.com/office/drawing/2014/main" id="{91F5C79D-FC09-4104-926E-DE4DD920E8FA}"/>
               </a:ext>
             </a:extLst>
           </p:cNvPr>
@@ -469,7 +469,7 @@
           <p:cNvPr id="5" name="Footer Placeholder 4">
             <a:extLst>
               <a:ext uri="{FF2B5EF4-FFF2-40B4-BE49-F238E27FC236}">
-                <a16:creationId xmlns:a16="http://schemas.microsoft.com/office/drawing/2014/main" xmlns="" id="{4374BBA1-54F6-4019-B5A2-84A658D10788}"/>
+                <a16:creationId xmlns="" xmlns:a16="http://schemas.microsoft.com/office/drawing/2014/main" id="{4374BBA1-54F6-4019-B5A2-84A658D10788}"/>
               </a:ext>
             </a:extLst>
           </p:cNvPr>
@@ -494,7 +494,7 @@
           <p:cNvPr id="6" name="Slide Number Placeholder 5">
             <a:extLst>
               <a:ext uri="{FF2B5EF4-FFF2-40B4-BE49-F238E27FC236}">
-                <a16:creationId xmlns:a16="http://schemas.microsoft.com/office/drawing/2014/main" xmlns="" id="{87607567-BD8C-45DA-8D0B-13DAD6F97CB9}"/>
+                <a16:creationId xmlns="" xmlns:a16="http://schemas.microsoft.com/office/drawing/2014/main" id="{87607567-BD8C-45DA-8D0B-13DAD6F97CB9}"/>
               </a:ext>
             </a:extLst>
           </p:cNvPr>
@@ -553,7 +553,7 @@
           <p:cNvPr id="2" name="Vertical Title 1">
             <a:extLst>
               <a:ext uri="{FF2B5EF4-FFF2-40B4-BE49-F238E27FC236}">
-                <a16:creationId xmlns:a16="http://schemas.microsoft.com/office/drawing/2014/main" xmlns="" id="{2B525709-D6AC-4A8F-B8AC-9000214497ED}"/>
+                <a16:creationId xmlns="" xmlns:a16="http://schemas.microsoft.com/office/drawing/2014/main" id="{2B525709-D6AC-4A8F-B8AC-9000214497ED}"/>
               </a:ext>
             </a:extLst>
           </p:cNvPr>
@@ -586,7 +586,7 @@
           <p:cNvPr id="3" name="Vertical Text Placeholder 2">
             <a:extLst>
               <a:ext uri="{FF2B5EF4-FFF2-40B4-BE49-F238E27FC236}">
-                <a16:creationId xmlns:a16="http://schemas.microsoft.com/office/drawing/2014/main" xmlns="" id="{A05FEA65-8697-4C09-B004-4CFE8A26AF19}"/>
+                <a16:creationId xmlns="" xmlns:a16="http://schemas.microsoft.com/office/drawing/2014/main" id="{A05FEA65-8697-4C09-B004-4CFE8A26AF19}"/>
               </a:ext>
             </a:extLst>
           </p:cNvPr>
@@ -648,7 +648,7 @@
           <p:cNvPr id="4" name="Date Placeholder 3">
             <a:extLst>
               <a:ext uri="{FF2B5EF4-FFF2-40B4-BE49-F238E27FC236}">
-                <a16:creationId xmlns:a16="http://schemas.microsoft.com/office/drawing/2014/main" xmlns="" id="{240D9E41-8DF6-4C00-93AC-BB3392D836F2}"/>
+                <a16:creationId xmlns="" xmlns:a16="http://schemas.microsoft.com/office/drawing/2014/main" id="{240D9E41-8DF6-4C00-93AC-BB3392D836F2}"/>
               </a:ext>
             </a:extLst>
           </p:cNvPr>
@@ -677,7 +677,7 @@
           <p:cNvPr id="5" name="Footer Placeholder 4">
             <a:extLst>
               <a:ext uri="{FF2B5EF4-FFF2-40B4-BE49-F238E27FC236}">
-                <a16:creationId xmlns:a16="http://schemas.microsoft.com/office/drawing/2014/main" xmlns="" id="{DBCF2D0B-5479-4E58-BFAE-EF554D49F607}"/>
+                <a16:creationId xmlns="" xmlns:a16="http://schemas.microsoft.com/office/drawing/2014/main" id="{DBCF2D0B-5479-4E58-BFAE-EF554D49F607}"/>
               </a:ext>
             </a:extLst>
           </p:cNvPr>
@@ -702,7 +702,7 @@
           <p:cNvPr id="6" name="Slide Number Placeholder 5">
             <a:extLst>
               <a:ext uri="{FF2B5EF4-FFF2-40B4-BE49-F238E27FC236}">
-                <a16:creationId xmlns:a16="http://schemas.microsoft.com/office/drawing/2014/main" xmlns="" id="{4FE272FB-65B5-4679-9584-9FC1BB7B676D}"/>
+                <a16:creationId xmlns="" xmlns:a16="http://schemas.microsoft.com/office/drawing/2014/main" id="{4FE272FB-65B5-4679-9584-9FC1BB7B676D}"/>
               </a:ext>
             </a:extLst>
           </p:cNvPr>
@@ -761,7 +761,7 @@
           <p:cNvPr id="2" name="Title 1">
             <a:extLst>
               <a:ext uri="{FF2B5EF4-FFF2-40B4-BE49-F238E27FC236}">
-                <a16:creationId xmlns:a16="http://schemas.microsoft.com/office/drawing/2014/main" xmlns="" id="{FCE4474B-8A0A-4249-9DD6-26237794E02C}"/>
+                <a16:creationId xmlns="" xmlns:a16="http://schemas.microsoft.com/office/drawing/2014/main" id="{FCE4474B-8A0A-4249-9DD6-26237794E02C}"/>
               </a:ext>
             </a:extLst>
           </p:cNvPr>
@@ -789,7 +789,7 @@
           <p:cNvPr id="3" name="Content Placeholder 2">
             <a:extLst>
               <a:ext uri="{FF2B5EF4-FFF2-40B4-BE49-F238E27FC236}">
-                <a16:creationId xmlns:a16="http://schemas.microsoft.com/office/drawing/2014/main" xmlns="" id="{0D61969F-ABDC-4435-A745-655D77EB4A14}"/>
+                <a16:creationId xmlns="" xmlns:a16="http://schemas.microsoft.com/office/drawing/2014/main" id="{0D61969F-ABDC-4435-A745-655D77EB4A14}"/>
               </a:ext>
             </a:extLst>
           </p:cNvPr>
@@ -846,7 +846,7 @@
           <p:cNvPr id="4" name="Date Placeholder 3">
             <a:extLst>
               <a:ext uri="{FF2B5EF4-FFF2-40B4-BE49-F238E27FC236}">
-                <a16:creationId xmlns:a16="http://schemas.microsoft.com/office/drawing/2014/main" xmlns="" id="{B32380DB-4035-4455-BE5C-57F4F44D9D4C}"/>
+                <a16:creationId xmlns="" xmlns:a16="http://schemas.microsoft.com/office/drawing/2014/main" id="{B32380DB-4035-4455-BE5C-57F4F44D9D4C}"/>
               </a:ext>
             </a:extLst>
           </p:cNvPr>
@@ -875,7 +875,7 @@
           <p:cNvPr id="5" name="Footer Placeholder 4">
             <a:extLst>
               <a:ext uri="{FF2B5EF4-FFF2-40B4-BE49-F238E27FC236}">
-                <a16:creationId xmlns:a16="http://schemas.microsoft.com/office/drawing/2014/main" xmlns="" id="{41E79801-5ECD-43D3-838F-ABC46DAB5C75}"/>
+                <a16:creationId xmlns="" xmlns:a16="http://schemas.microsoft.com/office/drawing/2014/main" id="{41E79801-5ECD-43D3-838F-ABC46DAB5C75}"/>
               </a:ext>
             </a:extLst>
           </p:cNvPr>
@@ -900,7 +900,7 @@
           <p:cNvPr id="6" name="Slide Number Placeholder 5">
             <a:extLst>
               <a:ext uri="{FF2B5EF4-FFF2-40B4-BE49-F238E27FC236}">
-                <a16:creationId xmlns:a16="http://schemas.microsoft.com/office/drawing/2014/main" xmlns="" id="{FB78BDAD-83E7-42B3-B17B-A69C4DE03F89}"/>
+                <a16:creationId xmlns="" xmlns:a16="http://schemas.microsoft.com/office/drawing/2014/main" id="{FB78BDAD-83E7-42B3-B17B-A69C4DE03F89}"/>
               </a:ext>
             </a:extLst>
           </p:cNvPr>
@@ -959,7 +959,7 @@
           <p:cNvPr id="2" name="Title 1">
             <a:extLst>
               <a:ext uri="{FF2B5EF4-FFF2-40B4-BE49-F238E27FC236}">
-                <a16:creationId xmlns:a16="http://schemas.microsoft.com/office/drawing/2014/main" xmlns="" id="{F177E510-0D60-41E4-9372-43C6C45B7310}"/>
+                <a16:creationId xmlns="" xmlns:a16="http://schemas.microsoft.com/office/drawing/2014/main" id="{F177E510-0D60-41E4-9372-43C6C45B7310}"/>
               </a:ext>
             </a:extLst>
           </p:cNvPr>
@@ -996,7 +996,7 @@
           <p:cNvPr id="3" name="Text Placeholder 2">
             <a:extLst>
               <a:ext uri="{FF2B5EF4-FFF2-40B4-BE49-F238E27FC236}">
-                <a16:creationId xmlns:a16="http://schemas.microsoft.com/office/drawing/2014/main" xmlns="" id="{E8F6BA69-9FB2-4475-A3AE-BA1D638B3057}"/>
+                <a16:creationId xmlns="" xmlns:a16="http://schemas.microsoft.com/office/drawing/2014/main" id="{E8F6BA69-9FB2-4475-A3AE-BA1D638B3057}"/>
               </a:ext>
             </a:extLst>
           </p:cNvPr>
@@ -1121,7 +1121,7 @@
           <p:cNvPr id="4" name="Date Placeholder 3">
             <a:extLst>
               <a:ext uri="{FF2B5EF4-FFF2-40B4-BE49-F238E27FC236}">
-                <a16:creationId xmlns:a16="http://schemas.microsoft.com/office/drawing/2014/main" xmlns="" id="{F627FFD9-5F22-48F0-A50C-A74460217CEA}"/>
+                <a16:creationId xmlns="" xmlns:a16="http://schemas.microsoft.com/office/drawing/2014/main" id="{F627FFD9-5F22-48F0-A50C-A74460217CEA}"/>
               </a:ext>
             </a:extLst>
           </p:cNvPr>
@@ -1150,7 +1150,7 @@
           <p:cNvPr id="5" name="Footer Placeholder 4">
             <a:extLst>
               <a:ext uri="{FF2B5EF4-FFF2-40B4-BE49-F238E27FC236}">
-                <a16:creationId xmlns:a16="http://schemas.microsoft.com/office/drawing/2014/main" xmlns="" id="{0A6F0EF2-D60D-48DC-ACB7-5EBDA7B4B68F}"/>
+                <a16:creationId xmlns="" xmlns:a16="http://schemas.microsoft.com/office/drawing/2014/main" id="{0A6F0EF2-D60D-48DC-ACB7-5EBDA7B4B68F}"/>
               </a:ext>
             </a:extLst>
           </p:cNvPr>
@@ -1175,7 +1175,7 @@
           <p:cNvPr id="6" name="Slide Number Placeholder 5">
             <a:extLst>
               <a:ext uri="{FF2B5EF4-FFF2-40B4-BE49-F238E27FC236}">
-                <a16:creationId xmlns:a16="http://schemas.microsoft.com/office/drawing/2014/main" xmlns="" id="{B3D781CE-4C65-4E71-87AF-D1D98017967F}"/>
+                <a16:creationId xmlns="" xmlns:a16="http://schemas.microsoft.com/office/drawing/2014/main" id="{B3D781CE-4C65-4E71-87AF-D1D98017967F}"/>
               </a:ext>
             </a:extLst>
           </p:cNvPr>
@@ -1234,7 +1234,7 @@
           <p:cNvPr id="2" name="Title 1">
             <a:extLst>
               <a:ext uri="{FF2B5EF4-FFF2-40B4-BE49-F238E27FC236}">
-                <a16:creationId xmlns:a16="http://schemas.microsoft.com/office/drawing/2014/main" xmlns="" id="{747E8B63-9609-4BBF-B743-D777B4DBF6BB}"/>
+                <a16:creationId xmlns="" xmlns:a16="http://schemas.microsoft.com/office/drawing/2014/main" id="{747E8B63-9609-4BBF-B743-D777B4DBF6BB}"/>
               </a:ext>
             </a:extLst>
           </p:cNvPr>
@@ -1262,7 +1262,7 @@
           <p:cNvPr id="3" name="Content Placeholder 2">
             <a:extLst>
               <a:ext uri="{FF2B5EF4-FFF2-40B4-BE49-F238E27FC236}">
-                <a16:creationId xmlns:a16="http://schemas.microsoft.com/office/drawing/2014/main" xmlns="" id="{B7B47E64-1CC9-4DDF-9F4E-4F343FA90159}"/>
+                <a16:creationId xmlns="" xmlns:a16="http://schemas.microsoft.com/office/drawing/2014/main" id="{B7B47E64-1CC9-4DDF-9F4E-4F343FA90159}"/>
               </a:ext>
             </a:extLst>
           </p:cNvPr>
@@ -1324,7 +1324,7 @@
           <p:cNvPr id="4" name="Content Placeholder 3">
             <a:extLst>
               <a:ext uri="{FF2B5EF4-FFF2-40B4-BE49-F238E27FC236}">
-                <a16:creationId xmlns:a16="http://schemas.microsoft.com/office/drawing/2014/main" xmlns="" id="{FB3334DA-952F-49BE-98A3-B0B5951C94CE}"/>
+                <a16:creationId xmlns="" xmlns:a16="http://schemas.microsoft.com/office/drawing/2014/main" id="{FB3334DA-952F-49BE-98A3-B0B5951C94CE}"/>
               </a:ext>
             </a:extLst>
           </p:cNvPr>
@@ -1386,7 +1386,7 @@
           <p:cNvPr id="5" name="Date Placeholder 4">
             <a:extLst>
               <a:ext uri="{FF2B5EF4-FFF2-40B4-BE49-F238E27FC236}">
-                <a16:creationId xmlns:a16="http://schemas.microsoft.com/office/drawing/2014/main" xmlns="" id="{A89DB9B6-5453-4646-8E07-962A19DBFF44}"/>
+                <a16:creationId xmlns="" xmlns:a16="http://schemas.microsoft.com/office/drawing/2014/main" id="{A89DB9B6-5453-4646-8E07-962A19DBFF44}"/>
               </a:ext>
             </a:extLst>
           </p:cNvPr>
@@ -1415,7 +1415,7 @@
           <p:cNvPr id="6" name="Footer Placeholder 5">
             <a:extLst>
               <a:ext uri="{FF2B5EF4-FFF2-40B4-BE49-F238E27FC236}">
-                <a16:creationId xmlns:a16="http://schemas.microsoft.com/office/drawing/2014/main" xmlns="" id="{0781F20A-11BE-49CD-B10F-D144B50DB339}"/>
+                <a16:creationId xmlns="" xmlns:a16="http://schemas.microsoft.com/office/drawing/2014/main" id="{0781F20A-11BE-49CD-B10F-D144B50DB339}"/>
               </a:ext>
             </a:extLst>
           </p:cNvPr>
@@ -1440,7 +1440,7 @@
           <p:cNvPr id="7" name="Slide Number Placeholder 6">
             <a:extLst>
               <a:ext uri="{FF2B5EF4-FFF2-40B4-BE49-F238E27FC236}">
-                <a16:creationId xmlns:a16="http://schemas.microsoft.com/office/drawing/2014/main" xmlns="" id="{36E9D41E-52C1-4753-A8AE-839119E0EAD9}"/>
+                <a16:creationId xmlns="" xmlns:a16="http://schemas.microsoft.com/office/drawing/2014/main" id="{36E9D41E-52C1-4753-A8AE-839119E0EAD9}"/>
               </a:ext>
             </a:extLst>
           </p:cNvPr>
@@ -1499,7 +1499,7 @@
           <p:cNvPr id="2" name="Title 1">
             <a:extLst>
               <a:ext uri="{FF2B5EF4-FFF2-40B4-BE49-F238E27FC236}">
-                <a16:creationId xmlns:a16="http://schemas.microsoft.com/office/drawing/2014/main" xmlns="" id="{4AB5CDAE-B3A5-4198-BB2B-A5DE04791C3D}"/>
+                <a16:creationId xmlns="" xmlns:a16="http://schemas.microsoft.com/office/drawing/2014/main" id="{4AB5CDAE-B3A5-4198-BB2B-A5DE04791C3D}"/>
               </a:ext>
             </a:extLst>
           </p:cNvPr>
@@ -1532,7 +1532,7 @@
           <p:cNvPr id="3" name="Text Placeholder 2">
             <a:extLst>
               <a:ext uri="{FF2B5EF4-FFF2-40B4-BE49-F238E27FC236}">
-                <a16:creationId xmlns:a16="http://schemas.microsoft.com/office/drawing/2014/main" xmlns="" id="{5AEC9265-34A2-4D68-9006-733197A67704}"/>
+                <a16:creationId xmlns="" xmlns:a16="http://schemas.microsoft.com/office/drawing/2014/main" id="{5AEC9265-34A2-4D68-9006-733197A67704}"/>
               </a:ext>
             </a:extLst>
           </p:cNvPr>
@@ -1603,7 +1603,7 @@
           <p:cNvPr id="4" name="Content Placeholder 3">
             <a:extLst>
               <a:ext uri="{FF2B5EF4-FFF2-40B4-BE49-F238E27FC236}">
-                <a16:creationId xmlns:a16="http://schemas.microsoft.com/office/drawing/2014/main" xmlns="" id="{372F443B-2F35-4DF8-92C6-77CA6897B2CC}"/>
+                <a16:creationId xmlns="" xmlns:a16="http://schemas.microsoft.com/office/drawing/2014/main" id="{372F443B-2F35-4DF8-92C6-77CA6897B2CC}"/>
               </a:ext>
             </a:extLst>
           </p:cNvPr>
@@ -1665,7 +1665,7 @@
           <p:cNvPr id="5" name="Text Placeholder 4">
             <a:extLst>
               <a:ext uri="{FF2B5EF4-FFF2-40B4-BE49-F238E27FC236}">
-                <a16:creationId xmlns:a16="http://schemas.microsoft.com/office/drawing/2014/main" xmlns="" id="{EC3D721E-B603-4652-AD34-ACC9CC973595}"/>
+                <a16:creationId xmlns="" xmlns:a16="http://schemas.microsoft.com/office/drawing/2014/main" id="{EC3D721E-B603-4652-AD34-ACC9CC973595}"/>
               </a:ext>
             </a:extLst>
           </p:cNvPr>
@@ -1736,7 +1736,7 @@
           <p:cNvPr id="6" name="Content Placeholder 5">
             <a:extLst>
               <a:ext uri="{FF2B5EF4-FFF2-40B4-BE49-F238E27FC236}">
-                <a16:creationId xmlns:a16="http://schemas.microsoft.com/office/drawing/2014/main" xmlns="" id="{22A36147-1663-4047-BA93-92E35B6E0965}"/>
+                <a16:creationId xmlns="" xmlns:a16="http://schemas.microsoft.com/office/drawing/2014/main" id="{22A36147-1663-4047-BA93-92E35B6E0965}"/>
               </a:ext>
             </a:extLst>
           </p:cNvPr>
@@ -1798,7 +1798,7 @@
           <p:cNvPr id="7" name="Date Placeholder 6">
             <a:extLst>
               <a:ext uri="{FF2B5EF4-FFF2-40B4-BE49-F238E27FC236}">
-                <a16:creationId xmlns:a16="http://schemas.microsoft.com/office/drawing/2014/main" xmlns="" id="{F3F5C402-BC23-4C6B-BF62-257371740C9A}"/>
+                <a16:creationId xmlns="" xmlns:a16="http://schemas.microsoft.com/office/drawing/2014/main" id="{F3F5C402-BC23-4C6B-BF62-257371740C9A}"/>
               </a:ext>
             </a:extLst>
           </p:cNvPr>
@@ -1827,7 +1827,7 @@
           <p:cNvPr id="8" name="Footer Placeholder 7">
             <a:extLst>
               <a:ext uri="{FF2B5EF4-FFF2-40B4-BE49-F238E27FC236}">
-                <a16:creationId xmlns:a16="http://schemas.microsoft.com/office/drawing/2014/main" xmlns="" id="{11630A76-FC91-446A-986D-4DBB10DED956}"/>
+                <a16:creationId xmlns="" xmlns:a16="http://schemas.microsoft.com/office/drawing/2014/main" id="{11630A76-FC91-446A-986D-4DBB10DED956}"/>
               </a:ext>
             </a:extLst>
           </p:cNvPr>
@@ -1852,7 +1852,7 @@
           <p:cNvPr id="9" name="Slide Number Placeholder 8">
             <a:extLst>
               <a:ext uri="{FF2B5EF4-FFF2-40B4-BE49-F238E27FC236}">
-                <a16:creationId xmlns:a16="http://schemas.microsoft.com/office/drawing/2014/main" xmlns="" id="{4CF3F732-1534-48FF-98C9-201E971B872B}"/>
+                <a16:creationId xmlns="" xmlns:a16="http://schemas.microsoft.com/office/drawing/2014/main" id="{4CF3F732-1534-48FF-98C9-201E971B872B}"/>
               </a:ext>
             </a:extLst>
           </p:cNvPr>
@@ -1911,7 +1911,7 @@
           <p:cNvPr id="2" name="Title 1">
             <a:extLst>
               <a:ext uri="{FF2B5EF4-FFF2-40B4-BE49-F238E27FC236}">
-                <a16:creationId xmlns:a16="http://schemas.microsoft.com/office/drawing/2014/main" xmlns="" id="{3BB4D641-8516-4EA7-8D85-EA92E6B15643}"/>
+                <a16:creationId xmlns="" xmlns:a16="http://schemas.microsoft.com/office/drawing/2014/main" id="{3BB4D641-8516-4EA7-8D85-EA92E6B15643}"/>
               </a:ext>
             </a:extLst>
           </p:cNvPr>
@@ -1939,7 +1939,7 @@
           <p:cNvPr id="3" name="Date Placeholder 2">
             <a:extLst>
               <a:ext uri="{FF2B5EF4-FFF2-40B4-BE49-F238E27FC236}">
-                <a16:creationId xmlns:a16="http://schemas.microsoft.com/office/drawing/2014/main" xmlns="" id="{0C0B0FA3-5168-4AE2-BCC7-3B697DABF0DC}"/>
+                <a16:creationId xmlns="" xmlns:a16="http://schemas.microsoft.com/office/drawing/2014/main" id="{0C0B0FA3-5168-4AE2-BCC7-3B697DABF0DC}"/>
               </a:ext>
             </a:extLst>
           </p:cNvPr>
@@ -1968,7 +1968,7 @@
           <p:cNvPr id="4" name="Footer Placeholder 3">
             <a:extLst>
               <a:ext uri="{FF2B5EF4-FFF2-40B4-BE49-F238E27FC236}">
-                <a16:creationId xmlns:a16="http://schemas.microsoft.com/office/drawing/2014/main" xmlns="" id="{52EC0C84-0AF9-46E5-9013-D179D931DA60}"/>
+                <a16:creationId xmlns="" xmlns:a16="http://schemas.microsoft.com/office/drawing/2014/main" id="{52EC0C84-0AF9-46E5-9013-D179D931DA60}"/>
               </a:ext>
             </a:extLst>
           </p:cNvPr>
@@ -1993,7 +1993,7 @@
           <p:cNvPr id="5" name="Slide Number Placeholder 4">
             <a:extLst>
               <a:ext uri="{FF2B5EF4-FFF2-40B4-BE49-F238E27FC236}">
-                <a16:creationId xmlns:a16="http://schemas.microsoft.com/office/drawing/2014/main" xmlns="" id="{B16E34D5-EF49-4430-93AB-784D927FA904}"/>
+                <a16:creationId xmlns="" xmlns:a16="http://schemas.microsoft.com/office/drawing/2014/main" id="{B16E34D5-EF49-4430-93AB-784D927FA904}"/>
               </a:ext>
             </a:extLst>
           </p:cNvPr>
@@ -2052,7 +2052,7 @@
           <p:cNvPr id="2" name="Date Placeholder 1">
             <a:extLst>
               <a:ext uri="{FF2B5EF4-FFF2-40B4-BE49-F238E27FC236}">
-                <a16:creationId xmlns:a16="http://schemas.microsoft.com/office/drawing/2014/main" xmlns="" id="{6E9D809D-A7AA-4E24-8396-9E2E05D0C03D}"/>
+                <a16:creationId xmlns="" xmlns:a16="http://schemas.microsoft.com/office/drawing/2014/main" id="{6E9D809D-A7AA-4E24-8396-9E2E05D0C03D}"/>
               </a:ext>
             </a:extLst>
           </p:cNvPr>
@@ -2081,7 +2081,7 @@
           <p:cNvPr id="3" name="Footer Placeholder 2">
             <a:extLst>
               <a:ext uri="{FF2B5EF4-FFF2-40B4-BE49-F238E27FC236}">
-                <a16:creationId xmlns:a16="http://schemas.microsoft.com/office/drawing/2014/main" xmlns="" id="{E79DD26D-8B7B-4051-A0A7-1E16F74CC724}"/>
+                <a16:creationId xmlns="" xmlns:a16="http://schemas.microsoft.com/office/drawing/2014/main" id="{E79DD26D-8B7B-4051-A0A7-1E16F74CC724}"/>
               </a:ext>
             </a:extLst>
           </p:cNvPr>
@@ -2106,7 +2106,7 @@
           <p:cNvPr id="4" name="Slide Number Placeholder 3">
             <a:extLst>
               <a:ext uri="{FF2B5EF4-FFF2-40B4-BE49-F238E27FC236}">
-                <a16:creationId xmlns:a16="http://schemas.microsoft.com/office/drawing/2014/main" xmlns="" id="{F0FB25F9-E06D-4E40-8E32-9E1C1A62D196}"/>
+                <a16:creationId xmlns="" xmlns:a16="http://schemas.microsoft.com/office/drawing/2014/main" id="{F0FB25F9-E06D-4E40-8E32-9E1C1A62D196}"/>
               </a:ext>
             </a:extLst>
           </p:cNvPr>
@@ -2165,7 +2165,7 @@
           <p:cNvPr id="2" name="Title 1">
             <a:extLst>
               <a:ext uri="{FF2B5EF4-FFF2-40B4-BE49-F238E27FC236}">
-                <a16:creationId xmlns:a16="http://schemas.microsoft.com/office/drawing/2014/main" xmlns="" id="{11AB542B-6186-430E-BFD1-FB6C77D1EC44}"/>
+                <a16:creationId xmlns="" xmlns:a16="http://schemas.microsoft.com/office/drawing/2014/main" id="{11AB542B-6186-430E-BFD1-FB6C77D1EC44}"/>
               </a:ext>
             </a:extLst>
           </p:cNvPr>
@@ -2202,7 +2202,7 @@
           <p:cNvPr id="3" name="Content Placeholder 2">
             <a:extLst>
               <a:ext uri="{FF2B5EF4-FFF2-40B4-BE49-F238E27FC236}">
-                <a16:creationId xmlns:a16="http://schemas.microsoft.com/office/drawing/2014/main" xmlns="" id="{6C0FDAE4-C113-45FE-BEA5-E0A749CA11AA}"/>
+                <a16:creationId xmlns="" xmlns:a16="http://schemas.microsoft.com/office/drawing/2014/main" id="{6C0FDAE4-C113-45FE-BEA5-E0A749CA11AA}"/>
               </a:ext>
             </a:extLst>
           </p:cNvPr>
@@ -2292,7 +2292,7 @@
           <p:cNvPr id="4" name="Text Placeholder 3">
             <a:extLst>
               <a:ext uri="{FF2B5EF4-FFF2-40B4-BE49-F238E27FC236}">
-                <a16:creationId xmlns:a16="http://schemas.microsoft.com/office/drawing/2014/main" xmlns="" id="{3B59AFE6-43A3-475F-9169-AA3879E04DCA}"/>
+                <a16:creationId xmlns="" xmlns:a16="http://schemas.microsoft.com/office/drawing/2014/main" id="{3B59AFE6-43A3-475F-9169-AA3879E04DCA}"/>
               </a:ext>
             </a:extLst>
           </p:cNvPr>
@@ -2363,7 +2363,7 @@
           <p:cNvPr id="5" name="Date Placeholder 4">
             <a:extLst>
               <a:ext uri="{FF2B5EF4-FFF2-40B4-BE49-F238E27FC236}">
-                <a16:creationId xmlns:a16="http://schemas.microsoft.com/office/drawing/2014/main" xmlns="" id="{85FC6F24-508F-4B9D-8285-3EB28C4A49B7}"/>
+                <a16:creationId xmlns="" xmlns:a16="http://schemas.microsoft.com/office/drawing/2014/main" id="{85FC6F24-508F-4B9D-8285-3EB28C4A49B7}"/>
               </a:ext>
             </a:extLst>
           </p:cNvPr>
@@ -2392,7 +2392,7 @@
           <p:cNvPr id="6" name="Footer Placeholder 5">
             <a:extLst>
               <a:ext uri="{FF2B5EF4-FFF2-40B4-BE49-F238E27FC236}">
-                <a16:creationId xmlns:a16="http://schemas.microsoft.com/office/drawing/2014/main" xmlns="" id="{04AD152C-C3EC-4054-9B61-90ED8C2C0B3E}"/>
+                <a16:creationId xmlns="" xmlns:a16="http://schemas.microsoft.com/office/drawing/2014/main" id="{04AD152C-C3EC-4054-9B61-90ED8C2C0B3E}"/>
               </a:ext>
             </a:extLst>
           </p:cNvPr>
@@ -2417,7 +2417,7 @@
           <p:cNvPr id="7" name="Slide Number Placeholder 6">
             <a:extLst>
               <a:ext uri="{FF2B5EF4-FFF2-40B4-BE49-F238E27FC236}">
-                <a16:creationId xmlns:a16="http://schemas.microsoft.com/office/drawing/2014/main" xmlns="" id="{170BF4D2-F189-4941-AE6D-BEFA39FD501A}"/>
+                <a16:creationId xmlns="" xmlns:a16="http://schemas.microsoft.com/office/drawing/2014/main" id="{170BF4D2-F189-4941-AE6D-BEFA39FD501A}"/>
               </a:ext>
             </a:extLst>
           </p:cNvPr>
@@ -2476,7 +2476,7 @@
           <p:cNvPr id="2" name="Title 1">
             <a:extLst>
               <a:ext uri="{FF2B5EF4-FFF2-40B4-BE49-F238E27FC236}">
-                <a16:creationId xmlns:a16="http://schemas.microsoft.com/office/drawing/2014/main" xmlns="" id="{0E565D83-DD8F-4BB1-87AD-D482C3BDABEF}"/>
+                <a16:creationId xmlns="" xmlns:a16="http://schemas.microsoft.com/office/drawing/2014/main" id="{0E565D83-DD8F-4BB1-87AD-D482C3BDABEF}"/>
               </a:ext>
             </a:extLst>
           </p:cNvPr>
@@ -2513,7 +2513,7 @@
           <p:cNvPr id="3" name="Picture Placeholder 2">
             <a:extLst>
               <a:ext uri="{FF2B5EF4-FFF2-40B4-BE49-F238E27FC236}">
-                <a16:creationId xmlns:a16="http://schemas.microsoft.com/office/drawing/2014/main" xmlns="" id="{11384BBE-D187-4EDC-AE0F-35D5DFB14FEF}"/>
+                <a16:creationId xmlns="" xmlns:a16="http://schemas.microsoft.com/office/drawing/2014/main" id="{11384BBE-D187-4EDC-AE0F-35D5DFB14FEF}"/>
               </a:ext>
             </a:extLst>
           </p:cNvPr>
@@ -2580,7 +2580,7 @@
           <p:cNvPr id="4" name="Text Placeholder 3">
             <a:extLst>
               <a:ext uri="{FF2B5EF4-FFF2-40B4-BE49-F238E27FC236}">
-                <a16:creationId xmlns:a16="http://schemas.microsoft.com/office/drawing/2014/main" xmlns="" id="{236F51AA-7423-4E97-B9C7-443C8C0B6045}"/>
+                <a16:creationId xmlns="" xmlns:a16="http://schemas.microsoft.com/office/drawing/2014/main" id="{236F51AA-7423-4E97-B9C7-443C8C0B6045}"/>
               </a:ext>
             </a:extLst>
           </p:cNvPr>
@@ -2651,7 +2651,7 @@
           <p:cNvPr id="5" name="Date Placeholder 4">
             <a:extLst>
               <a:ext uri="{FF2B5EF4-FFF2-40B4-BE49-F238E27FC236}">
-                <a16:creationId xmlns:a16="http://schemas.microsoft.com/office/drawing/2014/main" xmlns="" id="{2B348D00-6958-49DF-9B3D-58CDEF569F2E}"/>
+                <a16:creationId xmlns="" xmlns:a16="http://schemas.microsoft.com/office/drawing/2014/main" id="{2B348D00-6958-49DF-9B3D-58CDEF569F2E}"/>
               </a:ext>
             </a:extLst>
           </p:cNvPr>
@@ -2680,7 +2680,7 @@
           <p:cNvPr id="6" name="Footer Placeholder 5">
             <a:extLst>
               <a:ext uri="{FF2B5EF4-FFF2-40B4-BE49-F238E27FC236}">
-                <a16:creationId xmlns:a16="http://schemas.microsoft.com/office/drawing/2014/main" xmlns="" id="{2ED5460A-A98E-402B-BBB0-208A5AB9EF99}"/>
+                <a16:creationId xmlns="" xmlns:a16="http://schemas.microsoft.com/office/drawing/2014/main" id="{2ED5460A-A98E-402B-BBB0-208A5AB9EF99}"/>
               </a:ext>
             </a:extLst>
           </p:cNvPr>
@@ -2705,7 +2705,7 @@
           <p:cNvPr id="7" name="Slide Number Placeholder 6">
             <a:extLst>
               <a:ext uri="{FF2B5EF4-FFF2-40B4-BE49-F238E27FC236}">
-                <a16:creationId xmlns:a16="http://schemas.microsoft.com/office/drawing/2014/main" xmlns="" id="{89C14EC8-9890-43DB-B530-6F48BDDEF730}"/>
+                <a16:creationId xmlns="" xmlns:a16="http://schemas.microsoft.com/office/drawing/2014/main" id="{89C14EC8-9890-43DB-B530-6F48BDDEF730}"/>
               </a:ext>
             </a:extLst>
           </p:cNvPr>
@@ -2769,7 +2769,7 @@
           <p:cNvPr id="2" name="Title Placeholder 1">
             <a:extLst>
               <a:ext uri="{FF2B5EF4-FFF2-40B4-BE49-F238E27FC236}">
-                <a16:creationId xmlns:a16="http://schemas.microsoft.com/office/drawing/2014/main" xmlns="" id="{64A8D812-302F-4F90-A3A7-482910CD5910}"/>
+                <a16:creationId xmlns="" xmlns:a16="http://schemas.microsoft.com/office/drawing/2014/main" id="{64A8D812-302F-4F90-A3A7-482910CD5910}"/>
               </a:ext>
             </a:extLst>
           </p:cNvPr>
@@ -2807,7 +2807,7 @@
           <p:cNvPr id="3" name="Text Placeholder 2">
             <a:extLst>
               <a:ext uri="{FF2B5EF4-FFF2-40B4-BE49-F238E27FC236}">
-                <a16:creationId xmlns:a16="http://schemas.microsoft.com/office/drawing/2014/main" xmlns="" id="{EB9123EC-1FFA-46CB-8871-EAF17D6C9DAD}"/>
+                <a16:creationId xmlns="" xmlns:a16="http://schemas.microsoft.com/office/drawing/2014/main" id="{EB9123EC-1FFA-46CB-8871-EAF17D6C9DAD}"/>
               </a:ext>
             </a:extLst>
           </p:cNvPr>
@@ -2874,7 +2874,7 @@
           <p:cNvPr id="4" name="Date Placeholder 3">
             <a:extLst>
               <a:ext uri="{FF2B5EF4-FFF2-40B4-BE49-F238E27FC236}">
-                <a16:creationId xmlns:a16="http://schemas.microsoft.com/office/drawing/2014/main" xmlns="" id="{0BAD4AA6-8077-4EAF-AE9E-7D9FB52B3DF3}"/>
+                <a16:creationId xmlns="" xmlns:a16="http://schemas.microsoft.com/office/drawing/2014/main" id="{0BAD4AA6-8077-4EAF-AE9E-7D9FB52B3DF3}"/>
               </a:ext>
             </a:extLst>
           </p:cNvPr>
@@ -2921,7 +2921,7 @@
           <p:cNvPr id="5" name="Footer Placeholder 4">
             <a:extLst>
               <a:ext uri="{FF2B5EF4-FFF2-40B4-BE49-F238E27FC236}">
-                <a16:creationId xmlns:a16="http://schemas.microsoft.com/office/drawing/2014/main" xmlns="" id="{256705BA-E28C-4DA2-8032-24F203AC40AE}"/>
+                <a16:creationId xmlns="" xmlns:a16="http://schemas.microsoft.com/office/drawing/2014/main" id="{256705BA-E28C-4DA2-8032-24F203AC40AE}"/>
               </a:ext>
             </a:extLst>
           </p:cNvPr>
@@ -2964,7 +2964,7 @@
           <p:cNvPr id="6" name="Slide Number Placeholder 5">
             <a:extLst>
               <a:ext uri="{FF2B5EF4-FFF2-40B4-BE49-F238E27FC236}">
-                <a16:creationId xmlns:a16="http://schemas.microsoft.com/office/drawing/2014/main" xmlns="" id="{40F03837-9D8E-4C34-9AD5-4D3CA46B04ED}"/>
+                <a16:creationId xmlns="" xmlns:a16="http://schemas.microsoft.com/office/drawing/2014/main" id="{40F03837-9D8E-4C34-9AD5-4D3CA46B04ED}"/>
               </a:ext>
             </a:extLst>
           </p:cNvPr>
@@ -3366,7 +3366,7 @@
           <p:cNvPr id="19" name="Rectangle 18">
             <a:extLst>
               <a:ext uri="{FF2B5EF4-FFF2-40B4-BE49-F238E27FC236}">
-                <a16:creationId xmlns:a16="http://schemas.microsoft.com/office/drawing/2014/main" xmlns="" id="{32D851B6-714A-4883-8D4E-754A7ED882BA}"/>
+                <a16:creationId xmlns="" xmlns:a16="http://schemas.microsoft.com/office/drawing/2014/main" id="{32D851B6-714A-4883-8D4E-754A7ED882BA}"/>
               </a:ext>
             </a:extLst>
           </p:cNvPr>
@@ -3412,7 +3412,7 @@
           <p:cNvPr id="23" name="Rectangle 22">
             <a:extLst>
               <a:ext uri="{FF2B5EF4-FFF2-40B4-BE49-F238E27FC236}">
-                <a16:creationId xmlns:a16="http://schemas.microsoft.com/office/drawing/2014/main" xmlns="" id="{F0CB5917-D9C5-4F78-B41A-F70D3EFFCF26}"/>
+                <a16:creationId xmlns="" xmlns:a16="http://schemas.microsoft.com/office/drawing/2014/main" id="{F0CB5917-D9C5-4F78-B41A-F70D3EFFCF26}"/>
               </a:ext>
             </a:extLst>
           </p:cNvPr>
@@ -3474,7 +3474,7 @@
           <p:cNvPr id="25" name="Rectangle 24">
             <a:extLst>
               <a:ext uri="{FF2B5EF4-FFF2-40B4-BE49-F238E27FC236}">
-                <a16:creationId xmlns:a16="http://schemas.microsoft.com/office/drawing/2014/main" xmlns="" id="{A26B1B57-39F1-4784-BB8C-D498B044853A}"/>
+                <a16:creationId xmlns="" xmlns:a16="http://schemas.microsoft.com/office/drawing/2014/main" id="{A26B1B57-39F1-4784-BB8C-D498B044853A}"/>
               </a:ext>
             </a:extLst>
           </p:cNvPr>
@@ -3536,7 +3536,7 @@
           <p:cNvPr id="4" name="TextBox 3">
             <a:extLst>
               <a:ext uri="{FF2B5EF4-FFF2-40B4-BE49-F238E27FC236}">
-                <a16:creationId xmlns:a16="http://schemas.microsoft.com/office/drawing/2014/main" xmlns="" id="{77AFE952-47A5-42E2-A2EC-FF7ABEA49A89}"/>
+                <a16:creationId xmlns="" xmlns:a16="http://schemas.microsoft.com/office/drawing/2014/main" id="{77AFE952-47A5-42E2-A2EC-FF7ABEA49A89}"/>
               </a:ext>
             </a:extLst>
           </p:cNvPr>
@@ -3579,7 +3579,7 @@
           <p:cNvPr id="5" name="TextBox 4">
             <a:extLst>
               <a:ext uri="{FF2B5EF4-FFF2-40B4-BE49-F238E27FC236}">
-                <a16:creationId xmlns:a16="http://schemas.microsoft.com/office/drawing/2014/main" xmlns="" id="{090298AF-3D44-4478-B386-6971E79EB79D}"/>
+                <a16:creationId xmlns="" xmlns:a16="http://schemas.microsoft.com/office/drawing/2014/main" id="{090298AF-3D44-4478-B386-6971E79EB79D}"/>
               </a:ext>
             </a:extLst>
           </p:cNvPr>
@@ -3614,7 +3614,7 @@
           <p:cNvPr id="6" name="Rectangle 5">
             <a:extLst>
               <a:ext uri="{FF2B5EF4-FFF2-40B4-BE49-F238E27FC236}">
-                <a16:creationId xmlns:a16="http://schemas.microsoft.com/office/drawing/2014/main" xmlns="" id="{B4931A1A-F246-44F6-A374-61C9F9C636E0}"/>
+                <a16:creationId xmlns="" xmlns:a16="http://schemas.microsoft.com/office/drawing/2014/main" id="{B4931A1A-F246-44F6-A374-61C9F9C636E0}"/>
               </a:ext>
             </a:extLst>
           </p:cNvPr>
@@ -3660,7 +3660,7 @@
           <p:cNvPr id="8" name="Table 7">
             <a:extLst>
               <a:ext uri="{FF2B5EF4-FFF2-40B4-BE49-F238E27FC236}">
-                <a16:creationId xmlns:a16="http://schemas.microsoft.com/office/drawing/2014/main" xmlns="" id="{216E663B-7C2E-4835-91C1-5C8FB8698420}"/>
+                <a16:creationId xmlns="" xmlns:a16="http://schemas.microsoft.com/office/drawing/2014/main" id="{216E663B-7C2E-4835-91C1-5C8FB8698420}"/>
               </a:ext>
             </a:extLst>
           </p:cNvPr>
@@ -3689,28 +3689,28 @@
                 <a:gridCol w="721889">
                   <a:extLst>
                     <a:ext uri="{9D8B030D-6E8A-4147-A177-3AD203B41FA5}">
-                      <a16:colId xmlns:a16="http://schemas.microsoft.com/office/drawing/2014/main" xmlns="" val="233666424"/>
+                      <a16:colId xmlns="" xmlns:a16="http://schemas.microsoft.com/office/drawing/2014/main" val="233666424"/>
                     </a:ext>
                   </a:extLst>
                 </a:gridCol>
                 <a:gridCol w="783522">
                   <a:extLst>
                     <a:ext uri="{9D8B030D-6E8A-4147-A177-3AD203B41FA5}">
-                      <a16:colId xmlns:a16="http://schemas.microsoft.com/office/drawing/2014/main" xmlns="" val="972059951"/>
+                      <a16:colId xmlns="" xmlns:a16="http://schemas.microsoft.com/office/drawing/2014/main" val="972059951"/>
                     </a:ext>
                   </a:extLst>
                 </a:gridCol>
                 <a:gridCol w="1049516">
                   <a:extLst>
                     <a:ext uri="{9D8B030D-6E8A-4147-A177-3AD203B41FA5}">
-                      <a16:colId xmlns:a16="http://schemas.microsoft.com/office/drawing/2014/main" xmlns="" val="2188007159"/>
+                      <a16:colId xmlns="" xmlns:a16="http://schemas.microsoft.com/office/drawing/2014/main" val="2188007159"/>
                     </a:ext>
                   </a:extLst>
                 </a:gridCol>
                 <a:gridCol w="899906">
                   <a:extLst>
                     <a:ext uri="{9D8B030D-6E8A-4147-A177-3AD203B41FA5}">
-                      <a16:colId xmlns:a16="http://schemas.microsoft.com/office/drawing/2014/main" xmlns="" val="3389346521"/>
+                      <a16:colId xmlns="" xmlns:a16="http://schemas.microsoft.com/office/drawing/2014/main" val="3389346521"/>
                     </a:ext>
                   </a:extLst>
                 </a:gridCol>
@@ -3810,7 +3810,7 @@
                 </a:tc>
                 <a:extLst>
                   <a:ext uri="{0D108BD9-81ED-4DB2-BD59-A6C34878D82A}">
-                    <a16:rowId xmlns:a16="http://schemas.microsoft.com/office/drawing/2014/main" xmlns="" val="300847090"/>
+                    <a16:rowId xmlns="" xmlns:a16="http://schemas.microsoft.com/office/drawing/2014/main" val="300847090"/>
                   </a:ext>
                 </a:extLst>
               </a:tr>
@@ -3823,7 +3823,7 @@
           <p:cNvPr id="9" name="Table 8">
             <a:extLst>
               <a:ext uri="{FF2B5EF4-FFF2-40B4-BE49-F238E27FC236}">
-                <a16:creationId xmlns:a16="http://schemas.microsoft.com/office/drawing/2014/main" xmlns="" id="{7488BC97-D05E-4727-B765-F9F045F12689}"/>
+                <a16:creationId xmlns="" xmlns:a16="http://schemas.microsoft.com/office/drawing/2014/main" id="{7488BC97-D05E-4727-B765-F9F045F12689}"/>
               </a:ext>
             </a:extLst>
           </p:cNvPr>
@@ -3852,28 +3852,28 @@
                 <a:gridCol w="721889">
                   <a:extLst>
                     <a:ext uri="{9D8B030D-6E8A-4147-A177-3AD203B41FA5}">
-                      <a16:colId xmlns:a16="http://schemas.microsoft.com/office/drawing/2014/main" xmlns="" val="3693118018"/>
+                      <a16:colId xmlns="" xmlns:a16="http://schemas.microsoft.com/office/drawing/2014/main" val="3693118018"/>
                     </a:ext>
                   </a:extLst>
                 </a:gridCol>
                 <a:gridCol w="812579">
                   <a:extLst>
                     <a:ext uri="{9D8B030D-6E8A-4147-A177-3AD203B41FA5}">
-                      <a16:colId xmlns:a16="http://schemas.microsoft.com/office/drawing/2014/main" xmlns="" val="952852968"/>
+                      <a16:colId xmlns="" xmlns:a16="http://schemas.microsoft.com/office/drawing/2014/main" val="952852968"/>
                     </a:ext>
                   </a:extLst>
                 </a:gridCol>
                 <a:gridCol w="1020459">
                   <a:extLst>
                     <a:ext uri="{9D8B030D-6E8A-4147-A177-3AD203B41FA5}">
-                      <a16:colId xmlns:a16="http://schemas.microsoft.com/office/drawing/2014/main" xmlns="" val="1816747115"/>
+                      <a16:colId xmlns="" xmlns:a16="http://schemas.microsoft.com/office/drawing/2014/main" val="1816747115"/>
                     </a:ext>
                   </a:extLst>
                 </a:gridCol>
                 <a:gridCol w="899906">
                   <a:extLst>
                     <a:ext uri="{9D8B030D-6E8A-4147-A177-3AD203B41FA5}">
-                      <a16:colId xmlns:a16="http://schemas.microsoft.com/office/drawing/2014/main" xmlns="" val="55182559"/>
+                      <a16:colId xmlns="" xmlns:a16="http://schemas.microsoft.com/office/drawing/2014/main" val="55182559"/>
                     </a:ext>
                   </a:extLst>
                 </a:gridCol>
@@ -3985,7 +3985,7 @@
                 </a:tc>
                 <a:extLst>
                   <a:ext uri="{0D108BD9-81ED-4DB2-BD59-A6C34878D82A}">
-                    <a16:rowId xmlns:a16="http://schemas.microsoft.com/office/drawing/2014/main" xmlns="" val="2287119280"/>
+                    <a16:rowId xmlns="" xmlns:a16="http://schemas.microsoft.com/office/drawing/2014/main" val="2287119280"/>
                   </a:ext>
                 </a:extLst>
               </a:tr>
@@ -3998,7 +3998,7 @@
           <p:cNvPr id="10" name="Table 9">
             <a:extLst>
               <a:ext uri="{FF2B5EF4-FFF2-40B4-BE49-F238E27FC236}">
-                <a16:creationId xmlns:a16="http://schemas.microsoft.com/office/drawing/2014/main" xmlns="" id="{8B53D829-A13C-4105-BD19-80750650E577}"/>
+                <a16:creationId xmlns="" xmlns:a16="http://schemas.microsoft.com/office/drawing/2014/main" id="{8B53D829-A13C-4105-BD19-80750650E577}"/>
               </a:ext>
             </a:extLst>
           </p:cNvPr>
@@ -4027,28 +4027,28 @@
                 <a:gridCol w="721889">
                   <a:extLst>
                     <a:ext uri="{9D8B030D-6E8A-4147-A177-3AD203B41FA5}">
-                      <a16:colId xmlns:a16="http://schemas.microsoft.com/office/drawing/2014/main" xmlns="" val="1464581443"/>
+                      <a16:colId xmlns="" xmlns:a16="http://schemas.microsoft.com/office/drawing/2014/main" val="1464581443"/>
                     </a:ext>
                   </a:extLst>
                 </a:gridCol>
                 <a:gridCol w="783522">
                   <a:extLst>
                     <a:ext uri="{9D8B030D-6E8A-4147-A177-3AD203B41FA5}">
-                      <a16:colId xmlns:a16="http://schemas.microsoft.com/office/drawing/2014/main" xmlns="" val="3127435560"/>
+                      <a16:colId xmlns="" xmlns:a16="http://schemas.microsoft.com/office/drawing/2014/main" val="3127435560"/>
                     </a:ext>
                   </a:extLst>
                 </a:gridCol>
                 <a:gridCol w="1049516">
                   <a:extLst>
                     <a:ext uri="{9D8B030D-6E8A-4147-A177-3AD203B41FA5}">
-                      <a16:colId xmlns:a16="http://schemas.microsoft.com/office/drawing/2014/main" xmlns="" val="2161992991"/>
+                      <a16:colId xmlns="" xmlns:a16="http://schemas.microsoft.com/office/drawing/2014/main" val="2161992991"/>
                     </a:ext>
                   </a:extLst>
                 </a:gridCol>
                 <a:gridCol w="899906">
                   <a:extLst>
                     <a:ext uri="{9D8B030D-6E8A-4147-A177-3AD203B41FA5}">
-                      <a16:colId xmlns:a16="http://schemas.microsoft.com/office/drawing/2014/main" xmlns="" val="732979080"/>
+                      <a16:colId xmlns="" xmlns:a16="http://schemas.microsoft.com/office/drawing/2014/main" val="732979080"/>
                     </a:ext>
                   </a:extLst>
                 </a:gridCol>
@@ -4160,7 +4160,7 @@
                 </a:tc>
                 <a:extLst>
                   <a:ext uri="{0D108BD9-81ED-4DB2-BD59-A6C34878D82A}">
-                    <a16:rowId xmlns:a16="http://schemas.microsoft.com/office/drawing/2014/main" xmlns="" val="2949352622"/>
+                    <a16:rowId xmlns="" xmlns:a16="http://schemas.microsoft.com/office/drawing/2014/main" val="2949352622"/>
                   </a:ext>
                 </a:extLst>
               </a:tr>
@@ -4173,7 +4173,7 @@
           <p:cNvPr id="13" name="Rectangle 12">
             <a:extLst>
               <a:ext uri="{FF2B5EF4-FFF2-40B4-BE49-F238E27FC236}">
-                <a16:creationId xmlns:a16="http://schemas.microsoft.com/office/drawing/2014/main" xmlns="" id="{88911F9B-762D-4D9D-8D59-8C7C40A1A285}"/>
+                <a16:creationId xmlns="" xmlns:a16="http://schemas.microsoft.com/office/drawing/2014/main" id="{88911F9B-762D-4D9D-8D59-8C7C40A1A285}"/>
               </a:ext>
             </a:extLst>
           </p:cNvPr>
@@ -4235,7 +4235,7 @@
           <p:cNvPr id="15" name="Rectangle 14">
             <a:extLst>
               <a:ext uri="{FF2B5EF4-FFF2-40B4-BE49-F238E27FC236}">
-                <a16:creationId xmlns:a16="http://schemas.microsoft.com/office/drawing/2014/main" xmlns="" id="{8899DA91-943D-48DA-AAB3-0895C2AAF047}"/>
+                <a16:creationId xmlns="" xmlns:a16="http://schemas.microsoft.com/office/drawing/2014/main" id="{8899DA91-943D-48DA-AAB3-0895C2AAF047}"/>
               </a:ext>
             </a:extLst>
           </p:cNvPr>
@@ -4297,7 +4297,7 @@
           <p:cNvPr id="17" name="Rectangle 16">
             <a:extLst>
               <a:ext uri="{FF2B5EF4-FFF2-40B4-BE49-F238E27FC236}">
-                <a16:creationId xmlns:a16="http://schemas.microsoft.com/office/drawing/2014/main" xmlns="" id="{ABD8C12D-0590-401B-9810-3C70D06503BB}"/>
+                <a16:creationId xmlns="" xmlns:a16="http://schemas.microsoft.com/office/drawing/2014/main" id="{ABD8C12D-0590-401B-9810-3C70D06503BB}"/>
               </a:ext>
             </a:extLst>
           </p:cNvPr>
@@ -4359,7 +4359,7 @@
           <p:cNvPr id="35" name="Straight Connector 34">
             <a:extLst>
               <a:ext uri="{FF2B5EF4-FFF2-40B4-BE49-F238E27FC236}">
-                <a16:creationId xmlns:a16="http://schemas.microsoft.com/office/drawing/2014/main" xmlns="" id="{B6A3EA80-60C5-4431-980D-80005D3FE9D3}"/>
+                <a16:creationId xmlns="" xmlns:a16="http://schemas.microsoft.com/office/drawing/2014/main" id="{B6A3EA80-60C5-4431-980D-80005D3FE9D3}"/>
               </a:ext>
             </a:extLst>
           </p:cNvPr>
@@ -4401,7 +4401,7 @@
           <p:cNvPr id="36" name="Straight Connector 35">
             <a:extLst>
               <a:ext uri="{FF2B5EF4-FFF2-40B4-BE49-F238E27FC236}">
-                <a16:creationId xmlns:a16="http://schemas.microsoft.com/office/drawing/2014/main" xmlns="" id="{82BD31D8-AEB2-4A38-A420-A825020DD77E}"/>
+                <a16:creationId xmlns="" xmlns:a16="http://schemas.microsoft.com/office/drawing/2014/main" id="{82BD31D8-AEB2-4A38-A420-A825020DD77E}"/>
               </a:ext>
             </a:extLst>
           </p:cNvPr>
@@ -4443,7 +4443,7 @@
           <p:cNvPr id="37" name="Straight Connector 36">
             <a:extLst>
               <a:ext uri="{FF2B5EF4-FFF2-40B4-BE49-F238E27FC236}">
-                <a16:creationId xmlns:a16="http://schemas.microsoft.com/office/drawing/2014/main" xmlns="" id="{7DE8383F-8BE6-4377-8AA9-3A3873DC3067}"/>
+                <a16:creationId xmlns="" xmlns:a16="http://schemas.microsoft.com/office/drawing/2014/main" id="{7DE8383F-8BE6-4377-8AA9-3A3873DC3067}"/>
               </a:ext>
             </a:extLst>
           </p:cNvPr>
@@ -4485,7 +4485,7 @@
           <p:cNvPr id="39" name="TextBox 38">
             <a:extLst>
               <a:ext uri="{FF2B5EF4-FFF2-40B4-BE49-F238E27FC236}">
-                <a16:creationId xmlns:a16="http://schemas.microsoft.com/office/drawing/2014/main" xmlns="" id="{77DACC8D-3953-4CF9-A052-552278EA3516}"/>
+                <a16:creationId xmlns="" xmlns:a16="http://schemas.microsoft.com/office/drawing/2014/main" id="{77DACC8D-3953-4CF9-A052-552278EA3516}"/>
               </a:ext>
             </a:extLst>
           </p:cNvPr>
@@ -4530,7 +4530,7 @@
           <p:cNvPr id="24" name="Rectangle 23">
             <a:extLst>
               <a:ext uri="{FF2B5EF4-FFF2-40B4-BE49-F238E27FC236}">
-                <a16:creationId xmlns:a16="http://schemas.microsoft.com/office/drawing/2014/main" xmlns="" id="{A26B1B57-39F1-4784-BB8C-D498B044853A}"/>
+                <a16:creationId xmlns="" xmlns:a16="http://schemas.microsoft.com/office/drawing/2014/main" id="{A26B1B57-39F1-4784-BB8C-D498B044853A}"/>
               </a:ext>
             </a:extLst>
           </p:cNvPr>
@@ -4592,7 +4592,7 @@
           <p:cNvPr id="26" name="Rectangle 25">
             <a:extLst>
               <a:ext uri="{FF2B5EF4-FFF2-40B4-BE49-F238E27FC236}">
-                <a16:creationId xmlns:a16="http://schemas.microsoft.com/office/drawing/2014/main" xmlns="" id="{ABD8C12D-0590-401B-9810-3C70D06503BB}"/>
+                <a16:creationId xmlns="" xmlns:a16="http://schemas.microsoft.com/office/drawing/2014/main" id="{ABD8C12D-0590-401B-9810-3C70D06503BB}"/>
               </a:ext>
             </a:extLst>
           </p:cNvPr>
@@ -4654,7 +4654,7 @@
           <p:cNvPr id="28" name="Rectangle 27">
             <a:extLst>
               <a:ext uri="{FF2B5EF4-FFF2-40B4-BE49-F238E27FC236}">
-                <a16:creationId xmlns:a16="http://schemas.microsoft.com/office/drawing/2014/main" xmlns="" id="{ABD8C12D-0590-401B-9810-3C70D06503BB}"/>
+                <a16:creationId xmlns="" xmlns:a16="http://schemas.microsoft.com/office/drawing/2014/main" id="{ABD8C12D-0590-401B-9810-3C70D06503BB}"/>
               </a:ext>
             </a:extLst>
           </p:cNvPr>
@@ -4716,7 +4716,7 @@
           <p:cNvPr id="30" name="Rectangle 29">
             <a:extLst>
               <a:ext uri="{FF2B5EF4-FFF2-40B4-BE49-F238E27FC236}">
-                <a16:creationId xmlns:a16="http://schemas.microsoft.com/office/drawing/2014/main" xmlns="" id="{ABD8C12D-0590-401B-9810-3C70D06503BB}"/>
+                <a16:creationId xmlns="" xmlns:a16="http://schemas.microsoft.com/office/drawing/2014/main" id="{ABD8C12D-0590-401B-9810-3C70D06503BB}"/>
               </a:ext>
             </a:extLst>
           </p:cNvPr>
@@ -4778,7 +4778,7 @@
           <p:cNvPr id="27" name="Rectangle 26">
             <a:extLst>
               <a:ext uri="{FF2B5EF4-FFF2-40B4-BE49-F238E27FC236}">
-                <a16:creationId xmlns:a16="http://schemas.microsoft.com/office/drawing/2014/main" xmlns="" id="{A26B1B57-39F1-4784-BB8C-D498B044853A}"/>
+                <a16:creationId xmlns="" xmlns:a16="http://schemas.microsoft.com/office/drawing/2014/main" id="{A26B1B57-39F1-4784-BB8C-D498B044853A}"/>
               </a:ext>
             </a:extLst>
           </p:cNvPr>
@@ -4840,7 +4840,7 @@
           <p:cNvPr id="29" name="Rectangle 28">
             <a:extLst>
               <a:ext uri="{FF2B5EF4-FFF2-40B4-BE49-F238E27FC236}">
-                <a16:creationId xmlns:a16="http://schemas.microsoft.com/office/drawing/2014/main" xmlns="" id="{A26B1B57-39F1-4784-BB8C-D498B044853A}"/>
+                <a16:creationId xmlns="" xmlns:a16="http://schemas.microsoft.com/office/drawing/2014/main" id="{A26B1B57-39F1-4784-BB8C-D498B044853A}"/>
               </a:ext>
             </a:extLst>
           </p:cNvPr>
@@ -4902,7 +4902,7 @@
           <p:cNvPr id="31" name="Rectangle 30">
             <a:extLst>
               <a:ext uri="{FF2B5EF4-FFF2-40B4-BE49-F238E27FC236}">
-                <a16:creationId xmlns:a16="http://schemas.microsoft.com/office/drawing/2014/main" xmlns="" id="{ABD8C12D-0590-401B-9810-3C70D06503BB}"/>
+                <a16:creationId xmlns="" xmlns:a16="http://schemas.microsoft.com/office/drawing/2014/main" id="{ABD8C12D-0590-401B-9810-3C70D06503BB}"/>
               </a:ext>
             </a:extLst>
           </p:cNvPr>
@@ -4964,7 +4964,7 @@
           <p:cNvPr id="33" name="Rectangle 32">
             <a:extLst>
               <a:ext uri="{FF2B5EF4-FFF2-40B4-BE49-F238E27FC236}">
-                <a16:creationId xmlns:a16="http://schemas.microsoft.com/office/drawing/2014/main" xmlns="" id="{ABD8C12D-0590-401B-9810-3C70D06503BB}"/>
+                <a16:creationId xmlns="" xmlns:a16="http://schemas.microsoft.com/office/drawing/2014/main" id="{ABD8C12D-0590-401B-9810-3C70D06503BB}"/>
               </a:ext>
             </a:extLst>
           </p:cNvPr>
@@ -5090,7 +5090,7 @@
           <p:cNvPr id="19" name="Rectangle 18">
             <a:extLst>
               <a:ext uri="{FF2B5EF4-FFF2-40B4-BE49-F238E27FC236}">
-                <a16:creationId xmlns:a16="http://schemas.microsoft.com/office/drawing/2014/main" xmlns="" id="{32D851B6-714A-4883-8D4E-754A7ED882BA}"/>
+                <a16:creationId xmlns="" xmlns:a16="http://schemas.microsoft.com/office/drawing/2014/main" id="{32D851B6-714A-4883-8D4E-754A7ED882BA}"/>
               </a:ext>
             </a:extLst>
           </p:cNvPr>
@@ -5136,7 +5136,7 @@
           <p:cNvPr id="21" name="Rectangle 20">
             <a:extLst>
               <a:ext uri="{FF2B5EF4-FFF2-40B4-BE49-F238E27FC236}">
-                <a16:creationId xmlns:a16="http://schemas.microsoft.com/office/drawing/2014/main" xmlns="" id="{B2FF60AC-91EF-4D69-ACB9-CC146BDC6526}"/>
+                <a16:creationId xmlns="" xmlns:a16="http://schemas.microsoft.com/office/drawing/2014/main" id="{B2FF60AC-91EF-4D69-ACB9-CC146BDC6526}"/>
               </a:ext>
             </a:extLst>
           </p:cNvPr>
@@ -5198,7 +5198,7 @@
           <p:cNvPr id="23" name="Rectangle 22">
             <a:extLst>
               <a:ext uri="{FF2B5EF4-FFF2-40B4-BE49-F238E27FC236}">
-                <a16:creationId xmlns:a16="http://schemas.microsoft.com/office/drawing/2014/main" xmlns="" id="{F0CB5917-D9C5-4F78-B41A-F70D3EFFCF26}"/>
+                <a16:creationId xmlns="" xmlns:a16="http://schemas.microsoft.com/office/drawing/2014/main" id="{F0CB5917-D9C5-4F78-B41A-F70D3EFFCF26}"/>
               </a:ext>
             </a:extLst>
           </p:cNvPr>
@@ -5260,7 +5260,7 @@
           <p:cNvPr id="25" name="Rectangle 24">
             <a:extLst>
               <a:ext uri="{FF2B5EF4-FFF2-40B4-BE49-F238E27FC236}">
-                <a16:creationId xmlns:a16="http://schemas.microsoft.com/office/drawing/2014/main" xmlns="" id="{A26B1B57-39F1-4784-BB8C-D498B044853A}"/>
+                <a16:creationId xmlns="" xmlns:a16="http://schemas.microsoft.com/office/drawing/2014/main" id="{A26B1B57-39F1-4784-BB8C-D498B044853A}"/>
               </a:ext>
             </a:extLst>
           </p:cNvPr>
@@ -5322,7 +5322,7 @@
           <p:cNvPr id="4" name="TextBox 3">
             <a:extLst>
               <a:ext uri="{FF2B5EF4-FFF2-40B4-BE49-F238E27FC236}">
-                <a16:creationId xmlns:a16="http://schemas.microsoft.com/office/drawing/2014/main" xmlns="" id="{77AFE952-47A5-42E2-A2EC-FF7ABEA49A89}"/>
+                <a16:creationId xmlns="" xmlns:a16="http://schemas.microsoft.com/office/drawing/2014/main" id="{77AFE952-47A5-42E2-A2EC-FF7ABEA49A89}"/>
               </a:ext>
             </a:extLst>
           </p:cNvPr>
@@ -5365,7 +5365,7 @@
           <p:cNvPr id="5" name="TextBox 4">
             <a:extLst>
               <a:ext uri="{FF2B5EF4-FFF2-40B4-BE49-F238E27FC236}">
-                <a16:creationId xmlns:a16="http://schemas.microsoft.com/office/drawing/2014/main" xmlns="" id="{090298AF-3D44-4478-B386-6971E79EB79D}"/>
+                <a16:creationId xmlns="" xmlns:a16="http://schemas.microsoft.com/office/drawing/2014/main" id="{090298AF-3D44-4478-B386-6971E79EB79D}"/>
               </a:ext>
             </a:extLst>
           </p:cNvPr>
@@ -5400,7 +5400,7 @@
           <p:cNvPr id="6" name="Rectangle 5">
             <a:extLst>
               <a:ext uri="{FF2B5EF4-FFF2-40B4-BE49-F238E27FC236}">
-                <a16:creationId xmlns:a16="http://schemas.microsoft.com/office/drawing/2014/main" xmlns="" id="{B4931A1A-F246-44F6-A374-61C9F9C636E0}"/>
+                <a16:creationId xmlns="" xmlns:a16="http://schemas.microsoft.com/office/drawing/2014/main" id="{B4931A1A-F246-44F6-A374-61C9F9C636E0}"/>
               </a:ext>
             </a:extLst>
           </p:cNvPr>
@@ -5446,7 +5446,7 @@
           <p:cNvPr id="8" name="Table 7">
             <a:extLst>
               <a:ext uri="{FF2B5EF4-FFF2-40B4-BE49-F238E27FC236}">
-                <a16:creationId xmlns:a16="http://schemas.microsoft.com/office/drawing/2014/main" xmlns="" id="{216E663B-7C2E-4835-91C1-5C8FB8698420}"/>
+                <a16:creationId xmlns="" xmlns:a16="http://schemas.microsoft.com/office/drawing/2014/main" id="{216E663B-7C2E-4835-91C1-5C8FB8698420}"/>
               </a:ext>
             </a:extLst>
           </p:cNvPr>
@@ -5475,28 +5475,28 @@
                 <a:gridCol w="721889">
                   <a:extLst>
                     <a:ext uri="{9D8B030D-6E8A-4147-A177-3AD203B41FA5}">
-                      <a16:colId xmlns:a16="http://schemas.microsoft.com/office/drawing/2014/main" xmlns="" val="233666424"/>
+                      <a16:colId xmlns="" xmlns:a16="http://schemas.microsoft.com/office/drawing/2014/main" val="233666424"/>
                     </a:ext>
                   </a:extLst>
                 </a:gridCol>
                 <a:gridCol w="783522">
                   <a:extLst>
                     <a:ext uri="{9D8B030D-6E8A-4147-A177-3AD203B41FA5}">
-                      <a16:colId xmlns:a16="http://schemas.microsoft.com/office/drawing/2014/main" xmlns="" val="972059951"/>
+                      <a16:colId xmlns="" xmlns:a16="http://schemas.microsoft.com/office/drawing/2014/main" val="972059951"/>
                     </a:ext>
                   </a:extLst>
                 </a:gridCol>
                 <a:gridCol w="1049516">
                   <a:extLst>
                     <a:ext uri="{9D8B030D-6E8A-4147-A177-3AD203B41FA5}">
-                      <a16:colId xmlns:a16="http://schemas.microsoft.com/office/drawing/2014/main" xmlns="" val="2188007159"/>
+                      <a16:colId xmlns="" xmlns:a16="http://schemas.microsoft.com/office/drawing/2014/main" val="2188007159"/>
                     </a:ext>
                   </a:extLst>
                 </a:gridCol>
                 <a:gridCol w="899906">
                   <a:extLst>
                     <a:ext uri="{9D8B030D-6E8A-4147-A177-3AD203B41FA5}">
-                      <a16:colId xmlns:a16="http://schemas.microsoft.com/office/drawing/2014/main" xmlns="" val="3389346521"/>
+                      <a16:colId xmlns="" xmlns:a16="http://schemas.microsoft.com/office/drawing/2014/main" val="3389346521"/>
                     </a:ext>
                   </a:extLst>
                 </a:gridCol>
@@ -5596,7 +5596,7 @@
                 </a:tc>
                 <a:extLst>
                   <a:ext uri="{0D108BD9-81ED-4DB2-BD59-A6C34878D82A}">
-                    <a16:rowId xmlns:a16="http://schemas.microsoft.com/office/drawing/2014/main" xmlns="" val="300847090"/>
+                    <a16:rowId xmlns="" xmlns:a16="http://schemas.microsoft.com/office/drawing/2014/main" val="300847090"/>
                   </a:ext>
                 </a:extLst>
               </a:tr>
@@ -5609,7 +5609,7 @@
           <p:cNvPr id="9" name="Table 8">
             <a:extLst>
               <a:ext uri="{FF2B5EF4-FFF2-40B4-BE49-F238E27FC236}">
-                <a16:creationId xmlns:a16="http://schemas.microsoft.com/office/drawing/2014/main" xmlns="" id="{7488BC97-D05E-4727-B765-F9F045F12689}"/>
+                <a16:creationId xmlns="" xmlns:a16="http://schemas.microsoft.com/office/drawing/2014/main" id="{7488BC97-D05E-4727-B765-F9F045F12689}"/>
               </a:ext>
             </a:extLst>
           </p:cNvPr>
@@ -5638,28 +5638,28 @@
                 <a:gridCol w="721889">
                   <a:extLst>
                     <a:ext uri="{9D8B030D-6E8A-4147-A177-3AD203B41FA5}">
-                      <a16:colId xmlns:a16="http://schemas.microsoft.com/office/drawing/2014/main" xmlns="" val="3693118018"/>
+                      <a16:colId xmlns="" xmlns:a16="http://schemas.microsoft.com/office/drawing/2014/main" val="3693118018"/>
                     </a:ext>
                   </a:extLst>
                 </a:gridCol>
                 <a:gridCol w="783522">
                   <a:extLst>
                     <a:ext uri="{9D8B030D-6E8A-4147-A177-3AD203B41FA5}">
-                      <a16:colId xmlns:a16="http://schemas.microsoft.com/office/drawing/2014/main" xmlns="" val="952852968"/>
+                      <a16:colId xmlns="" xmlns:a16="http://schemas.microsoft.com/office/drawing/2014/main" val="952852968"/>
                     </a:ext>
                   </a:extLst>
                 </a:gridCol>
                 <a:gridCol w="1015871">
                   <a:extLst>
                     <a:ext uri="{9D8B030D-6E8A-4147-A177-3AD203B41FA5}">
-                      <a16:colId xmlns:a16="http://schemas.microsoft.com/office/drawing/2014/main" xmlns="" val="1816747115"/>
+                      <a16:colId xmlns="" xmlns:a16="http://schemas.microsoft.com/office/drawing/2014/main" val="1816747115"/>
                     </a:ext>
                   </a:extLst>
                 </a:gridCol>
                 <a:gridCol w="933551">
                   <a:extLst>
                     <a:ext uri="{9D8B030D-6E8A-4147-A177-3AD203B41FA5}">
-                      <a16:colId xmlns:a16="http://schemas.microsoft.com/office/drawing/2014/main" xmlns="" val="55182559"/>
+                      <a16:colId xmlns="" xmlns:a16="http://schemas.microsoft.com/office/drawing/2014/main" val="55182559"/>
                     </a:ext>
                   </a:extLst>
                 </a:gridCol>
@@ -5785,7 +5785,7 @@
                 </a:tc>
                 <a:extLst>
                   <a:ext uri="{0D108BD9-81ED-4DB2-BD59-A6C34878D82A}">
-                    <a16:rowId xmlns:a16="http://schemas.microsoft.com/office/drawing/2014/main" xmlns="" val="2287119280"/>
+                    <a16:rowId xmlns="" xmlns:a16="http://schemas.microsoft.com/office/drawing/2014/main" val="2287119280"/>
                   </a:ext>
                 </a:extLst>
               </a:tr>
@@ -5798,7 +5798,7 @@
           <p:cNvPr id="10" name="Table 9">
             <a:extLst>
               <a:ext uri="{FF2B5EF4-FFF2-40B4-BE49-F238E27FC236}">
-                <a16:creationId xmlns:a16="http://schemas.microsoft.com/office/drawing/2014/main" xmlns="" id="{8B53D829-A13C-4105-BD19-80750650E577}"/>
+                <a16:creationId xmlns="" xmlns:a16="http://schemas.microsoft.com/office/drawing/2014/main" id="{8B53D829-A13C-4105-BD19-80750650E577}"/>
               </a:ext>
             </a:extLst>
           </p:cNvPr>
@@ -5808,7 +5808,7 @@
           <p:nvPr>
             <p:extLst>
               <p:ext uri="{D42A27DB-BD31-4B8C-83A1-F6EECF244321}">
-                <p14:modId xmlns:p14="http://schemas.microsoft.com/office/powerpoint/2010/main" val="3102241257"/>
+                <p14:modId xmlns:p14="http://schemas.microsoft.com/office/powerpoint/2010/main" val="2843100279"/>
               </p:ext>
             </p:extLst>
           </p:nvPr>
@@ -5827,28 +5827,28 @@
                 <a:gridCol w="721889">
                   <a:extLst>
                     <a:ext uri="{9D8B030D-6E8A-4147-A177-3AD203B41FA5}">
-                      <a16:colId xmlns:a16="http://schemas.microsoft.com/office/drawing/2014/main" xmlns="" val="1464581443"/>
+                      <a16:colId xmlns="" xmlns:a16="http://schemas.microsoft.com/office/drawing/2014/main" val="1464581443"/>
                     </a:ext>
                   </a:extLst>
                 </a:gridCol>
                 <a:gridCol w="783522">
                   <a:extLst>
                     <a:ext uri="{9D8B030D-6E8A-4147-A177-3AD203B41FA5}">
-                      <a16:colId xmlns:a16="http://schemas.microsoft.com/office/drawing/2014/main" xmlns="" val="3127435560"/>
+                      <a16:colId xmlns="" xmlns:a16="http://schemas.microsoft.com/office/drawing/2014/main" val="3127435560"/>
                     </a:ext>
                   </a:extLst>
                 </a:gridCol>
                 <a:gridCol w="1049516">
                   <a:extLst>
                     <a:ext uri="{9D8B030D-6E8A-4147-A177-3AD203B41FA5}">
-                      <a16:colId xmlns:a16="http://schemas.microsoft.com/office/drawing/2014/main" xmlns="" val="2161992991"/>
+                      <a16:colId xmlns="" xmlns:a16="http://schemas.microsoft.com/office/drawing/2014/main" val="2161992991"/>
                     </a:ext>
                   </a:extLst>
                 </a:gridCol>
                 <a:gridCol w="899906">
                   <a:extLst>
                     <a:ext uri="{9D8B030D-6E8A-4147-A177-3AD203B41FA5}">
-                      <a16:colId xmlns:a16="http://schemas.microsoft.com/office/drawing/2014/main" xmlns="" val="732979080"/>
+                      <a16:colId xmlns="" xmlns:a16="http://schemas.microsoft.com/office/drawing/2014/main" val="732979080"/>
                     </a:ext>
                   </a:extLst>
                 </a:gridCol>
@@ -5949,7 +5949,37 @@
                           <a:effectLst/>
                           <a:latin typeface="Century Gothic" panose="020B0502020202020204" pitchFamily="34" charset="0"/>
                         </a:rPr>
-                        <a:t>Should have</a:t>
+                        <a:t>Nice</a:t>
+                      </a:r>
+                      <a:r>
+                        <a:rPr lang="en-US" sz="800" b="0" i="0" u="none" strike="noStrike" baseline="0" dirty="0" smtClean="0">
+                          <a:solidFill>
+                            <a:srgbClr val="000000"/>
+                          </a:solidFill>
+                          <a:effectLst/>
+                          <a:latin typeface="Century Gothic" panose="020B0502020202020204" pitchFamily="34" charset="0"/>
+                        </a:rPr>
+                        <a:t> to</a:t>
+                      </a:r>
+                      <a:r>
+                        <a:rPr lang="en-US" sz="800" b="0" i="0" u="none" strike="noStrike" dirty="0" smtClean="0">
+                          <a:solidFill>
+                            <a:srgbClr val="000000"/>
+                          </a:solidFill>
+                          <a:effectLst/>
+                          <a:latin typeface="Century Gothic" panose="020B0502020202020204" pitchFamily="34" charset="0"/>
+                        </a:rPr>
+                        <a:t> </a:t>
+                      </a:r>
+                      <a:r>
+                        <a:rPr lang="en-US" sz="800" b="0" i="0" u="none" strike="noStrike" dirty="0" smtClean="0">
+                          <a:solidFill>
+                            <a:srgbClr val="000000"/>
+                          </a:solidFill>
+                          <a:effectLst/>
+                          <a:latin typeface="Century Gothic" panose="020B0502020202020204" pitchFamily="34" charset="0"/>
+                        </a:rPr>
+                        <a:t>have</a:t>
                       </a:r>
                       <a:endParaRPr lang="en-US" sz="800" b="0" i="0" u="none" strike="noStrike" dirty="0">
                         <a:solidFill>
@@ -5964,7 +5994,7 @@
                 </a:tc>
                 <a:extLst>
                   <a:ext uri="{0D108BD9-81ED-4DB2-BD59-A6C34878D82A}">
-                    <a16:rowId xmlns:a16="http://schemas.microsoft.com/office/drawing/2014/main" xmlns="" val="2949352622"/>
+                    <a16:rowId xmlns="" xmlns:a16="http://schemas.microsoft.com/office/drawing/2014/main" val="2949352622"/>
                   </a:ext>
                 </a:extLst>
               </a:tr>
@@ -5977,7 +6007,7 @@
           <p:cNvPr id="15" name="Rectangle 14">
             <a:extLst>
               <a:ext uri="{FF2B5EF4-FFF2-40B4-BE49-F238E27FC236}">
-                <a16:creationId xmlns:a16="http://schemas.microsoft.com/office/drawing/2014/main" xmlns="" id="{8899DA91-943D-48DA-AAB3-0895C2AAF047}"/>
+                <a16:creationId xmlns="" xmlns:a16="http://schemas.microsoft.com/office/drawing/2014/main" id="{8899DA91-943D-48DA-AAB3-0895C2AAF047}"/>
               </a:ext>
             </a:extLst>
           </p:cNvPr>
@@ -6039,7 +6069,7 @@
           <p:cNvPr id="17" name="Rectangle 16">
             <a:extLst>
               <a:ext uri="{FF2B5EF4-FFF2-40B4-BE49-F238E27FC236}">
-                <a16:creationId xmlns:a16="http://schemas.microsoft.com/office/drawing/2014/main" xmlns="" id="{ABD8C12D-0590-401B-9810-3C70D06503BB}"/>
+                <a16:creationId xmlns="" xmlns:a16="http://schemas.microsoft.com/office/drawing/2014/main" id="{ABD8C12D-0590-401B-9810-3C70D06503BB}"/>
               </a:ext>
             </a:extLst>
           </p:cNvPr>
@@ -6101,7 +6131,7 @@
           <p:cNvPr id="35" name="Straight Connector 34">
             <a:extLst>
               <a:ext uri="{FF2B5EF4-FFF2-40B4-BE49-F238E27FC236}">
-                <a16:creationId xmlns:a16="http://schemas.microsoft.com/office/drawing/2014/main" xmlns="" id="{B6A3EA80-60C5-4431-980D-80005D3FE9D3}"/>
+                <a16:creationId xmlns="" xmlns:a16="http://schemas.microsoft.com/office/drawing/2014/main" id="{B6A3EA80-60C5-4431-980D-80005D3FE9D3}"/>
               </a:ext>
             </a:extLst>
           </p:cNvPr>
@@ -6143,7 +6173,7 @@
           <p:cNvPr id="36" name="Straight Connector 35">
             <a:extLst>
               <a:ext uri="{FF2B5EF4-FFF2-40B4-BE49-F238E27FC236}">
-                <a16:creationId xmlns:a16="http://schemas.microsoft.com/office/drawing/2014/main" xmlns="" id="{82BD31D8-AEB2-4A38-A420-A825020DD77E}"/>
+                <a16:creationId xmlns="" xmlns:a16="http://schemas.microsoft.com/office/drawing/2014/main" id="{82BD31D8-AEB2-4A38-A420-A825020DD77E}"/>
               </a:ext>
             </a:extLst>
           </p:cNvPr>
@@ -6185,7 +6215,7 @@
           <p:cNvPr id="37" name="Straight Connector 36">
             <a:extLst>
               <a:ext uri="{FF2B5EF4-FFF2-40B4-BE49-F238E27FC236}">
-                <a16:creationId xmlns:a16="http://schemas.microsoft.com/office/drawing/2014/main" xmlns="" id="{7DE8383F-8BE6-4377-8AA9-3A3873DC3067}"/>
+                <a16:creationId xmlns="" xmlns:a16="http://schemas.microsoft.com/office/drawing/2014/main" id="{7DE8383F-8BE6-4377-8AA9-3A3873DC3067}"/>
               </a:ext>
             </a:extLst>
           </p:cNvPr>
@@ -6227,7 +6257,7 @@
           <p:cNvPr id="39" name="TextBox 38">
             <a:extLst>
               <a:ext uri="{FF2B5EF4-FFF2-40B4-BE49-F238E27FC236}">
-                <a16:creationId xmlns:a16="http://schemas.microsoft.com/office/drawing/2014/main" xmlns="" id="{77DACC8D-3953-4CF9-A052-552278EA3516}"/>
+                <a16:creationId xmlns="" xmlns:a16="http://schemas.microsoft.com/office/drawing/2014/main" id="{77DACC8D-3953-4CF9-A052-552278EA3516}"/>
               </a:ext>
             </a:extLst>
           </p:cNvPr>
@@ -6272,7 +6302,7 @@
           <p:cNvPr id="24" name="Rectangle 23">
             <a:extLst>
               <a:ext uri="{FF2B5EF4-FFF2-40B4-BE49-F238E27FC236}">
-                <a16:creationId xmlns:a16="http://schemas.microsoft.com/office/drawing/2014/main" xmlns="" id="{A26B1B57-39F1-4784-BB8C-D498B044853A}"/>
+                <a16:creationId xmlns="" xmlns:a16="http://schemas.microsoft.com/office/drawing/2014/main" id="{A26B1B57-39F1-4784-BB8C-D498B044853A}"/>
               </a:ext>
             </a:extLst>
           </p:cNvPr>
@@ -6334,7 +6364,7 @@
           <p:cNvPr id="26" name="Rectangle 25">
             <a:extLst>
               <a:ext uri="{FF2B5EF4-FFF2-40B4-BE49-F238E27FC236}">
-                <a16:creationId xmlns:a16="http://schemas.microsoft.com/office/drawing/2014/main" xmlns="" id="{ABD8C12D-0590-401B-9810-3C70D06503BB}"/>
+                <a16:creationId xmlns="" xmlns:a16="http://schemas.microsoft.com/office/drawing/2014/main" id="{ABD8C12D-0590-401B-9810-3C70D06503BB}"/>
               </a:ext>
             </a:extLst>
           </p:cNvPr>
@@ -6412,7 +6442,7 @@
           <p:cNvPr id="28" name="Rectangle 27">
             <a:extLst>
               <a:ext uri="{FF2B5EF4-FFF2-40B4-BE49-F238E27FC236}">
-                <a16:creationId xmlns:a16="http://schemas.microsoft.com/office/drawing/2014/main" xmlns="" id="{ABD8C12D-0590-401B-9810-3C70D06503BB}"/>
+                <a16:creationId xmlns="" xmlns:a16="http://schemas.microsoft.com/office/drawing/2014/main" id="{ABD8C12D-0590-401B-9810-3C70D06503BB}"/>
               </a:ext>
             </a:extLst>
           </p:cNvPr>
@@ -6482,7 +6512,7 @@
           <p:cNvPr id="30" name="Rectangle 29">
             <a:extLst>
               <a:ext uri="{FF2B5EF4-FFF2-40B4-BE49-F238E27FC236}">
-                <a16:creationId xmlns:a16="http://schemas.microsoft.com/office/drawing/2014/main" xmlns="" id="{ABD8C12D-0590-401B-9810-3C70D06503BB}"/>
+                <a16:creationId xmlns="" xmlns:a16="http://schemas.microsoft.com/office/drawing/2014/main" id="{ABD8C12D-0590-401B-9810-3C70D06503BB}"/>
               </a:ext>
             </a:extLst>
           </p:cNvPr>
@@ -6549,15 +6579,7 @@
                   <a:schemeClr val="bg1"/>
                 </a:solidFill>
               </a:rPr>
-              <a:t>Change</a:t>
-            </a:r>
-            <a:r>
-              <a:rPr lang="en-US" sz="800" dirty="0" smtClean="0">
-                <a:solidFill>
-                  <a:schemeClr val="bg1"/>
-                </a:solidFill>
-              </a:rPr>
-              <a:t> </a:t>
+              <a:t>Change </a:t>
             </a:r>
             <a:r>
               <a:rPr lang="en-US" sz="800" dirty="0">
@@ -6576,7 +6598,7 @@
           <p:cNvPr id="32" name="Rectangle 31">
             <a:extLst>
               <a:ext uri="{FF2B5EF4-FFF2-40B4-BE49-F238E27FC236}">
-                <a16:creationId xmlns:a16="http://schemas.microsoft.com/office/drawing/2014/main" xmlns="" id="{ABD8C12D-0590-401B-9810-3C70D06503BB}"/>
+                <a16:creationId xmlns="" xmlns:a16="http://schemas.microsoft.com/office/drawing/2014/main" id="{ABD8C12D-0590-401B-9810-3C70D06503BB}"/>
               </a:ext>
             </a:extLst>
           </p:cNvPr>
@@ -6638,7 +6660,7 @@
           <p:cNvPr id="34" name="Rectangle 33">
             <a:extLst>
               <a:ext uri="{FF2B5EF4-FFF2-40B4-BE49-F238E27FC236}">
-                <a16:creationId xmlns:a16="http://schemas.microsoft.com/office/drawing/2014/main" xmlns="" id="{ABD8C12D-0590-401B-9810-3C70D06503BB}"/>
+                <a16:creationId xmlns="" xmlns:a16="http://schemas.microsoft.com/office/drawing/2014/main" id="{ABD8C12D-0590-401B-9810-3C70D06503BB}"/>
               </a:ext>
             </a:extLst>
           </p:cNvPr>
@@ -6700,7 +6722,7 @@
           <p:cNvPr id="27" name="Rectangle 26">
             <a:extLst>
               <a:ext uri="{FF2B5EF4-FFF2-40B4-BE49-F238E27FC236}">
-                <a16:creationId xmlns:a16="http://schemas.microsoft.com/office/drawing/2014/main" xmlns="" id="{ABD8C12D-0590-401B-9810-3C70D06503BB}"/>
+                <a16:creationId xmlns="" xmlns:a16="http://schemas.microsoft.com/office/drawing/2014/main" id="{ABD8C12D-0590-401B-9810-3C70D06503BB}"/>
               </a:ext>
             </a:extLst>
           </p:cNvPr>
@@ -6778,7 +6800,7 @@
           <p:cNvPr id="29" name="Rectangle 28">
             <a:extLst>
               <a:ext uri="{FF2B5EF4-FFF2-40B4-BE49-F238E27FC236}">
-                <a16:creationId xmlns:a16="http://schemas.microsoft.com/office/drawing/2014/main" xmlns="" id="{ABD8C12D-0590-401B-9810-3C70D06503BB}"/>
+                <a16:creationId xmlns="" xmlns:a16="http://schemas.microsoft.com/office/drawing/2014/main" id="{ABD8C12D-0590-401B-9810-3C70D06503BB}"/>
               </a:ext>
             </a:extLst>
           </p:cNvPr>

</xml_diff>

<commit_message>
Updated Task Board 10/08
</commit_message>
<xml_diff>
--- a/sprint_task_board.pptx
+++ b/sprint_task_board.pptx
@@ -135,7 +135,7 @@
           <p:cNvPr id="2" name="Title 1">
             <a:extLst>
               <a:ext uri="{FF2B5EF4-FFF2-40B4-BE49-F238E27FC236}">
-                <a16:creationId xmlns="" xmlns:a16="http://schemas.microsoft.com/office/drawing/2014/main" id="{0F943FEA-7A47-4409-9E89-FC170A6238DF}"/>
+                <a16:creationId xmlns:a16="http://schemas.microsoft.com/office/drawing/2014/main" xmlns="" id="{0F943FEA-7A47-4409-9E89-FC170A6238DF}"/>
               </a:ext>
             </a:extLst>
           </p:cNvPr>
@@ -172,7 +172,7 @@
           <p:cNvPr id="3" name="Subtitle 2">
             <a:extLst>
               <a:ext uri="{FF2B5EF4-FFF2-40B4-BE49-F238E27FC236}">
-                <a16:creationId xmlns="" xmlns:a16="http://schemas.microsoft.com/office/drawing/2014/main" id="{17455DBF-6D85-48C6-8AA1-BA917C2FB494}"/>
+                <a16:creationId xmlns:a16="http://schemas.microsoft.com/office/drawing/2014/main" xmlns="" id="{17455DBF-6D85-48C6-8AA1-BA917C2FB494}"/>
               </a:ext>
             </a:extLst>
           </p:cNvPr>
@@ -242,7 +242,7 @@
           <p:cNvPr id="4" name="Date Placeholder 3">
             <a:extLst>
               <a:ext uri="{FF2B5EF4-FFF2-40B4-BE49-F238E27FC236}">
-                <a16:creationId xmlns="" xmlns:a16="http://schemas.microsoft.com/office/drawing/2014/main" id="{92F45BF1-9C23-40AD-8349-E05418B6196D}"/>
+                <a16:creationId xmlns:a16="http://schemas.microsoft.com/office/drawing/2014/main" xmlns="" id="{92F45BF1-9C23-40AD-8349-E05418B6196D}"/>
               </a:ext>
             </a:extLst>
           </p:cNvPr>
@@ -260,7 +260,7 @@
           <a:p>
             <a:fld id="{B6341FFD-5D10-463C-B7CE-F9E5B3035469}" type="datetimeFigureOut">
               <a:rPr lang="en-US" smtClean="0"/>
-              <a:t>10/6/2020</a:t>
+              <a:t>10/8/2020</a:t>
             </a:fld>
             <a:endParaRPr lang="en-US"/>
           </a:p>
@@ -271,7 +271,7 @@
           <p:cNvPr id="5" name="Footer Placeholder 4">
             <a:extLst>
               <a:ext uri="{FF2B5EF4-FFF2-40B4-BE49-F238E27FC236}">
-                <a16:creationId xmlns="" xmlns:a16="http://schemas.microsoft.com/office/drawing/2014/main" id="{ECB85B5C-F08E-4AE1-92FF-384357E21D05}"/>
+                <a16:creationId xmlns:a16="http://schemas.microsoft.com/office/drawing/2014/main" xmlns="" id="{ECB85B5C-F08E-4AE1-92FF-384357E21D05}"/>
               </a:ext>
             </a:extLst>
           </p:cNvPr>
@@ -296,7 +296,7 @@
           <p:cNvPr id="6" name="Slide Number Placeholder 5">
             <a:extLst>
               <a:ext uri="{FF2B5EF4-FFF2-40B4-BE49-F238E27FC236}">
-                <a16:creationId xmlns="" xmlns:a16="http://schemas.microsoft.com/office/drawing/2014/main" id="{89B3B116-9529-466B-AC7B-A74F950CF5D8}"/>
+                <a16:creationId xmlns:a16="http://schemas.microsoft.com/office/drawing/2014/main" xmlns="" id="{89B3B116-9529-466B-AC7B-A74F950CF5D8}"/>
               </a:ext>
             </a:extLst>
           </p:cNvPr>
@@ -355,7 +355,7 @@
           <p:cNvPr id="2" name="Title 1">
             <a:extLst>
               <a:ext uri="{FF2B5EF4-FFF2-40B4-BE49-F238E27FC236}">
-                <a16:creationId xmlns="" xmlns:a16="http://schemas.microsoft.com/office/drawing/2014/main" id="{5EB96799-CA27-4790-989C-57DD8467B761}"/>
+                <a16:creationId xmlns:a16="http://schemas.microsoft.com/office/drawing/2014/main" xmlns="" id="{5EB96799-CA27-4790-989C-57DD8467B761}"/>
               </a:ext>
             </a:extLst>
           </p:cNvPr>
@@ -383,7 +383,7 @@
           <p:cNvPr id="3" name="Vertical Text Placeholder 2">
             <a:extLst>
               <a:ext uri="{FF2B5EF4-FFF2-40B4-BE49-F238E27FC236}">
-                <a16:creationId xmlns="" xmlns:a16="http://schemas.microsoft.com/office/drawing/2014/main" id="{D94402C2-F698-476B-9D72-442347D77EC8}"/>
+                <a16:creationId xmlns:a16="http://schemas.microsoft.com/office/drawing/2014/main" xmlns="" id="{D94402C2-F698-476B-9D72-442347D77EC8}"/>
               </a:ext>
             </a:extLst>
           </p:cNvPr>
@@ -440,7 +440,7 @@
           <p:cNvPr id="4" name="Date Placeholder 3">
             <a:extLst>
               <a:ext uri="{FF2B5EF4-FFF2-40B4-BE49-F238E27FC236}">
-                <a16:creationId xmlns="" xmlns:a16="http://schemas.microsoft.com/office/drawing/2014/main" id="{91F5C79D-FC09-4104-926E-DE4DD920E8FA}"/>
+                <a16:creationId xmlns:a16="http://schemas.microsoft.com/office/drawing/2014/main" xmlns="" id="{91F5C79D-FC09-4104-926E-DE4DD920E8FA}"/>
               </a:ext>
             </a:extLst>
           </p:cNvPr>
@@ -458,7 +458,7 @@
           <a:p>
             <a:fld id="{B6341FFD-5D10-463C-B7CE-F9E5B3035469}" type="datetimeFigureOut">
               <a:rPr lang="en-US" smtClean="0"/>
-              <a:t>10/6/2020</a:t>
+              <a:t>10/8/2020</a:t>
             </a:fld>
             <a:endParaRPr lang="en-US"/>
           </a:p>
@@ -469,7 +469,7 @@
           <p:cNvPr id="5" name="Footer Placeholder 4">
             <a:extLst>
               <a:ext uri="{FF2B5EF4-FFF2-40B4-BE49-F238E27FC236}">
-                <a16:creationId xmlns="" xmlns:a16="http://schemas.microsoft.com/office/drawing/2014/main" id="{4374BBA1-54F6-4019-B5A2-84A658D10788}"/>
+                <a16:creationId xmlns:a16="http://schemas.microsoft.com/office/drawing/2014/main" xmlns="" id="{4374BBA1-54F6-4019-B5A2-84A658D10788}"/>
               </a:ext>
             </a:extLst>
           </p:cNvPr>
@@ -494,7 +494,7 @@
           <p:cNvPr id="6" name="Slide Number Placeholder 5">
             <a:extLst>
               <a:ext uri="{FF2B5EF4-FFF2-40B4-BE49-F238E27FC236}">
-                <a16:creationId xmlns="" xmlns:a16="http://schemas.microsoft.com/office/drawing/2014/main" id="{87607567-BD8C-45DA-8D0B-13DAD6F97CB9}"/>
+                <a16:creationId xmlns:a16="http://schemas.microsoft.com/office/drawing/2014/main" xmlns="" id="{87607567-BD8C-45DA-8D0B-13DAD6F97CB9}"/>
               </a:ext>
             </a:extLst>
           </p:cNvPr>
@@ -553,7 +553,7 @@
           <p:cNvPr id="2" name="Vertical Title 1">
             <a:extLst>
               <a:ext uri="{FF2B5EF4-FFF2-40B4-BE49-F238E27FC236}">
-                <a16:creationId xmlns="" xmlns:a16="http://schemas.microsoft.com/office/drawing/2014/main" id="{2B525709-D6AC-4A8F-B8AC-9000214497ED}"/>
+                <a16:creationId xmlns:a16="http://schemas.microsoft.com/office/drawing/2014/main" xmlns="" id="{2B525709-D6AC-4A8F-B8AC-9000214497ED}"/>
               </a:ext>
             </a:extLst>
           </p:cNvPr>
@@ -586,7 +586,7 @@
           <p:cNvPr id="3" name="Vertical Text Placeholder 2">
             <a:extLst>
               <a:ext uri="{FF2B5EF4-FFF2-40B4-BE49-F238E27FC236}">
-                <a16:creationId xmlns="" xmlns:a16="http://schemas.microsoft.com/office/drawing/2014/main" id="{A05FEA65-8697-4C09-B004-4CFE8A26AF19}"/>
+                <a16:creationId xmlns:a16="http://schemas.microsoft.com/office/drawing/2014/main" xmlns="" id="{A05FEA65-8697-4C09-B004-4CFE8A26AF19}"/>
               </a:ext>
             </a:extLst>
           </p:cNvPr>
@@ -648,7 +648,7 @@
           <p:cNvPr id="4" name="Date Placeholder 3">
             <a:extLst>
               <a:ext uri="{FF2B5EF4-FFF2-40B4-BE49-F238E27FC236}">
-                <a16:creationId xmlns="" xmlns:a16="http://schemas.microsoft.com/office/drawing/2014/main" id="{240D9E41-8DF6-4C00-93AC-BB3392D836F2}"/>
+                <a16:creationId xmlns:a16="http://schemas.microsoft.com/office/drawing/2014/main" xmlns="" id="{240D9E41-8DF6-4C00-93AC-BB3392D836F2}"/>
               </a:ext>
             </a:extLst>
           </p:cNvPr>
@@ -666,7 +666,7 @@
           <a:p>
             <a:fld id="{B6341FFD-5D10-463C-B7CE-F9E5B3035469}" type="datetimeFigureOut">
               <a:rPr lang="en-US" smtClean="0"/>
-              <a:t>10/6/2020</a:t>
+              <a:t>10/8/2020</a:t>
             </a:fld>
             <a:endParaRPr lang="en-US"/>
           </a:p>
@@ -677,7 +677,7 @@
           <p:cNvPr id="5" name="Footer Placeholder 4">
             <a:extLst>
               <a:ext uri="{FF2B5EF4-FFF2-40B4-BE49-F238E27FC236}">
-                <a16:creationId xmlns="" xmlns:a16="http://schemas.microsoft.com/office/drawing/2014/main" id="{DBCF2D0B-5479-4E58-BFAE-EF554D49F607}"/>
+                <a16:creationId xmlns:a16="http://schemas.microsoft.com/office/drawing/2014/main" xmlns="" id="{DBCF2D0B-5479-4E58-BFAE-EF554D49F607}"/>
               </a:ext>
             </a:extLst>
           </p:cNvPr>
@@ -702,7 +702,7 @@
           <p:cNvPr id="6" name="Slide Number Placeholder 5">
             <a:extLst>
               <a:ext uri="{FF2B5EF4-FFF2-40B4-BE49-F238E27FC236}">
-                <a16:creationId xmlns="" xmlns:a16="http://schemas.microsoft.com/office/drawing/2014/main" id="{4FE272FB-65B5-4679-9584-9FC1BB7B676D}"/>
+                <a16:creationId xmlns:a16="http://schemas.microsoft.com/office/drawing/2014/main" xmlns="" id="{4FE272FB-65B5-4679-9584-9FC1BB7B676D}"/>
               </a:ext>
             </a:extLst>
           </p:cNvPr>
@@ -761,7 +761,7 @@
           <p:cNvPr id="2" name="Title 1">
             <a:extLst>
               <a:ext uri="{FF2B5EF4-FFF2-40B4-BE49-F238E27FC236}">
-                <a16:creationId xmlns="" xmlns:a16="http://schemas.microsoft.com/office/drawing/2014/main" id="{FCE4474B-8A0A-4249-9DD6-26237794E02C}"/>
+                <a16:creationId xmlns:a16="http://schemas.microsoft.com/office/drawing/2014/main" xmlns="" id="{FCE4474B-8A0A-4249-9DD6-26237794E02C}"/>
               </a:ext>
             </a:extLst>
           </p:cNvPr>
@@ -789,7 +789,7 @@
           <p:cNvPr id="3" name="Content Placeholder 2">
             <a:extLst>
               <a:ext uri="{FF2B5EF4-FFF2-40B4-BE49-F238E27FC236}">
-                <a16:creationId xmlns="" xmlns:a16="http://schemas.microsoft.com/office/drawing/2014/main" id="{0D61969F-ABDC-4435-A745-655D77EB4A14}"/>
+                <a16:creationId xmlns:a16="http://schemas.microsoft.com/office/drawing/2014/main" xmlns="" id="{0D61969F-ABDC-4435-A745-655D77EB4A14}"/>
               </a:ext>
             </a:extLst>
           </p:cNvPr>
@@ -846,7 +846,7 @@
           <p:cNvPr id="4" name="Date Placeholder 3">
             <a:extLst>
               <a:ext uri="{FF2B5EF4-FFF2-40B4-BE49-F238E27FC236}">
-                <a16:creationId xmlns="" xmlns:a16="http://schemas.microsoft.com/office/drawing/2014/main" id="{B32380DB-4035-4455-BE5C-57F4F44D9D4C}"/>
+                <a16:creationId xmlns:a16="http://schemas.microsoft.com/office/drawing/2014/main" xmlns="" id="{B32380DB-4035-4455-BE5C-57F4F44D9D4C}"/>
               </a:ext>
             </a:extLst>
           </p:cNvPr>
@@ -864,7 +864,7 @@
           <a:p>
             <a:fld id="{B6341FFD-5D10-463C-B7CE-F9E5B3035469}" type="datetimeFigureOut">
               <a:rPr lang="en-US" smtClean="0"/>
-              <a:t>10/6/2020</a:t>
+              <a:t>10/8/2020</a:t>
             </a:fld>
             <a:endParaRPr lang="en-US"/>
           </a:p>
@@ -875,7 +875,7 @@
           <p:cNvPr id="5" name="Footer Placeholder 4">
             <a:extLst>
               <a:ext uri="{FF2B5EF4-FFF2-40B4-BE49-F238E27FC236}">
-                <a16:creationId xmlns="" xmlns:a16="http://schemas.microsoft.com/office/drawing/2014/main" id="{41E79801-5ECD-43D3-838F-ABC46DAB5C75}"/>
+                <a16:creationId xmlns:a16="http://schemas.microsoft.com/office/drawing/2014/main" xmlns="" id="{41E79801-5ECD-43D3-838F-ABC46DAB5C75}"/>
               </a:ext>
             </a:extLst>
           </p:cNvPr>
@@ -900,7 +900,7 @@
           <p:cNvPr id="6" name="Slide Number Placeholder 5">
             <a:extLst>
               <a:ext uri="{FF2B5EF4-FFF2-40B4-BE49-F238E27FC236}">
-                <a16:creationId xmlns="" xmlns:a16="http://schemas.microsoft.com/office/drawing/2014/main" id="{FB78BDAD-83E7-42B3-B17B-A69C4DE03F89}"/>
+                <a16:creationId xmlns:a16="http://schemas.microsoft.com/office/drawing/2014/main" xmlns="" id="{FB78BDAD-83E7-42B3-B17B-A69C4DE03F89}"/>
               </a:ext>
             </a:extLst>
           </p:cNvPr>
@@ -959,7 +959,7 @@
           <p:cNvPr id="2" name="Title 1">
             <a:extLst>
               <a:ext uri="{FF2B5EF4-FFF2-40B4-BE49-F238E27FC236}">
-                <a16:creationId xmlns="" xmlns:a16="http://schemas.microsoft.com/office/drawing/2014/main" id="{F177E510-0D60-41E4-9372-43C6C45B7310}"/>
+                <a16:creationId xmlns:a16="http://schemas.microsoft.com/office/drawing/2014/main" xmlns="" id="{F177E510-0D60-41E4-9372-43C6C45B7310}"/>
               </a:ext>
             </a:extLst>
           </p:cNvPr>
@@ -996,7 +996,7 @@
           <p:cNvPr id="3" name="Text Placeholder 2">
             <a:extLst>
               <a:ext uri="{FF2B5EF4-FFF2-40B4-BE49-F238E27FC236}">
-                <a16:creationId xmlns="" xmlns:a16="http://schemas.microsoft.com/office/drawing/2014/main" id="{E8F6BA69-9FB2-4475-A3AE-BA1D638B3057}"/>
+                <a16:creationId xmlns:a16="http://schemas.microsoft.com/office/drawing/2014/main" xmlns="" id="{E8F6BA69-9FB2-4475-A3AE-BA1D638B3057}"/>
               </a:ext>
             </a:extLst>
           </p:cNvPr>
@@ -1121,7 +1121,7 @@
           <p:cNvPr id="4" name="Date Placeholder 3">
             <a:extLst>
               <a:ext uri="{FF2B5EF4-FFF2-40B4-BE49-F238E27FC236}">
-                <a16:creationId xmlns="" xmlns:a16="http://schemas.microsoft.com/office/drawing/2014/main" id="{F627FFD9-5F22-48F0-A50C-A74460217CEA}"/>
+                <a16:creationId xmlns:a16="http://schemas.microsoft.com/office/drawing/2014/main" xmlns="" id="{F627FFD9-5F22-48F0-A50C-A74460217CEA}"/>
               </a:ext>
             </a:extLst>
           </p:cNvPr>
@@ -1139,7 +1139,7 @@
           <a:p>
             <a:fld id="{B6341FFD-5D10-463C-B7CE-F9E5B3035469}" type="datetimeFigureOut">
               <a:rPr lang="en-US" smtClean="0"/>
-              <a:t>10/6/2020</a:t>
+              <a:t>10/8/2020</a:t>
             </a:fld>
             <a:endParaRPr lang="en-US"/>
           </a:p>
@@ -1150,7 +1150,7 @@
           <p:cNvPr id="5" name="Footer Placeholder 4">
             <a:extLst>
               <a:ext uri="{FF2B5EF4-FFF2-40B4-BE49-F238E27FC236}">
-                <a16:creationId xmlns="" xmlns:a16="http://schemas.microsoft.com/office/drawing/2014/main" id="{0A6F0EF2-D60D-48DC-ACB7-5EBDA7B4B68F}"/>
+                <a16:creationId xmlns:a16="http://schemas.microsoft.com/office/drawing/2014/main" xmlns="" id="{0A6F0EF2-D60D-48DC-ACB7-5EBDA7B4B68F}"/>
               </a:ext>
             </a:extLst>
           </p:cNvPr>
@@ -1175,7 +1175,7 @@
           <p:cNvPr id="6" name="Slide Number Placeholder 5">
             <a:extLst>
               <a:ext uri="{FF2B5EF4-FFF2-40B4-BE49-F238E27FC236}">
-                <a16:creationId xmlns="" xmlns:a16="http://schemas.microsoft.com/office/drawing/2014/main" id="{B3D781CE-4C65-4E71-87AF-D1D98017967F}"/>
+                <a16:creationId xmlns:a16="http://schemas.microsoft.com/office/drawing/2014/main" xmlns="" id="{B3D781CE-4C65-4E71-87AF-D1D98017967F}"/>
               </a:ext>
             </a:extLst>
           </p:cNvPr>
@@ -1234,7 +1234,7 @@
           <p:cNvPr id="2" name="Title 1">
             <a:extLst>
               <a:ext uri="{FF2B5EF4-FFF2-40B4-BE49-F238E27FC236}">
-                <a16:creationId xmlns="" xmlns:a16="http://schemas.microsoft.com/office/drawing/2014/main" id="{747E8B63-9609-4BBF-B743-D777B4DBF6BB}"/>
+                <a16:creationId xmlns:a16="http://schemas.microsoft.com/office/drawing/2014/main" xmlns="" id="{747E8B63-9609-4BBF-B743-D777B4DBF6BB}"/>
               </a:ext>
             </a:extLst>
           </p:cNvPr>
@@ -1262,7 +1262,7 @@
           <p:cNvPr id="3" name="Content Placeholder 2">
             <a:extLst>
               <a:ext uri="{FF2B5EF4-FFF2-40B4-BE49-F238E27FC236}">
-                <a16:creationId xmlns="" xmlns:a16="http://schemas.microsoft.com/office/drawing/2014/main" id="{B7B47E64-1CC9-4DDF-9F4E-4F343FA90159}"/>
+                <a16:creationId xmlns:a16="http://schemas.microsoft.com/office/drawing/2014/main" xmlns="" id="{B7B47E64-1CC9-4DDF-9F4E-4F343FA90159}"/>
               </a:ext>
             </a:extLst>
           </p:cNvPr>
@@ -1324,7 +1324,7 @@
           <p:cNvPr id="4" name="Content Placeholder 3">
             <a:extLst>
               <a:ext uri="{FF2B5EF4-FFF2-40B4-BE49-F238E27FC236}">
-                <a16:creationId xmlns="" xmlns:a16="http://schemas.microsoft.com/office/drawing/2014/main" id="{FB3334DA-952F-49BE-98A3-B0B5951C94CE}"/>
+                <a16:creationId xmlns:a16="http://schemas.microsoft.com/office/drawing/2014/main" xmlns="" id="{FB3334DA-952F-49BE-98A3-B0B5951C94CE}"/>
               </a:ext>
             </a:extLst>
           </p:cNvPr>
@@ -1386,7 +1386,7 @@
           <p:cNvPr id="5" name="Date Placeholder 4">
             <a:extLst>
               <a:ext uri="{FF2B5EF4-FFF2-40B4-BE49-F238E27FC236}">
-                <a16:creationId xmlns="" xmlns:a16="http://schemas.microsoft.com/office/drawing/2014/main" id="{A89DB9B6-5453-4646-8E07-962A19DBFF44}"/>
+                <a16:creationId xmlns:a16="http://schemas.microsoft.com/office/drawing/2014/main" xmlns="" id="{A89DB9B6-5453-4646-8E07-962A19DBFF44}"/>
               </a:ext>
             </a:extLst>
           </p:cNvPr>
@@ -1404,7 +1404,7 @@
           <a:p>
             <a:fld id="{B6341FFD-5D10-463C-B7CE-F9E5B3035469}" type="datetimeFigureOut">
               <a:rPr lang="en-US" smtClean="0"/>
-              <a:t>10/6/2020</a:t>
+              <a:t>10/8/2020</a:t>
             </a:fld>
             <a:endParaRPr lang="en-US"/>
           </a:p>
@@ -1415,7 +1415,7 @@
           <p:cNvPr id="6" name="Footer Placeholder 5">
             <a:extLst>
               <a:ext uri="{FF2B5EF4-FFF2-40B4-BE49-F238E27FC236}">
-                <a16:creationId xmlns="" xmlns:a16="http://schemas.microsoft.com/office/drawing/2014/main" id="{0781F20A-11BE-49CD-B10F-D144B50DB339}"/>
+                <a16:creationId xmlns:a16="http://schemas.microsoft.com/office/drawing/2014/main" xmlns="" id="{0781F20A-11BE-49CD-B10F-D144B50DB339}"/>
               </a:ext>
             </a:extLst>
           </p:cNvPr>
@@ -1440,7 +1440,7 @@
           <p:cNvPr id="7" name="Slide Number Placeholder 6">
             <a:extLst>
               <a:ext uri="{FF2B5EF4-FFF2-40B4-BE49-F238E27FC236}">
-                <a16:creationId xmlns="" xmlns:a16="http://schemas.microsoft.com/office/drawing/2014/main" id="{36E9D41E-52C1-4753-A8AE-839119E0EAD9}"/>
+                <a16:creationId xmlns:a16="http://schemas.microsoft.com/office/drawing/2014/main" xmlns="" id="{36E9D41E-52C1-4753-A8AE-839119E0EAD9}"/>
               </a:ext>
             </a:extLst>
           </p:cNvPr>
@@ -1499,7 +1499,7 @@
           <p:cNvPr id="2" name="Title 1">
             <a:extLst>
               <a:ext uri="{FF2B5EF4-FFF2-40B4-BE49-F238E27FC236}">
-                <a16:creationId xmlns="" xmlns:a16="http://schemas.microsoft.com/office/drawing/2014/main" id="{4AB5CDAE-B3A5-4198-BB2B-A5DE04791C3D}"/>
+                <a16:creationId xmlns:a16="http://schemas.microsoft.com/office/drawing/2014/main" xmlns="" id="{4AB5CDAE-B3A5-4198-BB2B-A5DE04791C3D}"/>
               </a:ext>
             </a:extLst>
           </p:cNvPr>
@@ -1532,7 +1532,7 @@
           <p:cNvPr id="3" name="Text Placeholder 2">
             <a:extLst>
               <a:ext uri="{FF2B5EF4-FFF2-40B4-BE49-F238E27FC236}">
-                <a16:creationId xmlns="" xmlns:a16="http://schemas.microsoft.com/office/drawing/2014/main" id="{5AEC9265-34A2-4D68-9006-733197A67704}"/>
+                <a16:creationId xmlns:a16="http://schemas.microsoft.com/office/drawing/2014/main" xmlns="" id="{5AEC9265-34A2-4D68-9006-733197A67704}"/>
               </a:ext>
             </a:extLst>
           </p:cNvPr>
@@ -1603,7 +1603,7 @@
           <p:cNvPr id="4" name="Content Placeholder 3">
             <a:extLst>
               <a:ext uri="{FF2B5EF4-FFF2-40B4-BE49-F238E27FC236}">
-                <a16:creationId xmlns="" xmlns:a16="http://schemas.microsoft.com/office/drawing/2014/main" id="{372F443B-2F35-4DF8-92C6-77CA6897B2CC}"/>
+                <a16:creationId xmlns:a16="http://schemas.microsoft.com/office/drawing/2014/main" xmlns="" id="{372F443B-2F35-4DF8-92C6-77CA6897B2CC}"/>
               </a:ext>
             </a:extLst>
           </p:cNvPr>
@@ -1665,7 +1665,7 @@
           <p:cNvPr id="5" name="Text Placeholder 4">
             <a:extLst>
               <a:ext uri="{FF2B5EF4-FFF2-40B4-BE49-F238E27FC236}">
-                <a16:creationId xmlns="" xmlns:a16="http://schemas.microsoft.com/office/drawing/2014/main" id="{EC3D721E-B603-4652-AD34-ACC9CC973595}"/>
+                <a16:creationId xmlns:a16="http://schemas.microsoft.com/office/drawing/2014/main" xmlns="" id="{EC3D721E-B603-4652-AD34-ACC9CC973595}"/>
               </a:ext>
             </a:extLst>
           </p:cNvPr>
@@ -1736,7 +1736,7 @@
           <p:cNvPr id="6" name="Content Placeholder 5">
             <a:extLst>
               <a:ext uri="{FF2B5EF4-FFF2-40B4-BE49-F238E27FC236}">
-                <a16:creationId xmlns="" xmlns:a16="http://schemas.microsoft.com/office/drawing/2014/main" id="{22A36147-1663-4047-BA93-92E35B6E0965}"/>
+                <a16:creationId xmlns:a16="http://schemas.microsoft.com/office/drawing/2014/main" xmlns="" id="{22A36147-1663-4047-BA93-92E35B6E0965}"/>
               </a:ext>
             </a:extLst>
           </p:cNvPr>
@@ -1798,7 +1798,7 @@
           <p:cNvPr id="7" name="Date Placeholder 6">
             <a:extLst>
               <a:ext uri="{FF2B5EF4-FFF2-40B4-BE49-F238E27FC236}">
-                <a16:creationId xmlns="" xmlns:a16="http://schemas.microsoft.com/office/drawing/2014/main" id="{F3F5C402-BC23-4C6B-BF62-257371740C9A}"/>
+                <a16:creationId xmlns:a16="http://schemas.microsoft.com/office/drawing/2014/main" xmlns="" id="{F3F5C402-BC23-4C6B-BF62-257371740C9A}"/>
               </a:ext>
             </a:extLst>
           </p:cNvPr>
@@ -1816,7 +1816,7 @@
           <a:p>
             <a:fld id="{B6341FFD-5D10-463C-B7CE-F9E5B3035469}" type="datetimeFigureOut">
               <a:rPr lang="en-US" smtClean="0"/>
-              <a:t>10/6/2020</a:t>
+              <a:t>10/8/2020</a:t>
             </a:fld>
             <a:endParaRPr lang="en-US"/>
           </a:p>
@@ -1827,7 +1827,7 @@
           <p:cNvPr id="8" name="Footer Placeholder 7">
             <a:extLst>
               <a:ext uri="{FF2B5EF4-FFF2-40B4-BE49-F238E27FC236}">
-                <a16:creationId xmlns="" xmlns:a16="http://schemas.microsoft.com/office/drawing/2014/main" id="{11630A76-FC91-446A-986D-4DBB10DED956}"/>
+                <a16:creationId xmlns:a16="http://schemas.microsoft.com/office/drawing/2014/main" xmlns="" id="{11630A76-FC91-446A-986D-4DBB10DED956}"/>
               </a:ext>
             </a:extLst>
           </p:cNvPr>
@@ -1852,7 +1852,7 @@
           <p:cNvPr id="9" name="Slide Number Placeholder 8">
             <a:extLst>
               <a:ext uri="{FF2B5EF4-FFF2-40B4-BE49-F238E27FC236}">
-                <a16:creationId xmlns="" xmlns:a16="http://schemas.microsoft.com/office/drawing/2014/main" id="{4CF3F732-1534-48FF-98C9-201E971B872B}"/>
+                <a16:creationId xmlns:a16="http://schemas.microsoft.com/office/drawing/2014/main" xmlns="" id="{4CF3F732-1534-48FF-98C9-201E971B872B}"/>
               </a:ext>
             </a:extLst>
           </p:cNvPr>
@@ -1911,7 +1911,7 @@
           <p:cNvPr id="2" name="Title 1">
             <a:extLst>
               <a:ext uri="{FF2B5EF4-FFF2-40B4-BE49-F238E27FC236}">
-                <a16:creationId xmlns="" xmlns:a16="http://schemas.microsoft.com/office/drawing/2014/main" id="{3BB4D641-8516-4EA7-8D85-EA92E6B15643}"/>
+                <a16:creationId xmlns:a16="http://schemas.microsoft.com/office/drawing/2014/main" xmlns="" id="{3BB4D641-8516-4EA7-8D85-EA92E6B15643}"/>
               </a:ext>
             </a:extLst>
           </p:cNvPr>
@@ -1939,7 +1939,7 @@
           <p:cNvPr id="3" name="Date Placeholder 2">
             <a:extLst>
               <a:ext uri="{FF2B5EF4-FFF2-40B4-BE49-F238E27FC236}">
-                <a16:creationId xmlns="" xmlns:a16="http://schemas.microsoft.com/office/drawing/2014/main" id="{0C0B0FA3-5168-4AE2-BCC7-3B697DABF0DC}"/>
+                <a16:creationId xmlns:a16="http://schemas.microsoft.com/office/drawing/2014/main" xmlns="" id="{0C0B0FA3-5168-4AE2-BCC7-3B697DABF0DC}"/>
               </a:ext>
             </a:extLst>
           </p:cNvPr>
@@ -1957,7 +1957,7 @@
           <a:p>
             <a:fld id="{B6341FFD-5D10-463C-B7CE-F9E5B3035469}" type="datetimeFigureOut">
               <a:rPr lang="en-US" smtClean="0"/>
-              <a:t>10/6/2020</a:t>
+              <a:t>10/8/2020</a:t>
             </a:fld>
             <a:endParaRPr lang="en-US"/>
           </a:p>
@@ -1968,7 +1968,7 @@
           <p:cNvPr id="4" name="Footer Placeholder 3">
             <a:extLst>
               <a:ext uri="{FF2B5EF4-FFF2-40B4-BE49-F238E27FC236}">
-                <a16:creationId xmlns="" xmlns:a16="http://schemas.microsoft.com/office/drawing/2014/main" id="{52EC0C84-0AF9-46E5-9013-D179D931DA60}"/>
+                <a16:creationId xmlns:a16="http://schemas.microsoft.com/office/drawing/2014/main" xmlns="" id="{52EC0C84-0AF9-46E5-9013-D179D931DA60}"/>
               </a:ext>
             </a:extLst>
           </p:cNvPr>
@@ -1993,7 +1993,7 @@
           <p:cNvPr id="5" name="Slide Number Placeholder 4">
             <a:extLst>
               <a:ext uri="{FF2B5EF4-FFF2-40B4-BE49-F238E27FC236}">
-                <a16:creationId xmlns="" xmlns:a16="http://schemas.microsoft.com/office/drawing/2014/main" id="{B16E34D5-EF49-4430-93AB-784D927FA904}"/>
+                <a16:creationId xmlns:a16="http://schemas.microsoft.com/office/drawing/2014/main" xmlns="" id="{B16E34D5-EF49-4430-93AB-784D927FA904}"/>
               </a:ext>
             </a:extLst>
           </p:cNvPr>
@@ -2052,7 +2052,7 @@
           <p:cNvPr id="2" name="Date Placeholder 1">
             <a:extLst>
               <a:ext uri="{FF2B5EF4-FFF2-40B4-BE49-F238E27FC236}">
-                <a16:creationId xmlns="" xmlns:a16="http://schemas.microsoft.com/office/drawing/2014/main" id="{6E9D809D-A7AA-4E24-8396-9E2E05D0C03D}"/>
+                <a16:creationId xmlns:a16="http://schemas.microsoft.com/office/drawing/2014/main" xmlns="" id="{6E9D809D-A7AA-4E24-8396-9E2E05D0C03D}"/>
               </a:ext>
             </a:extLst>
           </p:cNvPr>
@@ -2070,7 +2070,7 @@
           <a:p>
             <a:fld id="{B6341FFD-5D10-463C-B7CE-F9E5B3035469}" type="datetimeFigureOut">
               <a:rPr lang="en-US" smtClean="0"/>
-              <a:t>10/6/2020</a:t>
+              <a:t>10/8/2020</a:t>
             </a:fld>
             <a:endParaRPr lang="en-US"/>
           </a:p>
@@ -2081,7 +2081,7 @@
           <p:cNvPr id="3" name="Footer Placeholder 2">
             <a:extLst>
               <a:ext uri="{FF2B5EF4-FFF2-40B4-BE49-F238E27FC236}">
-                <a16:creationId xmlns="" xmlns:a16="http://schemas.microsoft.com/office/drawing/2014/main" id="{E79DD26D-8B7B-4051-A0A7-1E16F74CC724}"/>
+                <a16:creationId xmlns:a16="http://schemas.microsoft.com/office/drawing/2014/main" xmlns="" id="{E79DD26D-8B7B-4051-A0A7-1E16F74CC724}"/>
               </a:ext>
             </a:extLst>
           </p:cNvPr>
@@ -2106,7 +2106,7 @@
           <p:cNvPr id="4" name="Slide Number Placeholder 3">
             <a:extLst>
               <a:ext uri="{FF2B5EF4-FFF2-40B4-BE49-F238E27FC236}">
-                <a16:creationId xmlns="" xmlns:a16="http://schemas.microsoft.com/office/drawing/2014/main" id="{F0FB25F9-E06D-4E40-8E32-9E1C1A62D196}"/>
+                <a16:creationId xmlns:a16="http://schemas.microsoft.com/office/drawing/2014/main" xmlns="" id="{F0FB25F9-E06D-4E40-8E32-9E1C1A62D196}"/>
               </a:ext>
             </a:extLst>
           </p:cNvPr>
@@ -2165,7 +2165,7 @@
           <p:cNvPr id="2" name="Title 1">
             <a:extLst>
               <a:ext uri="{FF2B5EF4-FFF2-40B4-BE49-F238E27FC236}">
-                <a16:creationId xmlns="" xmlns:a16="http://schemas.microsoft.com/office/drawing/2014/main" id="{11AB542B-6186-430E-BFD1-FB6C77D1EC44}"/>
+                <a16:creationId xmlns:a16="http://schemas.microsoft.com/office/drawing/2014/main" xmlns="" id="{11AB542B-6186-430E-BFD1-FB6C77D1EC44}"/>
               </a:ext>
             </a:extLst>
           </p:cNvPr>
@@ -2202,7 +2202,7 @@
           <p:cNvPr id="3" name="Content Placeholder 2">
             <a:extLst>
               <a:ext uri="{FF2B5EF4-FFF2-40B4-BE49-F238E27FC236}">
-                <a16:creationId xmlns="" xmlns:a16="http://schemas.microsoft.com/office/drawing/2014/main" id="{6C0FDAE4-C113-45FE-BEA5-E0A749CA11AA}"/>
+                <a16:creationId xmlns:a16="http://schemas.microsoft.com/office/drawing/2014/main" xmlns="" id="{6C0FDAE4-C113-45FE-BEA5-E0A749CA11AA}"/>
               </a:ext>
             </a:extLst>
           </p:cNvPr>
@@ -2292,7 +2292,7 @@
           <p:cNvPr id="4" name="Text Placeholder 3">
             <a:extLst>
               <a:ext uri="{FF2B5EF4-FFF2-40B4-BE49-F238E27FC236}">
-                <a16:creationId xmlns="" xmlns:a16="http://schemas.microsoft.com/office/drawing/2014/main" id="{3B59AFE6-43A3-475F-9169-AA3879E04DCA}"/>
+                <a16:creationId xmlns:a16="http://schemas.microsoft.com/office/drawing/2014/main" xmlns="" id="{3B59AFE6-43A3-475F-9169-AA3879E04DCA}"/>
               </a:ext>
             </a:extLst>
           </p:cNvPr>
@@ -2363,7 +2363,7 @@
           <p:cNvPr id="5" name="Date Placeholder 4">
             <a:extLst>
               <a:ext uri="{FF2B5EF4-FFF2-40B4-BE49-F238E27FC236}">
-                <a16:creationId xmlns="" xmlns:a16="http://schemas.microsoft.com/office/drawing/2014/main" id="{85FC6F24-508F-4B9D-8285-3EB28C4A49B7}"/>
+                <a16:creationId xmlns:a16="http://schemas.microsoft.com/office/drawing/2014/main" xmlns="" id="{85FC6F24-508F-4B9D-8285-3EB28C4A49B7}"/>
               </a:ext>
             </a:extLst>
           </p:cNvPr>
@@ -2381,7 +2381,7 @@
           <a:p>
             <a:fld id="{B6341FFD-5D10-463C-B7CE-F9E5B3035469}" type="datetimeFigureOut">
               <a:rPr lang="en-US" smtClean="0"/>
-              <a:t>10/6/2020</a:t>
+              <a:t>10/8/2020</a:t>
             </a:fld>
             <a:endParaRPr lang="en-US"/>
           </a:p>
@@ -2392,7 +2392,7 @@
           <p:cNvPr id="6" name="Footer Placeholder 5">
             <a:extLst>
               <a:ext uri="{FF2B5EF4-FFF2-40B4-BE49-F238E27FC236}">
-                <a16:creationId xmlns="" xmlns:a16="http://schemas.microsoft.com/office/drawing/2014/main" id="{04AD152C-C3EC-4054-9B61-90ED8C2C0B3E}"/>
+                <a16:creationId xmlns:a16="http://schemas.microsoft.com/office/drawing/2014/main" xmlns="" id="{04AD152C-C3EC-4054-9B61-90ED8C2C0B3E}"/>
               </a:ext>
             </a:extLst>
           </p:cNvPr>
@@ -2417,7 +2417,7 @@
           <p:cNvPr id="7" name="Slide Number Placeholder 6">
             <a:extLst>
               <a:ext uri="{FF2B5EF4-FFF2-40B4-BE49-F238E27FC236}">
-                <a16:creationId xmlns="" xmlns:a16="http://schemas.microsoft.com/office/drawing/2014/main" id="{170BF4D2-F189-4941-AE6D-BEFA39FD501A}"/>
+                <a16:creationId xmlns:a16="http://schemas.microsoft.com/office/drawing/2014/main" xmlns="" id="{170BF4D2-F189-4941-AE6D-BEFA39FD501A}"/>
               </a:ext>
             </a:extLst>
           </p:cNvPr>
@@ -2476,7 +2476,7 @@
           <p:cNvPr id="2" name="Title 1">
             <a:extLst>
               <a:ext uri="{FF2B5EF4-FFF2-40B4-BE49-F238E27FC236}">
-                <a16:creationId xmlns="" xmlns:a16="http://schemas.microsoft.com/office/drawing/2014/main" id="{0E565D83-DD8F-4BB1-87AD-D482C3BDABEF}"/>
+                <a16:creationId xmlns:a16="http://schemas.microsoft.com/office/drawing/2014/main" xmlns="" id="{0E565D83-DD8F-4BB1-87AD-D482C3BDABEF}"/>
               </a:ext>
             </a:extLst>
           </p:cNvPr>
@@ -2513,7 +2513,7 @@
           <p:cNvPr id="3" name="Picture Placeholder 2">
             <a:extLst>
               <a:ext uri="{FF2B5EF4-FFF2-40B4-BE49-F238E27FC236}">
-                <a16:creationId xmlns="" xmlns:a16="http://schemas.microsoft.com/office/drawing/2014/main" id="{11384BBE-D187-4EDC-AE0F-35D5DFB14FEF}"/>
+                <a16:creationId xmlns:a16="http://schemas.microsoft.com/office/drawing/2014/main" xmlns="" id="{11384BBE-D187-4EDC-AE0F-35D5DFB14FEF}"/>
               </a:ext>
             </a:extLst>
           </p:cNvPr>
@@ -2580,7 +2580,7 @@
           <p:cNvPr id="4" name="Text Placeholder 3">
             <a:extLst>
               <a:ext uri="{FF2B5EF4-FFF2-40B4-BE49-F238E27FC236}">
-                <a16:creationId xmlns="" xmlns:a16="http://schemas.microsoft.com/office/drawing/2014/main" id="{236F51AA-7423-4E97-B9C7-443C8C0B6045}"/>
+                <a16:creationId xmlns:a16="http://schemas.microsoft.com/office/drawing/2014/main" xmlns="" id="{236F51AA-7423-4E97-B9C7-443C8C0B6045}"/>
               </a:ext>
             </a:extLst>
           </p:cNvPr>
@@ -2651,7 +2651,7 @@
           <p:cNvPr id="5" name="Date Placeholder 4">
             <a:extLst>
               <a:ext uri="{FF2B5EF4-FFF2-40B4-BE49-F238E27FC236}">
-                <a16:creationId xmlns="" xmlns:a16="http://schemas.microsoft.com/office/drawing/2014/main" id="{2B348D00-6958-49DF-9B3D-58CDEF569F2E}"/>
+                <a16:creationId xmlns:a16="http://schemas.microsoft.com/office/drawing/2014/main" xmlns="" id="{2B348D00-6958-49DF-9B3D-58CDEF569F2E}"/>
               </a:ext>
             </a:extLst>
           </p:cNvPr>
@@ -2669,7 +2669,7 @@
           <a:p>
             <a:fld id="{B6341FFD-5D10-463C-B7CE-F9E5B3035469}" type="datetimeFigureOut">
               <a:rPr lang="en-US" smtClean="0"/>
-              <a:t>10/6/2020</a:t>
+              <a:t>10/8/2020</a:t>
             </a:fld>
             <a:endParaRPr lang="en-US"/>
           </a:p>
@@ -2680,7 +2680,7 @@
           <p:cNvPr id="6" name="Footer Placeholder 5">
             <a:extLst>
               <a:ext uri="{FF2B5EF4-FFF2-40B4-BE49-F238E27FC236}">
-                <a16:creationId xmlns="" xmlns:a16="http://schemas.microsoft.com/office/drawing/2014/main" id="{2ED5460A-A98E-402B-BBB0-208A5AB9EF99}"/>
+                <a16:creationId xmlns:a16="http://schemas.microsoft.com/office/drawing/2014/main" xmlns="" id="{2ED5460A-A98E-402B-BBB0-208A5AB9EF99}"/>
               </a:ext>
             </a:extLst>
           </p:cNvPr>
@@ -2705,7 +2705,7 @@
           <p:cNvPr id="7" name="Slide Number Placeholder 6">
             <a:extLst>
               <a:ext uri="{FF2B5EF4-FFF2-40B4-BE49-F238E27FC236}">
-                <a16:creationId xmlns="" xmlns:a16="http://schemas.microsoft.com/office/drawing/2014/main" id="{89C14EC8-9890-43DB-B530-6F48BDDEF730}"/>
+                <a16:creationId xmlns:a16="http://schemas.microsoft.com/office/drawing/2014/main" xmlns="" id="{89C14EC8-9890-43DB-B530-6F48BDDEF730}"/>
               </a:ext>
             </a:extLst>
           </p:cNvPr>
@@ -2769,7 +2769,7 @@
           <p:cNvPr id="2" name="Title Placeholder 1">
             <a:extLst>
               <a:ext uri="{FF2B5EF4-FFF2-40B4-BE49-F238E27FC236}">
-                <a16:creationId xmlns="" xmlns:a16="http://schemas.microsoft.com/office/drawing/2014/main" id="{64A8D812-302F-4F90-A3A7-482910CD5910}"/>
+                <a16:creationId xmlns:a16="http://schemas.microsoft.com/office/drawing/2014/main" xmlns="" id="{64A8D812-302F-4F90-A3A7-482910CD5910}"/>
               </a:ext>
             </a:extLst>
           </p:cNvPr>
@@ -2807,7 +2807,7 @@
           <p:cNvPr id="3" name="Text Placeholder 2">
             <a:extLst>
               <a:ext uri="{FF2B5EF4-FFF2-40B4-BE49-F238E27FC236}">
-                <a16:creationId xmlns="" xmlns:a16="http://schemas.microsoft.com/office/drawing/2014/main" id="{EB9123EC-1FFA-46CB-8871-EAF17D6C9DAD}"/>
+                <a16:creationId xmlns:a16="http://schemas.microsoft.com/office/drawing/2014/main" xmlns="" id="{EB9123EC-1FFA-46CB-8871-EAF17D6C9DAD}"/>
               </a:ext>
             </a:extLst>
           </p:cNvPr>
@@ -2874,7 +2874,7 @@
           <p:cNvPr id="4" name="Date Placeholder 3">
             <a:extLst>
               <a:ext uri="{FF2B5EF4-FFF2-40B4-BE49-F238E27FC236}">
-                <a16:creationId xmlns="" xmlns:a16="http://schemas.microsoft.com/office/drawing/2014/main" id="{0BAD4AA6-8077-4EAF-AE9E-7D9FB52B3DF3}"/>
+                <a16:creationId xmlns:a16="http://schemas.microsoft.com/office/drawing/2014/main" xmlns="" id="{0BAD4AA6-8077-4EAF-AE9E-7D9FB52B3DF3}"/>
               </a:ext>
             </a:extLst>
           </p:cNvPr>
@@ -2910,7 +2910,7 @@
           <a:p>
             <a:fld id="{B6341FFD-5D10-463C-B7CE-F9E5B3035469}" type="datetimeFigureOut">
               <a:rPr lang="en-US" smtClean="0"/>
-              <a:t>10/6/2020</a:t>
+              <a:t>10/8/2020</a:t>
             </a:fld>
             <a:endParaRPr lang="en-US"/>
           </a:p>
@@ -2921,7 +2921,7 @@
           <p:cNvPr id="5" name="Footer Placeholder 4">
             <a:extLst>
               <a:ext uri="{FF2B5EF4-FFF2-40B4-BE49-F238E27FC236}">
-                <a16:creationId xmlns="" xmlns:a16="http://schemas.microsoft.com/office/drawing/2014/main" id="{256705BA-E28C-4DA2-8032-24F203AC40AE}"/>
+                <a16:creationId xmlns:a16="http://schemas.microsoft.com/office/drawing/2014/main" xmlns="" id="{256705BA-E28C-4DA2-8032-24F203AC40AE}"/>
               </a:ext>
             </a:extLst>
           </p:cNvPr>
@@ -2964,7 +2964,7 @@
           <p:cNvPr id="6" name="Slide Number Placeholder 5">
             <a:extLst>
               <a:ext uri="{FF2B5EF4-FFF2-40B4-BE49-F238E27FC236}">
-                <a16:creationId xmlns="" xmlns:a16="http://schemas.microsoft.com/office/drawing/2014/main" id="{40F03837-9D8E-4C34-9AD5-4D3CA46B04ED}"/>
+                <a16:creationId xmlns:a16="http://schemas.microsoft.com/office/drawing/2014/main" xmlns="" id="{40F03837-9D8E-4C34-9AD5-4D3CA46B04ED}"/>
               </a:ext>
             </a:extLst>
           </p:cNvPr>
@@ -3366,7 +3366,7 @@
           <p:cNvPr id="19" name="Rectangle 18">
             <a:extLst>
               <a:ext uri="{FF2B5EF4-FFF2-40B4-BE49-F238E27FC236}">
-                <a16:creationId xmlns="" xmlns:a16="http://schemas.microsoft.com/office/drawing/2014/main" id="{32D851B6-714A-4883-8D4E-754A7ED882BA}"/>
+                <a16:creationId xmlns:a16="http://schemas.microsoft.com/office/drawing/2014/main" xmlns="" id="{32D851B6-714A-4883-8D4E-754A7ED882BA}"/>
               </a:ext>
             </a:extLst>
           </p:cNvPr>
@@ -3412,7 +3412,7 @@
           <p:cNvPr id="23" name="Rectangle 22">
             <a:extLst>
               <a:ext uri="{FF2B5EF4-FFF2-40B4-BE49-F238E27FC236}">
-                <a16:creationId xmlns="" xmlns:a16="http://schemas.microsoft.com/office/drawing/2014/main" id="{F0CB5917-D9C5-4F78-B41A-F70D3EFFCF26}"/>
+                <a16:creationId xmlns:a16="http://schemas.microsoft.com/office/drawing/2014/main" xmlns="" id="{F0CB5917-D9C5-4F78-B41A-F70D3EFFCF26}"/>
               </a:ext>
             </a:extLst>
           </p:cNvPr>
@@ -3474,7 +3474,7 @@
           <p:cNvPr id="25" name="Rectangle 24">
             <a:extLst>
               <a:ext uri="{FF2B5EF4-FFF2-40B4-BE49-F238E27FC236}">
-                <a16:creationId xmlns="" xmlns:a16="http://schemas.microsoft.com/office/drawing/2014/main" id="{A26B1B57-39F1-4784-BB8C-D498B044853A}"/>
+                <a16:creationId xmlns:a16="http://schemas.microsoft.com/office/drawing/2014/main" xmlns="" id="{A26B1B57-39F1-4784-BB8C-D498B044853A}"/>
               </a:ext>
             </a:extLst>
           </p:cNvPr>
@@ -3536,7 +3536,7 @@
           <p:cNvPr id="4" name="TextBox 3">
             <a:extLst>
               <a:ext uri="{FF2B5EF4-FFF2-40B4-BE49-F238E27FC236}">
-                <a16:creationId xmlns="" xmlns:a16="http://schemas.microsoft.com/office/drawing/2014/main" id="{77AFE952-47A5-42E2-A2EC-FF7ABEA49A89}"/>
+                <a16:creationId xmlns:a16="http://schemas.microsoft.com/office/drawing/2014/main" xmlns="" id="{77AFE952-47A5-42E2-A2EC-FF7ABEA49A89}"/>
               </a:ext>
             </a:extLst>
           </p:cNvPr>
@@ -3579,7 +3579,7 @@
           <p:cNvPr id="5" name="TextBox 4">
             <a:extLst>
               <a:ext uri="{FF2B5EF4-FFF2-40B4-BE49-F238E27FC236}">
-                <a16:creationId xmlns="" xmlns:a16="http://schemas.microsoft.com/office/drawing/2014/main" id="{090298AF-3D44-4478-B386-6971E79EB79D}"/>
+                <a16:creationId xmlns:a16="http://schemas.microsoft.com/office/drawing/2014/main" xmlns="" id="{090298AF-3D44-4478-B386-6971E79EB79D}"/>
               </a:ext>
             </a:extLst>
           </p:cNvPr>
@@ -3614,7 +3614,7 @@
           <p:cNvPr id="6" name="Rectangle 5">
             <a:extLst>
               <a:ext uri="{FF2B5EF4-FFF2-40B4-BE49-F238E27FC236}">
-                <a16:creationId xmlns="" xmlns:a16="http://schemas.microsoft.com/office/drawing/2014/main" id="{B4931A1A-F246-44F6-A374-61C9F9C636E0}"/>
+                <a16:creationId xmlns:a16="http://schemas.microsoft.com/office/drawing/2014/main" xmlns="" id="{B4931A1A-F246-44F6-A374-61C9F9C636E0}"/>
               </a:ext>
             </a:extLst>
           </p:cNvPr>
@@ -3660,7 +3660,7 @@
           <p:cNvPr id="8" name="Table 7">
             <a:extLst>
               <a:ext uri="{FF2B5EF4-FFF2-40B4-BE49-F238E27FC236}">
-                <a16:creationId xmlns="" xmlns:a16="http://schemas.microsoft.com/office/drawing/2014/main" id="{216E663B-7C2E-4835-91C1-5C8FB8698420}"/>
+                <a16:creationId xmlns:a16="http://schemas.microsoft.com/office/drawing/2014/main" xmlns="" id="{216E663B-7C2E-4835-91C1-5C8FB8698420}"/>
               </a:ext>
             </a:extLst>
           </p:cNvPr>
@@ -3689,28 +3689,28 @@
                 <a:gridCol w="721889">
                   <a:extLst>
                     <a:ext uri="{9D8B030D-6E8A-4147-A177-3AD203B41FA5}">
-                      <a16:colId xmlns="" xmlns:a16="http://schemas.microsoft.com/office/drawing/2014/main" val="233666424"/>
+                      <a16:colId xmlns:a16="http://schemas.microsoft.com/office/drawing/2014/main" xmlns="" val="233666424"/>
                     </a:ext>
                   </a:extLst>
                 </a:gridCol>
                 <a:gridCol w="783522">
                   <a:extLst>
                     <a:ext uri="{9D8B030D-6E8A-4147-A177-3AD203B41FA5}">
-                      <a16:colId xmlns="" xmlns:a16="http://schemas.microsoft.com/office/drawing/2014/main" val="972059951"/>
+                      <a16:colId xmlns:a16="http://schemas.microsoft.com/office/drawing/2014/main" xmlns="" val="972059951"/>
                     </a:ext>
                   </a:extLst>
                 </a:gridCol>
                 <a:gridCol w="1049516">
                   <a:extLst>
                     <a:ext uri="{9D8B030D-6E8A-4147-A177-3AD203B41FA5}">
-                      <a16:colId xmlns="" xmlns:a16="http://schemas.microsoft.com/office/drawing/2014/main" val="2188007159"/>
+                      <a16:colId xmlns:a16="http://schemas.microsoft.com/office/drawing/2014/main" xmlns="" val="2188007159"/>
                     </a:ext>
                   </a:extLst>
                 </a:gridCol>
                 <a:gridCol w="899906">
                   <a:extLst>
                     <a:ext uri="{9D8B030D-6E8A-4147-A177-3AD203B41FA5}">
-                      <a16:colId xmlns="" xmlns:a16="http://schemas.microsoft.com/office/drawing/2014/main" val="3389346521"/>
+                      <a16:colId xmlns:a16="http://schemas.microsoft.com/office/drawing/2014/main" xmlns="" val="3389346521"/>
                     </a:ext>
                   </a:extLst>
                 </a:gridCol>
@@ -3810,7 +3810,7 @@
                 </a:tc>
                 <a:extLst>
                   <a:ext uri="{0D108BD9-81ED-4DB2-BD59-A6C34878D82A}">
-                    <a16:rowId xmlns="" xmlns:a16="http://schemas.microsoft.com/office/drawing/2014/main" val="300847090"/>
+                    <a16:rowId xmlns:a16="http://schemas.microsoft.com/office/drawing/2014/main" xmlns="" val="300847090"/>
                   </a:ext>
                 </a:extLst>
               </a:tr>
@@ -3823,7 +3823,7 @@
           <p:cNvPr id="9" name="Table 8">
             <a:extLst>
               <a:ext uri="{FF2B5EF4-FFF2-40B4-BE49-F238E27FC236}">
-                <a16:creationId xmlns="" xmlns:a16="http://schemas.microsoft.com/office/drawing/2014/main" id="{7488BC97-D05E-4727-B765-F9F045F12689}"/>
+                <a16:creationId xmlns:a16="http://schemas.microsoft.com/office/drawing/2014/main" xmlns="" id="{7488BC97-D05E-4727-B765-F9F045F12689}"/>
               </a:ext>
             </a:extLst>
           </p:cNvPr>
@@ -3852,28 +3852,28 @@
                 <a:gridCol w="721889">
                   <a:extLst>
                     <a:ext uri="{9D8B030D-6E8A-4147-A177-3AD203B41FA5}">
-                      <a16:colId xmlns="" xmlns:a16="http://schemas.microsoft.com/office/drawing/2014/main" val="3693118018"/>
+                      <a16:colId xmlns:a16="http://schemas.microsoft.com/office/drawing/2014/main" xmlns="" val="3693118018"/>
                     </a:ext>
                   </a:extLst>
                 </a:gridCol>
                 <a:gridCol w="812579">
                   <a:extLst>
                     <a:ext uri="{9D8B030D-6E8A-4147-A177-3AD203B41FA5}">
-                      <a16:colId xmlns="" xmlns:a16="http://schemas.microsoft.com/office/drawing/2014/main" val="952852968"/>
+                      <a16:colId xmlns:a16="http://schemas.microsoft.com/office/drawing/2014/main" xmlns="" val="952852968"/>
                     </a:ext>
                   </a:extLst>
                 </a:gridCol>
                 <a:gridCol w="1020459">
                   <a:extLst>
                     <a:ext uri="{9D8B030D-6E8A-4147-A177-3AD203B41FA5}">
-                      <a16:colId xmlns="" xmlns:a16="http://schemas.microsoft.com/office/drawing/2014/main" val="1816747115"/>
+                      <a16:colId xmlns:a16="http://schemas.microsoft.com/office/drawing/2014/main" xmlns="" val="1816747115"/>
                     </a:ext>
                   </a:extLst>
                 </a:gridCol>
                 <a:gridCol w="899906">
                   <a:extLst>
                     <a:ext uri="{9D8B030D-6E8A-4147-A177-3AD203B41FA5}">
-                      <a16:colId xmlns="" xmlns:a16="http://schemas.microsoft.com/office/drawing/2014/main" val="55182559"/>
+                      <a16:colId xmlns:a16="http://schemas.microsoft.com/office/drawing/2014/main" xmlns="" val="55182559"/>
                     </a:ext>
                   </a:extLst>
                 </a:gridCol>
@@ -3985,7 +3985,7 @@
                 </a:tc>
                 <a:extLst>
                   <a:ext uri="{0D108BD9-81ED-4DB2-BD59-A6C34878D82A}">
-                    <a16:rowId xmlns="" xmlns:a16="http://schemas.microsoft.com/office/drawing/2014/main" val="2287119280"/>
+                    <a16:rowId xmlns:a16="http://schemas.microsoft.com/office/drawing/2014/main" xmlns="" val="2287119280"/>
                   </a:ext>
                 </a:extLst>
               </a:tr>
@@ -3998,7 +3998,7 @@
           <p:cNvPr id="10" name="Table 9">
             <a:extLst>
               <a:ext uri="{FF2B5EF4-FFF2-40B4-BE49-F238E27FC236}">
-                <a16:creationId xmlns="" xmlns:a16="http://schemas.microsoft.com/office/drawing/2014/main" id="{8B53D829-A13C-4105-BD19-80750650E577}"/>
+                <a16:creationId xmlns:a16="http://schemas.microsoft.com/office/drawing/2014/main" xmlns="" id="{8B53D829-A13C-4105-BD19-80750650E577}"/>
               </a:ext>
             </a:extLst>
           </p:cNvPr>
@@ -4027,28 +4027,28 @@
                 <a:gridCol w="721889">
                   <a:extLst>
                     <a:ext uri="{9D8B030D-6E8A-4147-A177-3AD203B41FA5}">
-                      <a16:colId xmlns="" xmlns:a16="http://schemas.microsoft.com/office/drawing/2014/main" val="1464581443"/>
+                      <a16:colId xmlns:a16="http://schemas.microsoft.com/office/drawing/2014/main" xmlns="" val="1464581443"/>
                     </a:ext>
                   </a:extLst>
                 </a:gridCol>
                 <a:gridCol w="783522">
                   <a:extLst>
                     <a:ext uri="{9D8B030D-6E8A-4147-A177-3AD203B41FA5}">
-                      <a16:colId xmlns="" xmlns:a16="http://schemas.microsoft.com/office/drawing/2014/main" val="3127435560"/>
+                      <a16:colId xmlns:a16="http://schemas.microsoft.com/office/drawing/2014/main" xmlns="" val="3127435560"/>
                     </a:ext>
                   </a:extLst>
                 </a:gridCol>
                 <a:gridCol w="1049516">
                   <a:extLst>
                     <a:ext uri="{9D8B030D-6E8A-4147-A177-3AD203B41FA5}">
-                      <a16:colId xmlns="" xmlns:a16="http://schemas.microsoft.com/office/drawing/2014/main" val="2161992991"/>
+                      <a16:colId xmlns:a16="http://schemas.microsoft.com/office/drawing/2014/main" xmlns="" val="2161992991"/>
                     </a:ext>
                   </a:extLst>
                 </a:gridCol>
                 <a:gridCol w="899906">
                   <a:extLst>
                     <a:ext uri="{9D8B030D-6E8A-4147-A177-3AD203B41FA5}">
-                      <a16:colId xmlns="" xmlns:a16="http://schemas.microsoft.com/office/drawing/2014/main" val="732979080"/>
+                      <a16:colId xmlns:a16="http://schemas.microsoft.com/office/drawing/2014/main" xmlns="" val="732979080"/>
                     </a:ext>
                   </a:extLst>
                 </a:gridCol>
@@ -4160,7 +4160,7 @@
                 </a:tc>
                 <a:extLst>
                   <a:ext uri="{0D108BD9-81ED-4DB2-BD59-A6C34878D82A}">
-                    <a16:rowId xmlns="" xmlns:a16="http://schemas.microsoft.com/office/drawing/2014/main" val="2949352622"/>
+                    <a16:rowId xmlns:a16="http://schemas.microsoft.com/office/drawing/2014/main" xmlns="" val="2949352622"/>
                   </a:ext>
                 </a:extLst>
               </a:tr>
@@ -4173,7 +4173,7 @@
           <p:cNvPr id="13" name="Rectangle 12">
             <a:extLst>
               <a:ext uri="{FF2B5EF4-FFF2-40B4-BE49-F238E27FC236}">
-                <a16:creationId xmlns="" xmlns:a16="http://schemas.microsoft.com/office/drawing/2014/main" id="{88911F9B-762D-4D9D-8D59-8C7C40A1A285}"/>
+                <a16:creationId xmlns:a16="http://schemas.microsoft.com/office/drawing/2014/main" xmlns="" id="{88911F9B-762D-4D9D-8D59-8C7C40A1A285}"/>
               </a:ext>
             </a:extLst>
           </p:cNvPr>
@@ -4235,7 +4235,7 @@
           <p:cNvPr id="15" name="Rectangle 14">
             <a:extLst>
               <a:ext uri="{FF2B5EF4-FFF2-40B4-BE49-F238E27FC236}">
-                <a16:creationId xmlns="" xmlns:a16="http://schemas.microsoft.com/office/drawing/2014/main" id="{8899DA91-943D-48DA-AAB3-0895C2AAF047}"/>
+                <a16:creationId xmlns:a16="http://schemas.microsoft.com/office/drawing/2014/main" xmlns="" id="{8899DA91-943D-48DA-AAB3-0895C2AAF047}"/>
               </a:ext>
             </a:extLst>
           </p:cNvPr>
@@ -4297,7 +4297,7 @@
           <p:cNvPr id="17" name="Rectangle 16">
             <a:extLst>
               <a:ext uri="{FF2B5EF4-FFF2-40B4-BE49-F238E27FC236}">
-                <a16:creationId xmlns="" xmlns:a16="http://schemas.microsoft.com/office/drawing/2014/main" id="{ABD8C12D-0590-401B-9810-3C70D06503BB}"/>
+                <a16:creationId xmlns:a16="http://schemas.microsoft.com/office/drawing/2014/main" xmlns="" id="{ABD8C12D-0590-401B-9810-3C70D06503BB}"/>
               </a:ext>
             </a:extLst>
           </p:cNvPr>
@@ -4359,7 +4359,7 @@
           <p:cNvPr id="35" name="Straight Connector 34">
             <a:extLst>
               <a:ext uri="{FF2B5EF4-FFF2-40B4-BE49-F238E27FC236}">
-                <a16:creationId xmlns="" xmlns:a16="http://schemas.microsoft.com/office/drawing/2014/main" id="{B6A3EA80-60C5-4431-980D-80005D3FE9D3}"/>
+                <a16:creationId xmlns:a16="http://schemas.microsoft.com/office/drawing/2014/main" xmlns="" id="{B6A3EA80-60C5-4431-980D-80005D3FE9D3}"/>
               </a:ext>
             </a:extLst>
           </p:cNvPr>
@@ -4401,7 +4401,7 @@
           <p:cNvPr id="36" name="Straight Connector 35">
             <a:extLst>
               <a:ext uri="{FF2B5EF4-FFF2-40B4-BE49-F238E27FC236}">
-                <a16:creationId xmlns="" xmlns:a16="http://schemas.microsoft.com/office/drawing/2014/main" id="{82BD31D8-AEB2-4A38-A420-A825020DD77E}"/>
+                <a16:creationId xmlns:a16="http://schemas.microsoft.com/office/drawing/2014/main" xmlns="" id="{82BD31D8-AEB2-4A38-A420-A825020DD77E}"/>
               </a:ext>
             </a:extLst>
           </p:cNvPr>
@@ -4443,7 +4443,7 @@
           <p:cNvPr id="37" name="Straight Connector 36">
             <a:extLst>
               <a:ext uri="{FF2B5EF4-FFF2-40B4-BE49-F238E27FC236}">
-                <a16:creationId xmlns="" xmlns:a16="http://schemas.microsoft.com/office/drawing/2014/main" id="{7DE8383F-8BE6-4377-8AA9-3A3873DC3067}"/>
+                <a16:creationId xmlns:a16="http://schemas.microsoft.com/office/drawing/2014/main" xmlns="" id="{7DE8383F-8BE6-4377-8AA9-3A3873DC3067}"/>
               </a:ext>
             </a:extLst>
           </p:cNvPr>
@@ -4485,7 +4485,7 @@
           <p:cNvPr id="39" name="TextBox 38">
             <a:extLst>
               <a:ext uri="{FF2B5EF4-FFF2-40B4-BE49-F238E27FC236}">
-                <a16:creationId xmlns="" xmlns:a16="http://schemas.microsoft.com/office/drawing/2014/main" id="{77DACC8D-3953-4CF9-A052-552278EA3516}"/>
+                <a16:creationId xmlns:a16="http://schemas.microsoft.com/office/drawing/2014/main" xmlns="" id="{77DACC8D-3953-4CF9-A052-552278EA3516}"/>
               </a:ext>
             </a:extLst>
           </p:cNvPr>
@@ -4530,7 +4530,7 @@
           <p:cNvPr id="24" name="Rectangle 23">
             <a:extLst>
               <a:ext uri="{FF2B5EF4-FFF2-40B4-BE49-F238E27FC236}">
-                <a16:creationId xmlns="" xmlns:a16="http://schemas.microsoft.com/office/drawing/2014/main" id="{A26B1B57-39F1-4784-BB8C-D498B044853A}"/>
+                <a16:creationId xmlns:a16="http://schemas.microsoft.com/office/drawing/2014/main" xmlns="" id="{A26B1B57-39F1-4784-BB8C-D498B044853A}"/>
               </a:ext>
             </a:extLst>
           </p:cNvPr>
@@ -4592,7 +4592,7 @@
           <p:cNvPr id="26" name="Rectangle 25">
             <a:extLst>
               <a:ext uri="{FF2B5EF4-FFF2-40B4-BE49-F238E27FC236}">
-                <a16:creationId xmlns="" xmlns:a16="http://schemas.microsoft.com/office/drawing/2014/main" id="{ABD8C12D-0590-401B-9810-3C70D06503BB}"/>
+                <a16:creationId xmlns:a16="http://schemas.microsoft.com/office/drawing/2014/main" xmlns="" id="{ABD8C12D-0590-401B-9810-3C70D06503BB}"/>
               </a:ext>
             </a:extLst>
           </p:cNvPr>
@@ -4654,7 +4654,7 @@
           <p:cNvPr id="28" name="Rectangle 27">
             <a:extLst>
               <a:ext uri="{FF2B5EF4-FFF2-40B4-BE49-F238E27FC236}">
-                <a16:creationId xmlns="" xmlns:a16="http://schemas.microsoft.com/office/drawing/2014/main" id="{ABD8C12D-0590-401B-9810-3C70D06503BB}"/>
+                <a16:creationId xmlns:a16="http://schemas.microsoft.com/office/drawing/2014/main" xmlns="" id="{ABD8C12D-0590-401B-9810-3C70D06503BB}"/>
               </a:ext>
             </a:extLst>
           </p:cNvPr>
@@ -4705,7 +4705,15 @@
                   <a:schemeClr val="bg1"/>
                 </a:solidFill>
               </a:rPr>
-              <a:t>: All</a:t>
+              <a:t>: </a:t>
+            </a:r>
+            <a:r>
+              <a:rPr lang="en-US" sz="800" dirty="0" smtClean="0">
+                <a:solidFill>
+                  <a:schemeClr val="bg1"/>
+                </a:solidFill>
+              </a:rPr>
+              <a:t>Justen and Liam</a:t>
             </a:r>
             <a:endParaRPr lang="en-US" dirty="0"/>
           </a:p>
@@ -4716,7 +4724,7 @@
           <p:cNvPr id="30" name="Rectangle 29">
             <a:extLst>
               <a:ext uri="{FF2B5EF4-FFF2-40B4-BE49-F238E27FC236}">
-                <a16:creationId xmlns="" xmlns:a16="http://schemas.microsoft.com/office/drawing/2014/main" id="{ABD8C12D-0590-401B-9810-3C70D06503BB}"/>
+                <a16:creationId xmlns:a16="http://schemas.microsoft.com/office/drawing/2014/main" xmlns="" id="{ABD8C12D-0590-401B-9810-3C70D06503BB}"/>
               </a:ext>
             </a:extLst>
           </p:cNvPr>
@@ -4778,7 +4786,7 @@
           <p:cNvPr id="27" name="Rectangle 26">
             <a:extLst>
               <a:ext uri="{FF2B5EF4-FFF2-40B4-BE49-F238E27FC236}">
-                <a16:creationId xmlns="" xmlns:a16="http://schemas.microsoft.com/office/drawing/2014/main" id="{A26B1B57-39F1-4784-BB8C-D498B044853A}"/>
+                <a16:creationId xmlns:a16="http://schemas.microsoft.com/office/drawing/2014/main" xmlns="" id="{A26B1B57-39F1-4784-BB8C-D498B044853A}"/>
               </a:ext>
             </a:extLst>
           </p:cNvPr>
@@ -4840,7 +4848,7 @@
           <p:cNvPr id="29" name="Rectangle 28">
             <a:extLst>
               <a:ext uri="{FF2B5EF4-FFF2-40B4-BE49-F238E27FC236}">
-                <a16:creationId xmlns="" xmlns:a16="http://schemas.microsoft.com/office/drawing/2014/main" id="{A26B1B57-39F1-4784-BB8C-D498B044853A}"/>
+                <a16:creationId xmlns:a16="http://schemas.microsoft.com/office/drawing/2014/main" xmlns="" id="{A26B1B57-39F1-4784-BB8C-D498B044853A}"/>
               </a:ext>
             </a:extLst>
           </p:cNvPr>
@@ -4902,7 +4910,7 @@
           <p:cNvPr id="31" name="Rectangle 30">
             <a:extLst>
               <a:ext uri="{FF2B5EF4-FFF2-40B4-BE49-F238E27FC236}">
-                <a16:creationId xmlns="" xmlns:a16="http://schemas.microsoft.com/office/drawing/2014/main" id="{ABD8C12D-0590-401B-9810-3C70D06503BB}"/>
+                <a16:creationId xmlns:a16="http://schemas.microsoft.com/office/drawing/2014/main" xmlns="" id="{ABD8C12D-0590-401B-9810-3C70D06503BB}"/>
               </a:ext>
             </a:extLst>
           </p:cNvPr>
@@ -4964,7 +4972,7 @@
           <p:cNvPr id="33" name="Rectangle 32">
             <a:extLst>
               <a:ext uri="{FF2B5EF4-FFF2-40B4-BE49-F238E27FC236}">
-                <a16:creationId xmlns="" xmlns:a16="http://schemas.microsoft.com/office/drawing/2014/main" id="{ABD8C12D-0590-401B-9810-3C70D06503BB}"/>
+                <a16:creationId xmlns:a16="http://schemas.microsoft.com/office/drawing/2014/main" xmlns="" id="{ABD8C12D-0590-401B-9810-3C70D06503BB}"/>
               </a:ext>
             </a:extLst>
           </p:cNvPr>
@@ -5090,7 +5098,7 @@
           <p:cNvPr id="19" name="Rectangle 18">
             <a:extLst>
               <a:ext uri="{FF2B5EF4-FFF2-40B4-BE49-F238E27FC236}">
-                <a16:creationId xmlns="" xmlns:a16="http://schemas.microsoft.com/office/drawing/2014/main" id="{32D851B6-714A-4883-8D4E-754A7ED882BA}"/>
+                <a16:creationId xmlns:a16="http://schemas.microsoft.com/office/drawing/2014/main" xmlns="" id="{32D851B6-714A-4883-8D4E-754A7ED882BA}"/>
               </a:ext>
             </a:extLst>
           </p:cNvPr>
@@ -5136,7 +5144,7 @@
           <p:cNvPr id="21" name="Rectangle 20">
             <a:extLst>
               <a:ext uri="{FF2B5EF4-FFF2-40B4-BE49-F238E27FC236}">
-                <a16:creationId xmlns="" xmlns:a16="http://schemas.microsoft.com/office/drawing/2014/main" id="{B2FF60AC-91EF-4D69-ACB9-CC146BDC6526}"/>
+                <a16:creationId xmlns:a16="http://schemas.microsoft.com/office/drawing/2014/main" xmlns="" id="{B2FF60AC-91EF-4D69-ACB9-CC146BDC6526}"/>
               </a:ext>
             </a:extLst>
           </p:cNvPr>
@@ -5198,7 +5206,7 @@
           <p:cNvPr id="23" name="Rectangle 22">
             <a:extLst>
               <a:ext uri="{FF2B5EF4-FFF2-40B4-BE49-F238E27FC236}">
-                <a16:creationId xmlns="" xmlns:a16="http://schemas.microsoft.com/office/drawing/2014/main" id="{F0CB5917-D9C5-4F78-B41A-F70D3EFFCF26}"/>
+                <a16:creationId xmlns:a16="http://schemas.microsoft.com/office/drawing/2014/main" xmlns="" id="{F0CB5917-D9C5-4F78-B41A-F70D3EFFCF26}"/>
               </a:ext>
             </a:extLst>
           </p:cNvPr>
@@ -5260,7 +5268,7 @@
           <p:cNvPr id="25" name="Rectangle 24">
             <a:extLst>
               <a:ext uri="{FF2B5EF4-FFF2-40B4-BE49-F238E27FC236}">
-                <a16:creationId xmlns="" xmlns:a16="http://schemas.microsoft.com/office/drawing/2014/main" id="{A26B1B57-39F1-4784-BB8C-D498B044853A}"/>
+                <a16:creationId xmlns:a16="http://schemas.microsoft.com/office/drawing/2014/main" xmlns="" id="{A26B1B57-39F1-4784-BB8C-D498B044853A}"/>
               </a:ext>
             </a:extLst>
           </p:cNvPr>
@@ -5322,7 +5330,7 @@
           <p:cNvPr id="4" name="TextBox 3">
             <a:extLst>
               <a:ext uri="{FF2B5EF4-FFF2-40B4-BE49-F238E27FC236}">
-                <a16:creationId xmlns="" xmlns:a16="http://schemas.microsoft.com/office/drawing/2014/main" id="{77AFE952-47A5-42E2-A2EC-FF7ABEA49A89}"/>
+                <a16:creationId xmlns:a16="http://schemas.microsoft.com/office/drawing/2014/main" xmlns="" id="{77AFE952-47A5-42E2-A2EC-FF7ABEA49A89}"/>
               </a:ext>
             </a:extLst>
           </p:cNvPr>
@@ -5365,7 +5373,7 @@
           <p:cNvPr id="5" name="TextBox 4">
             <a:extLst>
               <a:ext uri="{FF2B5EF4-FFF2-40B4-BE49-F238E27FC236}">
-                <a16:creationId xmlns="" xmlns:a16="http://schemas.microsoft.com/office/drawing/2014/main" id="{090298AF-3D44-4478-B386-6971E79EB79D}"/>
+                <a16:creationId xmlns:a16="http://schemas.microsoft.com/office/drawing/2014/main" xmlns="" id="{090298AF-3D44-4478-B386-6971E79EB79D}"/>
               </a:ext>
             </a:extLst>
           </p:cNvPr>
@@ -5400,7 +5408,7 @@
           <p:cNvPr id="6" name="Rectangle 5">
             <a:extLst>
               <a:ext uri="{FF2B5EF4-FFF2-40B4-BE49-F238E27FC236}">
-                <a16:creationId xmlns="" xmlns:a16="http://schemas.microsoft.com/office/drawing/2014/main" id="{B4931A1A-F246-44F6-A374-61C9F9C636E0}"/>
+                <a16:creationId xmlns:a16="http://schemas.microsoft.com/office/drawing/2014/main" xmlns="" id="{B4931A1A-F246-44F6-A374-61C9F9C636E0}"/>
               </a:ext>
             </a:extLst>
           </p:cNvPr>
@@ -5446,7 +5454,7 @@
           <p:cNvPr id="8" name="Table 7">
             <a:extLst>
               <a:ext uri="{FF2B5EF4-FFF2-40B4-BE49-F238E27FC236}">
-                <a16:creationId xmlns="" xmlns:a16="http://schemas.microsoft.com/office/drawing/2014/main" id="{216E663B-7C2E-4835-91C1-5C8FB8698420}"/>
+                <a16:creationId xmlns:a16="http://schemas.microsoft.com/office/drawing/2014/main" xmlns="" id="{216E663B-7C2E-4835-91C1-5C8FB8698420}"/>
               </a:ext>
             </a:extLst>
           </p:cNvPr>
@@ -5475,28 +5483,28 @@
                 <a:gridCol w="721889">
                   <a:extLst>
                     <a:ext uri="{9D8B030D-6E8A-4147-A177-3AD203B41FA5}">
-                      <a16:colId xmlns="" xmlns:a16="http://schemas.microsoft.com/office/drawing/2014/main" val="233666424"/>
+                      <a16:colId xmlns:a16="http://schemas.microsoft.com/office/drawing/2014/main" xmlns="" val="233666424"/>
                     </a:ext>
                   </a:extLst>
                 </a:gridCol>
                 <a:gridCol w="783522">
                   <a:extLst>
                     <a:ext uri="{9D8B030D-6E8A-4147-A177-3AD203B41FA5}">
-                      <a16:colId xmlns="" xmlns:a16="http://schemas.microsoft.com/office/drawing/2014/main" val="972059951"/>
+                      <a16:colId xmlns:a16="http://schemas.microsoft.com/office/drawing/2014/main" xmlns="" val="972059951"/>
                     </a:ext>
                   </a:extLst>
                 </a:gridCol>
                 <a:gridCol w="1049516">
                   <a:extLst>
                     <a:ext uri="{9D8B030D-6E8A-4147-A177-3AD203B41FA5}">
-                      <a16:colId xmlns="" xmlns:a16="http://schemas.microsoft.com/office/drawing/2014/main" val="2188007159"/>
+                      <a16:colId xmlns:a16="http://schemas.microsoft.com/office/drawing/2014/main" xmlns="" val="2188007159"/>
                     </a:ext>
                   </a:extLst>
                 </a:gridCol>
                 <a:gridCol w="899906">
                   <a:extLst>
                     <a:ext uri="{9D8B030D-6E8A-4147-A177-3AD203B41FA5}">
-                      <a16:colId xmlns="" xmlns:a16="http://schemas.microsoft.com/office/drawing/2014/main" val="3389346521"/>
+                      <a16:colId xmlns:a16="http://schemas.microsoft.com/office/drawing/2014/main" xmlns="" val="3389346521"/>
                     </a:ext>
                   </a:extLst>
                 </a:gridCol>
@@ -5596,7 +5604,7 @@
                 </a:tc>
                 <a:extLst>
                   <a:ext uri="{0D108BD9-81ED-4DB2-BD59-A6C34878D82A}">
-                    <a16:rowId xmlns="" xmlns:a16="http://schemas.microsoft.com/office/drawing/2014/main" val="300847090"/>
+                    <a16:rowId xmlns:a16="http://schemas.microsoft.com/office/drawing/2014/main" xmlns="" val="300847090"/>
                   </a:ext>
                 </a:extLst>
               </a:tr>
@@ -5609,7 +5617,7 @@
           <p:cNvPr id="9" name="Table 8">
             <a:extLst>
               <a:ext uri="{FF2B5EF4-FFF2-40B4-BE49-F238E27FC236}">
-                <a16:creationId xmlns="" xmlns:a16="http://schemas.microsoft.com/office/drawing/2014/main" id="{7488BC97-D05E-4727-B765-F9F045F12689}"/>
+                <a16:creationId xmlns:a16="http://schemas.microsoft.com/office/drawing/2014/main" xmlns="" id="{7488BC97-D05E-4727-B765-F9F045F12689}"/>
               </a:ext>
             </a:extLst>
           </p:cNvPr>
@@ -5638,28 +5646,28 @@
                 <a:gridCol w="721889">
                   <a:extLst>
                     <a:ext uri="{9D8B030D-6E8A-4147-A177-3AD203B41FA5}">
-                      <a16:colId xmlns="" xmlns:a16="http://schemas.microsoft.com/office/drawing/2014/main" val="3693118018"/>
+                      <a16:colId xmlns:a16="http://schemas.microsoft.com/office/drawing/2014/main" xmlns="" val="3693118018"/>
                     </a:ext>
                   </a:extLst>
                 </a:gridCol>
                 <a:gridCol w="783522">
                   <a:extLst>
                     <a:ext uri="{9D8B030D-6E8A-4147-A177-3AD203B41FA5}">
-                      <a16:colId xmlns="" xmlns:a16="http://schemas.microsoft.com/office/drawing/2014/main" val="952852968"/>
+                      <a16:colId xmlns:a16="http://schemas.microsoft.com/office/drawing/2014/main" xmlns="" val="952852968"/>
                     </a:ext>
                   </a:extLst>
                 </a:gridCol>
                 <a:gridCol w="1015871">
                   <a:extLst>
                     <a:ext uri="{9D8B030D-6E8A-4147-A177-3AD203B41FA5}">
-                      <a16:colId xmlns="" xmlns:a16="http://schemas.microsoft.com/office/drawing/2014/main" val="1816747115"/>
+                      <a16:colId xmlns:a16="http://schemas.microsoft.com/office/drawing/2014/main" xmlns="" val="1816747115"/>
                     </a:ext>
                   </a:extLst>
                 </a:gridCol>
                 <a:gridCol w="933551">
                   <a:extLst>
                     <a:ext uri="{9D8B030D-6E8A-4147-A177-3AD203B41FA5}">
-                      <a16:colId xmlns="" xmlns:a16="http://schemas.microsoft.com/office/drawing/2014/main" val="55182559"/>
+                      <a16:colId xmlns:a16="http://schemas.microsoft.com/office/drawing/2014/main" xmlns="" val="55182559"/>
                     </a:ext>
                   </a:extLst>
                 </a:gridCol>
@@ -5785,7 +5793,7 @@
                 </a:tc>
                 <a:extLst>
                   <a:ext uri="{0D108BD9-81ED-4DB2-BD59-A6C34878D82A}">
-                    <a16:rowId xmlns="" xmlns:a16="http://schemas.microsoft.com/office/drawing/2014/main" val="2287119280"/>
+                    <a16:rowId xmlns:a16="http://schemas.microsoft.com/office/drawing/2014/main" xmlns="" val="2287119280"/>
                   </a:ext>
                 </a:extLst>
               </a:tr>
@@ -5798,7 +5806,7 @@
           <p:cNvPr id="10" name="Table 9">
             <a:extLst>
               <a:ext uri="{FF2B5EF4-FFF2-40B4-BE49-F238E27FC236}">
-                <a16:creationId xmlns="" xmlns:a16="http://schemas.microsoft.com/office/drawing/2014/main" id="{8B53D829-A13C-4105-BD19-80750650E577}"/>
+                <a16:creationId xmlns:a16="http://schemas.microsoft.com/office/drawing/2014/main" xmlns="" id="{8B53D829-A13C-4105-BD19-80750650E577}"/>
               </a:ext>
             </a:extLst>
           </p:cNvPr>
@@ -5827,28 +5835,28 @@
                 <a:gridCol w="721889">
                   <a:extLst>
                     <a:ext uri="{9D8B030D-6E8A-4147-A177-3AD203B41FA5}">
-                      <a16:colId xmlns="" xmlns:a16="http://schemas.microsoft.com/office/drawing/2014/main" val="1464581443"/>
+                      <a16:colId xmlns:a16="http://schemas.microsoft.com/office/drawing/2014/main" xmlns="" val="1464581443"/>
                     </a:ext>
                   </a:extLst>
                 </a:gridCol>
                 <a:gridCol w="783522">
                   <a:extLst>
                     <a:ext uri="{9D8B030D-6E8A-4147-A177-3AD203B41FA5}">
-                      <a16:colId xmlns="" xmlns:a16="http://schemas.microsoft.com/office/drawing/2014/main" val="3127435560"/>
+                      <a16:colId xmlns:a16="http://schemas.microsoft.com/office/drawing/2014/main" xmlns="" val="3127435560"/>
                     </a:ext>
                   </a:extLst>
                 </a:gridCol>
                 <a:gridCol w="1049516">
                   <a:extLst>
                     <a:ext uri="{9D8B030D-6E8A-4147-A177-3AD203B41FA5}">
-                      <a16:colId xmlns="" xmlns:a16="http://schemas.microsoft.com/office/drawing/2014/main" val="2161992991"/>
+                      <a16:colId xmlns:a16="http://schemas.microsoft.com/office/drawing/2014/main" xmlns="" val="2161992991"/>
                     </a:ext>
                   </a:extLst>
                 </a:gridCol>
                 <a:gridCol w="899906">
                   <a:extLst>
                     <a:ext uri="{9D8B030D-6E8A-4147-A177-3AD203B41FA5}">
-                      <a16:colId xmlns="" xmlns:a16="http://schemas.microsoft.com/office/drawing/2014/main" val="732979080"/>
+                      <a16:colId xmlns:a16="http://schemas.microsoft.com/office/drawing/2014/main" xmlns="" val="732979080"/>
                     </a:ext>
                   </a:extLst>
                 </a:gridCol>
@@ -5969,17 +5977,7 @@
                           <a:effectLst/>
                           <a:latin typeface="Century Gothic" panose="020B0502020202020204" pitchFamily="34" charset="0"/>
                         </a:rPr>
-                        <a:t> </a:t>
-                      </a:r>
-                      <a:r>
-                        <a:rPr lang="en-US" sz="800" b="0" i="0" u="none" strike="noStrike" dirty="0" smtClean="0">
-                          <a:solidFill>
-                            <a:srgbClr val="000000"/>
-                          </a:solidFill>
-                          <a:effectLst/>
-                          <a:latin typeface="Century Gothic" panose="020B0502020202020204" pitchFamily="34" charset="0"/>
-                        </a:rPr>
-                        <a:t>have</a:t>
+                        <a:t> have</a:t>
                       </a:r>
                       <a:endParaRPr lang="en-US" sz="800" b="0" i="0" u="none" strike="noStrike" dirty="0">
                         <a:solidFill>
@@ -5994,7 +5992,7 @@
                 </a:tc>
                 <a:extLst>
                   <a:ext uri="{0D108BD9-81ED-4DB2-BD59-A6C34878D82A}">
-                    <a16:rowId xmlns="" xmlns:a16="http://schemas.microsoft.com/office/drawing/2014/main" val="2949352622"/>
+                    <a16:rowId xmlns:a16="http://schemas.microsoft.com/office/drawing/2014/main" xmlns="" val="2949352622"/>
                   </a:ext>
                 </a:extLst>
               </a:tr>
@@ -6007,7 +6005,7 @@
           <p:cNvPr id="15" name="Rectangle 14">
             <a:extLst>
               <a:ext uri="{FF2B5EF4-FFF2-40B4-BE49-F238E27FC236}">
-                <a16:creationId xmlns="" xmlns:a16="http://schemas.microsoft.com/office/drawing/2014/main" id="{8899DA91-943D-48DA-AAB3-0895C2AAF047}"/>
+                <a16:creationId xmlns:a16="http://schemas.microsoft.com/office/drawing/2014/main" xmlns="" id="{8899DA91-943D-48DA-AAB3-0895C2AAF047}"/>
               </a:ext>
             </a:extLst>
           </p:cNvPr>
@@ -6069,7 +6067,7 @@
           <p:cNvPr id="17" name="Rectangle 16">
             <a:extLst>
               <a:ext uri="{FF2B5EF4-FFF2-40B4-BE49-F238E27FC236}">
-                <a16:creationId xmlns="" xmlns:a16="http://schemas.microsoft.com/office/drawing/2014/main" id="{ABD8C12D-0590-401B-9810-3C70D06503BB}"/>
+                <a16:creationId xmlns:a16="http://schemas.microsoft.com/office/drawing/2014/main" xmlns="" id="{ABD8C12D-0590-401B-9810-3C70D06503BB}"/>
               </a:ext>
             </a:extLst>
           </p:cNvPr>
@@ -6131,7 +6129,7 @@
           <p:cNvPr id="35" name="Straight Connector 34">
             <a:extLst>
               <a:ext uri="{FF2B5EF4-FFF2-40B4-BE49-F238E27FC236}">
-                <a16:creationId xmlns="" xmlns:a16="http://schemas.microsoft.com/office/drawing/2014/main" id="{B6A3EA80-60C5-4431-980D-80005D3FE9D3}"/>
+                <a16:creationId xmlns:a16="http://schemas.microsoft.com/office/drawing/2014/main" xmlns="" id="{B6A3EA80-60C5-4431-980D-80005D3FE9D3}"/>
               </a:ext>
             </a:extLst>
           </p:cNvPr>
@@ -6173,7 +6171,7 @@
           <p:cNvPr id="36" name="Straight Connector 35">
             <a:extLst>
               <a:ext uri="{FF2B5EF4-FFF2-40B4-BE49-F238E27FC236}">
-                <a16:creationId xmlns="" xmlns:a16="http://schemas.microsoft.com/office/drawing/2014/main" id="{82BD31D8-AEB2-4A38-A420-A825020DD77E}"/>
+                <a16:creationId xmlns:a16="http://schemas.microsoft.com/office/drawing/2014/main" xmlns="" id="{82BD31D8-AEB2-4A38-A420-A825020DD77E}"/>
               </a:ext>
             </a:extLst>
           </p:cNvPr>
@@ -6215,7 +6213,7 @@
           <p:cNvPr id="37" name="Straight Connector 36">
             <a:extLst>
               <a:ext uri="{FF2B5EF4-FFF2-40B4-BE49-F238E27FC236}">
-                <a16:creationId xmlns="" xmlns:a16="http://schemas.microsoft.com/office/drawing/2014/main" id="{7DE8383F-8BE6-4377-8AA9-3A3873DC3067}"/>
+                <a16:creationId xmlns:a16="http://schemas.microsoft.com/office/drawing/2014/main" xmlns="" id="{7DE8383F-8BE6-4377-8AA9-3A3873DC3067}"/>
               </a:ext>
             </a:extLst>
           </p:cNvPr>
@@ -6257,7 +6255,7 @@
           <p:cNvPr id="39" name="TextBox 38">
             <a:extLst>
               <a:ext uri="{FF2B5EF4-FFF2-40B4-BE49-F238E27FC236}">
-                <a16:creationId xmlns="" xmlns:a16="http://schemas.microsoft.com/office/drawing/2014/main" id="{77DACC8D-3953-4CF9-A052-552278EA3516}"/>
+                <a16:creationId xmlns:a16="http://schemas.microsoft.com/office/drawing/2014/main" xmlns="" id="{77DACC8D-3953-4CF9-A052-552278EA3516}"/>
               </a:ext>
             </a:extLst>
           </p:cNvPr>
@@ -6302,7 +6300,7 @@
           <p:cNvPr id="24" name="Rectangle 23">
             <a:extLst>
               <a:ext uri="{FF2B5EF4-FFF2-40B4-BE49-F238E27FC236}">
-                <a16:creationId xmlns="" xmlns:a16="http://schemas.microsoft.com/office/drawing/2014/main" id="{A26B1B57-39F1-4784-BB8C-D498B044853A}"/>
+                <a16:creationId xmlns:a16="http://schemas.microsoft.com/office/drawing/2014/main" xmlns="" id="{A26B1B57-39F1-4784-BB8C-D498B044853A}"/>
               </a:ext>
             </a:extLst>
           </p:cNvPr>
@@ -6364,7 +6362,7 @@
           <p:cNvPr id="26" name="Rectangle 25">
             <a:extLst>
               <a:ext uri="{FF2B5EF4-FFF2-40B4-BE49-F238E27FC236}">
-                <a16:creationId xmlns="" xmlns:a16="http://schemas.microsoft.com/office/drawing/2014/main" id="{ABD8C12D-0590-401B-9810-3C70D06503BB}"/>
+                <a16:creationId xmlns:a16="http://schemas.microsoft.com/office/drawing/2014/main" xmlns="" id="{ABD8C12D-0590-401B-9810-3C70D06503BB}"/>
               </a:ext>
             </a:extLst>
           </p:cNvPr>
@@ -6442,7 +6440,7 @@
           <p:cNvPr id="28" name="Rectangle 27">
             <a:extLst>
               <a:ext uri="{FF2B5EF4-FFF2-40B4-BE49-F238E27FC236}">
-                <a16:creationId xmlns="" xmlns:a16="http://schemas.microsoft.com/office/drawing/2014/main" id="{ABD8C12D-0590-401B-9810-3C70D06503BB}"/>
+                <a16:creationId xmlns:a16="http://schemas.microsoft.com/office/drawing/2014/main" xmlns="" id="{ABD8C12D-0590-401B-9810-3C70D06503BB}"/>
               </a:ext>
             </a:extLst>
           </p:cNvPr>
@@ -6512,7 +6510,7 @@
           <p:cNvPr id="30" name="Rectangle 29">
             <a:extLst>
               <a:ext uri="{FF2B5EF4-FFF2-40B4-BE49-F238E27FC236}">
-                <a16:creationId xmlns="" xmlns:a16="http://schemas.microsoft.com/office/drawing/2014/main" id="{ABD8C12D-0590-401B-9810-3C70D06503BB}"/>
+                <a16:creationId xmlns:a16="http://schemas.microsoft.com/office/drawing/2014/main" xmlns="" id="{ABD8C12D-0590-401B-9810-3C70D06503BB}"/>
               </a:ext>
             </a:extLst>
           </p:cNvPr>
@@ -6598,7 +6596,7 @@
           <p:cNvPr id="32" name="Rectangle 31">
             <a:extLst>
               <a:ext uri="{FF2B5EF4-FFF2-40B4-BE49-F238E27FC236}">
-                <a16:creationId xmlns="" xmlns:a16="http://schemas.microsoft.com/office/drawing/2014/main" id="{ABD8C12D-0590-401B-9810-3C70D06503BB}"/>
+                <a16:creationId xmlns:a16="http://schemas.microsoft.com/office/drawing/2014/main" xmlns="" id="{ABD8C12D-0590-401B-9810-3C70D06503BB}"/>
               </a:ext>
             </a:extLst>
           </p:cNvPr>
@@ -6660,7 +6658,7 @@
           <p:cNvPr id="34" name="Rectangle 33">
             <a:extLst>
               <a:ext uri="{FF2B5EF4-FFF2-40B4-BE49-F238E27FC236}">
-                <a16:creationId xmlns="" xmlns:a16="http://schemas.microsoft.com/office/drawing/2014/main" id="{ABD8C12D-0590-401B-9810-3C70D06503BB}"/>
+                <a16:creationId xmlns:a16="http://schemas.microsoft.com/office/drawing/2014/main" xmlns="" id="{ABD8C12D-0590-401B-9810-3C70D06503BB}"/>
               </a:ext>
             </a:extLst>
           </p:cNvPr>
@@ -6722,7 +6720,7 @@
           <p:cNvPr id="27" name="Rectangle 26">
             <a:extLst>
               <a:ext uri="{FF2B5EF4-FFF2-40B4-BE49-F238E27FC236}">
-                <a16:creationId xmlns="" xmlns:a16="http://schemas.microsoft.com/office/drawing/2014/main" id="{ABD8C12D-0590-401B-9810-3C70D06503BB}"/>
+                <a16:creationId xmlns:a16="http://schemas.microsoft.com/office/drawing/2014/main" xmlns="" id="{ABD8C12D-0590-401B-9810-3C70D06503BB}"/>
               </a:ext>
             </a:extLst>
           </p:cNvPr>
@@ -6800,7 +6798,7 @@
           <p:cNvPr id="29" name="Rectangle 28">
             <a:extLst>
               <a:ext uri="{FF2B5EF4-FFF2-40B4-BE49-F238E27FC236}">
-                <a16:creationId xmlns="" xmlns:a16="http://schemas.microsoft.com/office/drawing/2014/main" id="{ABD8C12D-0590-401B-9810-3C70D06503BB}"/>
+                <a16:creationId xmlns:a16="http://schemas.microsoft.com/office/drawing/2014/main" xmlns="" id="{ABD8C12D-0590-401B-9810-3C70D06503BB}"/>
               </a:ext>
             </a:extLst>
           </p:cNvPr>

</xml_diff>